<commit_message>
i updated the presentation and the visio files.
</commit_message>
<xml_diff>
--- a/doc/BioCalc Presentation.pptx
+++ b/doc/BioCalc Presentation.pptx
@@ -5089,45 +5089,6 @@
           <a:chExt cx="0" cy="0"/>
         </a:xfrm>
       </p:grpSpPr>
-      <p:pic>
-        <p:nvPicPr>
-          <p:cNvPr id="5" name="Picture 4"/>
-          <p:cNvPicPr>
-            <a:picLocks noChangeAspect="1"/>
-          </p:cNvPicPr>
-          <p:nvPr/>
-        </p:nvPicPr>
-        <p:blipFill>
-          <a:blip r:embed="rId3" cstate="print">
-            <a:extLst>
-              <a:ext uri="{BEBA8EAE-BF5A-486C-A8C5-ECC9F3942E4B}">
-                <a14:imgProps xmlns:a14="http://schemas.microsoft.com/office/drawing/2010/main">
-                  <a14:imgLayer r:embed="rId4">
-                    <a14:imgEffect>
-                      <a14:artisticCutout/>
-                    </a14:imgEffect>
-                  </a14:imgLayer>
-                </a14:imgProps>
-              </a:ext>
-              <a:ext uri="{28A0092B-C50C-407E-A947-70E740481C1C}">
-                <a14:useLocalDpi xmlns:a14="http://schemas.microsoft.com/office/drawing/2010/main" val="0"/>
-              </a:ext>
-            </a:extLst>
-          </a:blip>
-          <a:stretch>
-            <a:fillRect/>
-          </a:stretch>
-        </p:blipFill>
-        <p:spPr>
-          <a:xfrm>
-            <a:off x="727107" y="5105400"/>
-            <a:ext cx="1101693" cy="970924"/>
-          </a:xfrm>
-          <a:prstGeom prst="rect">
-            <a:avLst/>
-          </a:prstGeom>
-        </p:spPr>
-      </p:pic>
       <p:sp>
         <p:nvSpPr>
           <p:cNvPr id="148493" name="Text Box 13"/>
@@ -5352,7 +5313,23 @@
                   <a:schemeClr val="bg1"/>
                 </a:solidFill>
               </a:rPr>
-              <a:t>Through the dark waters of the </a:t>
+              <a:t>Through the dark </a:t>
+            </a:r>
+            <a:r>
+              <a:rPr lang="en-US" altLang="en-US" b="1" i="1" dirty="0" smtClean="0">
+                <a:solidFill>
+                  <a:schemeClr val="bg1"/>
+                </a:solidFill>
+              </a:rPr>
+              <a:t>waters of </a:t>
+            </a:r>
+            <a:r>
+              <a:rPr lang="en-US" altLang="en-US" b="1" i="1" dirty="0" smtClean="0">
+                <a:solidFill>
+                  <a:schemeClr val="bg1"/>
+                </a:solidFill>
+              </a:rPr>
+              <a:t>the </a:t>
             </a:r>
             <a:r>
               <a:rPr lang="ro-RO" altLang="en-US" b="1" i="1" dirty="0" smtClean="0">
@@ -5638,6 +5615,36 @@
           </a:p>
         </p:txBody>
       </p:sp>
+      <p:pic>
+        <p:nvPicPr>
+          <p:cNvPr id="2" name="Picture 1"/>
+          <p:cNvPicPr>
+            <a:picLocks noChangeAspect="1"/>
+          </p:cNvPicPr>
+          <p:nvPr/>
+        </p:nvPicPr>
+        <p:blipFill>
+          <a:blip r:embed="rId3">
+            <a:extLst>
+              <a:ext uri="{28A0092B-C50C-407E-A947-70E740481C1C}">
+                <a14:useLocalDpi xmlns:a14="http://schemas.microsoft.com/office/drawing/2010/main" val="0"/>
+              </a:ext>
+            </a:extLst>
+          </a:blip>
+          <a:stretch>
+            <a:fillRect/>
+          </a:stretch>
+        </p:blipFill>
+        <p:spPr>
+          <a:xfrm>
+            <a:off x="625312" y="4953000"/>
+            <a:ext cx="1228725" cy="1085850"/>
+          </a:xfrm>
+          <a:prstGeom prst="rect">
+            <a:avLst/>
+          </a:prstGeom>
+        </p:spPr>
+      </p:pic>
     </p:spTree>
   </p:cSld>
   <p:clrMapOvr>
@@ -5752,6 +5759,50 @@
                             </p:childTnLst>
                           </p:cTn>
                         </p:par>
+                        <p:par>
+                          <p:cTn id="12" fill="hold">
+                            <p:stCondLst>
+                              <p:cond delay="6475"/>
+                            </p:stCondLst>
+                            <p:childTnLst>
+                              <p:par>
+                                <p:cTn id="13" presetID="22" presetClass="entr" presetSubtype="4" fill="hold" nodeType="afterEffect">
+                                  <p:stCondLst>
+                                    <p:cond delay="0"/>
+                                  </p:stCondLst>
+                                  <p:childTnLst>
+                                    <p:set>
+                                      <p:cBhvr>
+                                        <p:cTn id="14" dur="1" fill="hold">
+                                          <p:stCondLst>
+                                            <p:cond delay="0"/>
+                                          </p:stCondLst>
+                                        </p:cTn>
+                                        <p:tgtEl>
+                                          <p:spTgt spid="2"/>
+                                        </p:tgtEl>
+                                        <p:attrNameLst>
+                                          <p:attrName>style.visibility</p:attrName>
+                                        </p:attrNameLst>
+                                      </p:cBhvr>
+                                      <p:to>
+                                        <p:strVal val="visible"/>
+                                      </p:to>
+                                    </p:set>
+                                    <p:animEffect transition="in" filter="wipe(down)">
+                                      <p:cBhvr>
+                                        <p:cTn id="15" dur="500"/>
+                                        <p:tgtEl>
+                                          <p:spTgt spid="2"/>
+                                        </p:tgtEl>
+                                      </p:cBhvr>
+                                    </p:animEffect>
+                                  </p:childTnLst>
+                                </p:cTn>
+                              </p:par>
+                            </p:childTnLst>
+                          </p:cTn>
+                        </p:par>
                       </p:childTnLst>
                     </p:cTn>
                   </p:par>
@@ -5940,6 +5991,60 @@
           </a:extLst>
         </p:spPr>
       </p:pic>
+      <p:sp>
+        <p:nvSpPr>
+          <p:cNvPr id="5" name="TextBox 4"/>
+          <p:cNvSpPr txBox="1"/>
+          <p:nvPr/>
+        </p:nvSpPr>
+        <p:spPr>
+          <a:xfrm>
+            <a:off x="3352800" y="6459379"/>
+            <a:ext cx="2518638" cy="246221"/>
+          </a:xfrm>
+          <a:prstGeom prst="rect">
+            <a:avLst/>
+          </a:prstGeom>
+          <a:solidFill>
+            <a:schemeClr val="bg1"/>
+          </a:solidFill>
+        </p:spPr>
+        <p:txBody>
+          <a:bodyPr wrap="none" rtlCol="0">
+            <a:spAutoFit/>
+          </a:bodyPr>
+          <a:lstStyle/>
+          <a:p>
+            <a:r>
+              <a:rPr lang="en-US" sz="1000" dirty="0" smtClean="0">
+                <a:solidFill>
+                  <a:schemeClr val="bg1">
+                    <a:lumMod val="50000"/>
+                  </a:schemeClr>
+                </a:solidFill>
+              </a:rPr>
+              <a:t>© iQuest </a:t>
+            </a:r>
+            <a:r>
+              <a:rPr lang="en-US" sz="1000" dirty="0" smtClean="0">
+                <a:solidFill>
+                  <a:schemeClr val="bg1">
+                    <a:lumMod val="50000"/>
+                  </a:schemeClr>
+                </a:solidFill>
+              </a:rPr>
+              <a:t>Group 2013. All rights reserved.</a:t>
+            </a:r>
+            <a:endParaRPr lang="en-US" sz="1000" dirty="0" smtClean="0">
+              <a:solidFill>
+                <a:schemeClr val="bg1">
+                  <a:lumMod val="50000"/>
+                </a:schemeClr>
+              </a:solidFill>
+            </a:endParaRPr>
+          </a:p>
+        </p:txBody>
+      </p:sp>
     </p:spTree>
     <p:extLst>
       <p:ext uri="{BB962C8B-B14F-4D97-AF65-F5344CB8AC3E}">
@@ -6120,6 +6225,60 @@
           </a:extLst>
         </p:spPr>
       </p:pic>
+      <p:sp>
+        <p:nvSpPr>
+          <p:cNvPr id="5" name="TextBox 4"/>
+          <p:cNvSpPr txBox="1"/>
+          <p:nvPr/>
+        </p:nvSpPr>
+        <p:spPr>
+          <a:xfrm>
+            <a:off x="3352800" y="6459379"/>
+            <a:ext cx="2518638" cy="246221"/>
+          </a:xfrm>
+          <a:prstGeom prst="rect">
+            <a:avLst/>
+          </a:prstGeom>
+          <a:solidFill>
+            <a:schemeClr val="bg1"/>
+          </a:solidFill>
+        </p:spPr>
+        <p:txBody>
+          <a:bodyPr wrap="none" rtlCol="0">
+            <a:spAutoFit/>
+          </a:bodyPr>
+          <a:lstStyle/>
+          <a:p>
+            <a:r>
+              <a:rPr lang="en-US" sz="1000" dirty="0" smtClean="0">
+                <a:solidFill>
+                  <a:schemeClr val="bg1">
+                    <a:lumMod val="50000"/>
+                  </a:schemeClr>
+                </a:solidFill>
+              </a:rPr>
+              <a:t>© iQuest </a:t>
+            </a:r>
+            <a:r>
+              <a:rPr lang="en-US" sz="1000" dirty="0" smtClean="0">
+                <a:solidFill>
+                  <a:schemeClr val="bg1">
+                    <a:lumMod val="50000"/>
+                  </a:schemeClr>
+                </a:solidFill>
+              </a:rPr>
+              <a:t>Group 2013. All rights reserved.</a:t>
+            </a:r>
+            <a:endParaRPr lang="en-US" sz="1000" dirty="0" smtClean="0">
+              <a:solidFill>
+                <a:schemeClr val="bg1">
+                  <a:lumMod val="50000"/>
+                </a:schemeClr>
+              </a:solidFill>
+            </a:endParaRPr>
+          </a:p>
+        </p:txBody>
+      </p:sp>
     </p:spTree>
     <p:extLst>
       <p:ext uri="{BB962C8B-B14F-4D97-AF65-F5344CB8AC3E}">
@@ -6521,6 +6680,60 @@
               <a:rPr lang="ro-RO" altLang="en-US" sz="2400" dirty="0" smtClean="0"/>
               <a:t>But what if...</a:t>
             </a:r>
+          </a:p>
+        </p:txBody>
+      </p:sp>
+      <p:sp>
+        <p:nvSpPr>
+          <p:cNvPr id="7" name="TextBox 6"/>
+          <p:cNvSpPr txBox="1"/>
+          <p:nvPr/>
+        </p:nvSpPr>
+        <p:spPr>
+          <a:xfrm>
+            <a:off x="3352800" y="6459379"/>
+            <a:ext cx="2518638" cy="246221"/>
+          </a:xfrm>
+          <a:prstGeom prst="rect">
+            <a:avLst/>
+          </a:prstGeom>
+          <a:solidFill>
+            <a:schemeClr val="bg1"/>
+          </a:solidFill>
+        </p:spPr>
+        <p:txBody>
+          <a:bodyPr wrap="none" rtlCol="0">
+            <a:spAutoFit/>
+          </a:bodyPr>
+          <a:lstStyle/>
+          <a:p>
+            <a:r>
+              <a:rPr lang="en-US" sz="1000" dirty="0" smtClean="0">
+                <a:solidFill>
+                  <a:schemeClr val="bg1">
+                    <a:lumMod val="50000"/>
+                  </a:schemeClr>
+                </a:solidFill>
+              </a:rPr>
+              <a:t>© iQuest </a:t>
+            </a:r>
+            <a:r>
+              <a:rPr lang="en-US" sz="1000" dirty="0" smtClean="0">
+                <a:solidFill>
+                  <a:schemeClr val="bg1">
+                    <a:lumMod val="50000"/>
+                  </a:schemeClr>
+                </a:solidFill>
+              </a:rPr>
+              <a:t>Group 2013. All rights reserved.</a:t>
+            </a:r>
+            <a:endParaRPr lang="en-US" sz="1000" dirty="0" smtClean="0">
+              <a:solidFill>
+                <a:schemeClr val="bg1">
+                  <a:lumMod val="50000"/>
+                </a:schemeClr>
+              </a:solidFill>
+            </a:endParaRPr>
           </a:p>
         </p:txBody>
       </p:sp>
@@ -7301,6 +7514,60 @@
           </a:p>
         </p:txBody>
       </p:sp>
+      <p:sp>
+        <p:nvSpPr>
+          <p:cNvPr id="9" name="TextBox 8"/>
+          <p:cNvSpPr txBox="1"/>
+          <p:nvPr/>
+        </p:nvSpPr>
+        <p:spPr>
+          <a:xfrm>
+            <a:off x="3352800" y="6459379"/>
+            <a:ext cx="2518638" cy="246221"/>
+          </a:xfrm>
+          <a:prstGeom prst="rect">
+            <a:avLst/>
+          </a:prstGeom>
+          <a:solidFill>
+            <a:schemeClr val="bg1"/>
+          </a:solidFill>
+        </p:spPr>
+        <p:txBody>
+          <a:bodyPr wrap="none" rtlCol="0">
+            <a:spAutoFit/>
+          </a:bodyPr>
+          <a:lstStyle/>
+          <a:p>
+            <a:r>
+              <a:rPr lang="en-US" sz="1000" dirty="0" smtClean="0">
+                <a:solidFill>
+                  <a:schemeClr val="bg1">
+                    <a:lumMod val="50000"/>
+                  </a:schemeClr>
+                </a:solidFill>
+              </a:rPr>
+              <a:t>© iQuest </a:t>
+            </a:r>
+            <a:r>
+              <a:rPr lang="en-US" sz="1000" dirty="0" smtClean="0">
+                <a:solidFill>
+                  <a:schemeClr val="bg1">
+                    <a:lumMod val="50000"/>
+                  </a:schemeClr>
+                </a:solidFill>
+              </a:rPr>
+              <a:t>Group 2013. All rights reserved.</a:t>
+            </a:r>
+            <a:endParaRPr lang="en-US" sz="1000" dirty="0" smtClean="0">
+              <a:solidFill>
+                <a:schemeClr val="bg1">
+                  <a:lumMod val="50000"/>
+                </a:schemeClr>
+              </a:solidFill>
+            </a:endParaRPr>
+          </a:p>
+        </p:txBody>
+      </p:sp>
     </p:spTree>
     <p:extLst>
       <p:ext uri="{BB962C8B-B14F-4D97-AF65-F5344CB8AC3E}">
@@ -7631,6 +7898,60 @@
           </a:extLst>
         </p:spPr>
       </p:pic>
+      <p:sp>
+        <p:nvSpPr>
+          <p:cNvPr id="9" name="TextBox 8"/>
+          <p:cNvSpPr txBox="1"/>
+          <p:nvPr/>
+        </p:nvSpPr>
+        <p:spPr>
+          <a:xfrm>
+            <a:off x="3352800" y="6459379"/>
+            <a:ext cx="2518638" cy="246221"/>
+          </a:xfrm>
+          <a:prstGeom prst="rect">
+            <a:avLst/>
+          </a:prstGeom>
+          <a:solidFill>
+            <a:schemeClr val="bg1"/>
+          </a:solidFill>
+        </p:spPr>
+        <p:txBody>
+          <a:bodyPr wrap="none" rtlCol="0">
+            <a:spAutoFit/>
+          </a:bodyPr>
+          <a:lstStyle/>
+          <a:p>
+            <a:r>
+              <a:rPr lang="en-US" sz="1000" dirty="0" smtClean="0">
+                <a:solidFill>
+                  <a:schemeClr val="bg1">
+                    <a:lumMod val="50000"/>
+                  </a:schemeClr>
+                </a:solidFill>
+              </a:rPr>
+              <a:t>© iQuest </a:t>
+            </a:r>
+            <a:r>
+              <a:rPr lang="en-US" sz="1000" dirty="0" smtClean="0">
+                <a:solidFill>
+                  <a:schemeClr val="bg1">
+                    <a:lumMod val="50000"/>
+                  </a:schemeClr>
+                </a:solidFill>
+              </a:rPr>
+              <a:t>Group 2013. All rights reserved.</a:t>
+            </a:r>
+            <a:endParaRPr lang="en-US" sz="1000" dirty="0" smtClean="0">
+              <a:solidFill>
+                <a:schemeClr val="bg1">
+                  <a:lumMod val="50000"/>
+                </a:schemeClr>
+              </a:solidFill>
+            </a:endParaRPr>
+          </a:p>
+        </p:txBody>
+      </p:sp>
     </p:spTree>
     <p:extLst>
       <p:ext uri="{BB962C8B-B14F-4D97-AF65-F5344CB8AC3E}">
@@ -8018,6 +8339,60 @@
           </a:extLst>
         </p:spPr>
       </p:pic>
+      <p:sp>
+        <p:nvSpPr>
+          <p:cNvPr id="5" name="TextBox 4"/>
+          <p:cNvSpPr txBox="1"/>
+          <p:nvPr/>
+        </p:nvSpPr>
+        <p:spPr>
+          <a:xfrm>
+            <a:off x="3352800" y="6459379"/>
+            <a:ext cx="2518638" cy="246221"/>
+          </a:xfrm>
+          <a:prstGeom prst="rect">
+            <a:avLst/>
+          </a:prstGeom>
+          <a:solidFill>
+            <a:schemeClr val="bg1"/>
+          </a:solidFill>
+        </p:spPr>
+        <p:txBody>
+          <a:bodyPr wrap="none" rtlCol="0">
+            <a:spAutoFit/>
+          </a:bodyPr>
+          <a:lstStyle/>
+          <a:p>
+            <a:r>
+              <a:rPr lang="en-US" sz="1000" dirty="0" smtClean="0">
+                <a:solidFill>
+                  <a:schemeClr val="bg1">
+                    <a:lumMod val="50000"/>
+                  </a:schemeClr>
+                </a:solidFill>
+              </a:rPr>
+              <a:t>© iQuest </a:t>
+            </a:r>
+            <a:r>
+              <a:rPr lang="en-US" sz="1000" dirty="0" smtClean="0">
+                <a:solidFill>
+                  <a:schemeClr val="bg1">
+                    <a:lumMod val="50000"/>
+                  </a:schemeClr>
+                </a:solidFill>
+              </a:rPr>
+              <a:t>Group 2013. All rights reserved.</a:t>
+            </a:r>
+            <a:endParaRPr lang="en-US" sz="1000" dirty="0" smtClean="0">
+              <a:solidFill>
+                <a:schemeClr val="bg1">
+                  <a:lumMod val="50000"/>
+                </a:schemeClr>
+              </a:solidFill>
+            </a:endParaRPr>
+          </a:p>
+        </p:txBody>
+      </p:sp>
     </p:spTree>
     <p:extLst>
       <p:ext uri="{BB962C8B-B14F-4D97-AF65-F5344CB8AC3E}">
@@ -8202,6 +8577,60 @@
           </a:extLst>
         </p:spPr>
       </p:pic>
+      <p:sp>
+        <p:nvSpPr>
+          <p:cNvPr id="5" name="TextBox 4"/>
+          <p:cNvSpPr txBox="1"/>
+          <p:nvPr/>
+        </p:nvSpPr>
+        <p:spPr>
+          <a:xfrm>
+            <a:off x="3352800" y="6459379"/>
+            <a:ext cx="2518638" cy="246221"/>
+          </a:xfrm>
+          <a:prstGeom prst="rect">
+            <a:avLst/>
+          </a:prstGeom>
+          <a:solidFill>
+            <a:schemeClr val="bg1"/>
+          </a:solidFill>
+        </p:spPr>
+        <p:txBody>
+          <a:bodyPr wrap="none" rtlCol="0">
+            <a:spAutoFit/>
+          </a:bodyPr>
+          <a:lstStyle/>
+          <a:p>
+            <a:r>
+              <a:rPr lang="en-US" sz="1000" dirty="0" smtClean="0">
+                <a:solidFill>
+                  <a:schemeClr val="bg1">
+                    <a:lumMod val="50000"/>
+                  </a:schemeClr>
+                </a:solidFill>
+              </a:rPr>
+              <a:t>© iQuest </a:t>
+            </a:r>
+            <a:r>
+              <a:rPr lang="en-US" sz="1000" dirty="0" smtClean="0">
+                <a:solidFill>
+                  <a:schemeClr val="bg1">
+                    <a:lumMod val="50000"/>
+                  </a:schemeClr>
+                </a:solidFill>
+              </a:rPr>
+              <a:t>Group 2013. All rights reserved.</a:t>
+            </a:r>
+            <a:endParaRPr lang="en-US" sz="1000" dirty="0" smtClean="0">
+              <a:solidFill>
+                <a:schemeClr val="bg1">
+                  <a:lumMod val="50000"/>
+                </a:schemeClr>
+              </a:solidFill>
+            </a:endParaRPr>
+          </a:p>
+        </p:txBody>
+      </p:sp>
     </p:spTree>
     <p:extLst>
       <p:ext uri="{BB962C8B-B14F-4D97-AF65-F5344CB8AC3E}">
@@ -8388,6 +8817,60 @@
           </a:p>
         </p:txBody>
       </p:sp>
+      <p:sp>
+        <p:nvSpPr>
+          <p:cNvPr id="6" name="TextBox 5"/>
+          <p:cNvSpPr txBox="1"/>
+          <p:nvPr/>
+        </p:nvSpPr>
+        <p:spPr>
+          <a:xfrm>
+            <a:off x="3352800" y="6459379"/>
+            <a:ext cx="2518638" cy="246221"/>
+          </a:xfrm>
+          <a:prstGeom prst="rect">
+            <a:avLst/>
+          </a:prstGeom>
+          <a:solidFill>
+            <a:schemeClr val="bg1"/>
+          </a:solidFill>
+        </p:spPr>
+        <p:txBody>
+          <a:bodyPr wrap="none" rtlCol="0">
+            <a:spAutoFit/>
+          </a:bodyPr>
+          <a:lstStyle/>
+          <a:p>
+            <a:r>
+              <a:rPr lang="en-US" sz="1000" dirty="0" smtClean="0">
+                <a:solidFill>
+                  <a:schemeClr val="bg1">
+                    <a:lumMod val="50000"/>
+                  </a:schemeClr>
+                </a:solidFill>
+              </a:rPr>
+              <a:t>© iQuest </a:t>
+            </a:r>
+            <a:r>
+              <a:rPr lang="en-US" sz="1000" dirty="0" smtClean="0">
+                <a:solidFill>
+                  <a:schemeClr val="bg1">
+                    <a:lumMod val="50000"/>
+                  </a:schemeClr>
+                </a:solidFill>
+              </a:rPr>
+              <a:t>Group 2013. All rights reserved.</a:t>
+            </a:r>
+            <a:endParaRPr lang="en-US" sz="1000" dirty="0" smtClean="0">
+              <a:solidFill>
+                <a:schemeClr val="bg1">
+                  <a:lumMod val="50000"/>
+                </a:schemeClr>
+              </a:solidFill>
+            </a:endParaRPr>
+          </a:p>
+        </p:txBody>
+      </p:sp>
     </p:spTree>
     <p:extLst>
       <p:ext uri="{BB962C8B-B14F-4D97-AF65-F5344CB8AC3E}">
@@ -8553,6 +9036,60 @@
           </a:extLst>
         </p:spPr>
       </p:pic>
+      <p:sp>
+        <p:nvSpPr>
+          <p:cNvPr id="6" name="TextBox 5"/>
+          <p:cNvSpPr txBox="1"/>
+          <p:nvPr/>
+        </p:nvSpPr>
+        <p:spPr>
+          <a:xfrm>
+            <a:off x="3352800" y="6459379"/>
+            <a:ext cx="2518638" cy="246221"/>
+          </a:xfrm>
+          <a:prstGeom prst="rect">
+            <a:avLst/>
+          </a:prstGeom>
+          <a:solidFill>
+            <a:schemeClr val="bg1"/>
+          </a:solidFill>
+        </p:spPr>
+        <p:txBody>
+          <a:bodyPr wrap="none" rtlCol="0">
+            <a:spAutoFit/>
+          </a:bodyPr>
+          <a:lstStyle/>
+          <a:p>
+            <a:r>
+              <a:rPr lang="en-US" sz="1000" dirty="0" smtClean="0">
+                <a:solidFill>
+                  <a:schemeClr val="bg1">
+                    <a:lumMod val="50000"/>
+                  </a:schemeClr>
+                </a:solidFill>
+              </a:rPr>
+              <a:t>© iQuest </a:t>
+            </a:r>
+            <a:r>
+              <a:rPr lang="en-US" sz="1000" dirty="0" smtClean="0">
+                <a:solidFill>
+                  <a:schemeClr val="bg1">
+                    <a:lumMod val="50000"/>
+                  </a:schemeClr>
+                </a:solidFill>
+              </a:rPr>
+              <a:t>Group 2013. All rights reserved.</a:t>
+            </a:r>
+            <a:endParaRPr lang="en-US" sz="1000" dirty="0" smtClean="0">
+              <a:solidFill>
+                <a:schemeClr val="bg1">
+                  <a:lumMod val="50000"/>
+                </a:schemeClr>
+              </a:solidFill>
+            </a:endParaRPr>
+          </a:p>
+        </p:txBody>
+      </p:sp>
     </p:spTree>
     <p:extLst>
       <p:ext uri="{BB962C8B-B14F-4D97-AF65-F5344CB8AC3E}">
@@ -8772,6 +9309,60 @@
               <a:solidFill>
                 <a:schemeClr val="bg1">
                   <a:lumMod val="75000"/>
+                </a:schemeClr>
+              </a:solidFill>
+            </a:endParaRPr>
+          </a:p>
+        </p:txBody>
+      </p:sp>
+      <p:sp>
+        <p:nvSpPr>
+          <p:cNvPr id="7" name="TextBox 6"/>
+          <p:cNvSpPr txBox="1"/>
+          <p:nvPr/>
+        </p:nvSpPr>
+        <p:spPr>
+          <a:xfrm>
+            <a:off x="3352800" y="6459379"/>
+            <a:ext cx="2518638" cy="246221"/>
+          </a:xfrm>
+          <a:prstGeom prst="rect">
+            <a:avLst/>
+          </a:prstGeom>
+          <a:solidFill>
+            <a:schemeClr val="bg1"/>
+          </a:solidFill>
+        </p:spPr>
+        <p:txBody>
+          <a:bodyPr wrap="none" rtlCol="0">
+            <a:spAutoFit/>
+          </a:bodyPr>
+          <a:lstStyle/>
+          <a:p>
+            <a:r>
+              <a:rPr lang="en-US" sz="1000" dirty="0" smtClean="0">
+                <a:solidFill>
+                  <a:schemeClr val="bg1">
+                    <a:lumMod val="50000"/>
+                  </a:schemeClr>
+                </a:solidFill>
+              </a:rPr>
+              <a:t>© iQuest </a:t>
+            </a:r>
+            <a:r>
+              <a:rPr lang="en-US" sz="1000" dirty="0" smtClean="0">
+                <a:solidFill>
+                  <a:schemeClr val="bg1">
+                    <a:lumMod val="50000"/>
+                  </a:schemeClr>
+                </a:solidFill>
+              </a:rPr>
+              <a:t>Group 2013. All rights reserved.</a:t>
+            </a:r>
+            <a:endParaRPr lang="en-US" sz="1000" dirty="0" smtClean="0">
+              <a:solidFill>
+                <a:schemeClr val="bg1">
+                  <a:lumMod val="50000"/>
                 </a:schemeClr>
               </a:solidFill>
             </a:endParaRPr>
@@ -8908,6 +9499,121 @@
           </a:p>
         </p:txBody>
       </p:sp>
+      <p:sp>
+        <p:nvSpPr>
+          <p:cNvPr id="2" name="TextBox 1"/>
+          <p:cNvSpPr txBox="1"/>
+          <p:nvPr/>
+        </p:nvSpPr>
+        <p:spPr>
+          <a:xfrm>
+            <a:off x="3352800" y="6459379"/>
+            <a:ext cx="2518638" cy="246221"/>
+          </a:xfrm>
+          <a:prstGeom prst="rect">
+            <a:avLst/>
+          </a:prstGeom>
+          <a:solidFill>
+            <a:schemeClr val="bg1"/>
+          </a:solidFill>
+        </p:spPr>
+        <p:txBody>
+          <a:bodyPr wrap="none" rtlCol="0">
+            <a:spAutoFit/>
+          </a:bodyPr>
+          <a:lstStyle/>
+          <a:p>
+            <a:r>
+              <a:rPr lang="en-US" sz="1000" dirty="0" smtClean="0">
+                <a:solidFill>
+                  <a:schemeClr val="bg1">
+                    <a:lumMod val="50000"/>
+                  </a:schemeClr>
+                </a:solidFill>
+              </a:rPr>
+              <a:t>© iQuest </a:t>
+            </a:r>
+            <a:r>
+              <a:rPr lang="en-US" sz="1000" dirty="0" smtClean="0">
+                <a:solidFill>
+                  <a:schemeClr val="bg1">
+                    <a:lumMod val="50000"/>
+                  </a:schemeClr>
+                </a:solidFill>
+              </a:rPr>
+              <a:t>Group 2013. All rights reserved.</a:t>
+            </a:r>
+            <a:endParaRPr lang="en-US" sz="1000" dirty="0" smtClean="0">
+              <a:solidFill>
+                <a:schemeClr val="bg1">
+                  <a:lumMod val="50000"/>
+                </a:schemeClr>
+              </a:solidFill>
+            </a:endParaRPr>
+          </a:p>
+        </p:txBody>
+      </p:sp>
+      <p:sp>
+        <p:nvSpPr>
+          <p:cNvPr id="5" name="Flowchart: Process 4"/>
+          <p:cNvSpPr/>
+          <p:nvPr/>
+        </p:nvSpPr>
+        <p:spPr bwMode="auto">
+          <a:xfrm>
+            <a:off x="2895600" y="6065186"/>
+            <a:ext cx="914400" cy="612648"/>
+          </a:xfrm>
+          <a:prstGeom prst="flowChartProcess">
+            <a:avLst/>
+          </a:prstGeom>
+          <a:noFill/>
+          <a:ln w="9525" cap="flat" cmpd="sng" algn="ctr">
+            <a:noFill/>
+            <a:prstDash val="solid"/>
+            <a:round/>
+            <a:headEnd type="none" w="med" len="med"/>
+            <a:tailEnd type="none" w="med" len="med"/>
+          </a:ln>
+          <a:effectLst/>
+        </p:spPr>
+        <p:txBody>
+          <a:bodyPr vert="horz" wrap="none" lIns="91440" tIns="45720" rIns="91440" bIns="45720" numCol="1" rtlCol="0" anchor="ctr" anchorCtr="0" compatLnSpc="1">
+            <a:prstTxWarp prst="textNoShape">
+              <a:avLst/>
+            </a:prstTxWarp>
+          </a:bodyPr>
+          <a:lstStyle/>
+          <a:p>
+            <a:pPr marL="0" marR="0" indent="0" algn="ctr" defTabSz="914400" rtl="0" eaLnBrk="1" fontAlgn="base" latinLnBrk="0" hangingPunct="1">
+              <a:lnSpc>
+                <a:spcPct val="100000"/>
+              </a:lnSpc>
+              <a:spcBef>
+                <a:spcPct val="0"/>
+              </a:spcBef>
+              <a:spcAft>
+                <a:spcPct val="0"/>
+              </a:spcAft>
+              <a:buClrTx/>
+              <a:buSzTx/>
+              <a:buFontTx/>
+              <a:buNone/>
+              <a:tabLst/>
+            </a:pPr>
+            <a:endParaRPr kumimoji="0" lang="en-US" sz="2000" b="0" i="0" u="none" strike="noStrike" cap="none" normalizeH="0" baseline="0" smtClean="0">
+              <a:ln>
+                <a:noFill/>
+              </a:ln>
+              <a:solidFill>
+                <a:srgbClr val="3E5A84"/>
+              </a:solidFill>
+              <a:effectLst/>
+              <a:latin typeface="Arial" charset="0"/>
+            </a:endParaRPr>
+          </a:p>
+        </p:txBody>
+      </p:sp>
     </p:spTree>
   </p:cSld>
   <p:clrMapOvr>
@@ -9043,6 +9749,60 @@
               <a:rPr lang="ro-RO" altLang="en-US" sz="2400" dirty="0" smtClean="0"/>
               <a:t>Adapter Pattern</a:t>
             </a:r>
+          </a:p>
+        </p:txBody>
+      </p:sp>
+      <p:sp>
+        <p:nvSpPr>
+          <p:cNvPr id="4" name="TextBox 3"/>
+          <p:cNvSpPr txBox="1"/>
+          <p:nvPr/>
+        </p:nvSpPr>
+        <p:spPr>
+          <a:xfrm>
+            <a:off x="3352800" y="6459379"/>
+            <a:ext cx="2518638" cy="246221"/>
+          </a:xfrm>
+          <a:prstGeom prst="rect">
+            <a:avLst/>
+          </a:prstGeom>
+          <a:solidFill>
+            <a:schemeClr val="bg1"/>
+          </a:solidFill>
+        </p:spPr>
+        <p:txBody>
+          <a:bodyPr wrap="none" rtlCol="0">
+            <a:spAutoFit/>
+          </a:bodyPr>
+          <a:lstStyle/>
+          <a:p>
+            <a:r>
+              <a:rPr lang="en-US" sz="1000" dirty="0" smtClean="0">
+                <a:solidFill>
+                  <a:schemeClr val="bg1">
+                    <a:lumMod val="50000"/>
+                  </a:schemeClr>
+                </a:solidFill>
+              </a:rPr>
+              <a:t>© iQuest </a:t>
+            </a:r>
+            <a:r>
+              <a:rPr lang="en-US" sz="1000" dirty="0" smtClean="0">
+                <a:solidFill>
+                  <a:schemeClr val="bg1">
+                    <a:lumMod val="50000"/>
+                  </a:schemeClr>
+                </a:solidFill>
+              </a:rPr>
+              <a:t>Group 2013. All rights reserved.</a:t>
+            </a:r>
+            <a:endParaRPr lang="en-US" sz="1000" dirty="0" smtClean="0">
+              <a:solidFill>
+                <a:schemeClr val="bg1">
+                  <a:lumMod val="50000"/>
+                </a:schemeClr>
+              </a:solidFill>
+            </a:endParaRPr>
           </a:p>
         </p:txBody>
       </p:sp>
@@ -9442,6 +10202,60 @@
               <a:solidFill>
                 <a:schemeClr val="bg1">
                   <a:lumMod val="75000"/>
+                </a:schemeClr>
+              </a:solidFill>
+            </a:endParaRPr>
+          </a:p>
+        </p:txBody>
+      </p:sp>
+      <p:sp>
+        <p:nvSpPr>
+          <p:cNvPr id="6" name="TextBox 5"/>
+          <p:cNvSpPr txBox="1"/>
+          <p:nvPr/>
+        </p:nvSpPr>
+        <p:spPr>
+          <a:xfrm>
+            <a:off x="3352800" y="6459379"/>
+            <a:ext cx="2518638" cy="246221"/>
+          </a:xfrm>
+          <a:prstGeom prst="rect">
+            <a:avLst/>
+          </a:prstGeom>
+          <a:solidFill>
+            <a:schemeClr val="bg1"/>
+          </a:solidFill>
+        </p:spPr>
+        <p:txBody>
+          <a:bodyPr wrap="none" rtlCol="0">
+            <a:spAutoFit/>
+          </a:bodyPr>
+          <a:lstStyle/>
+          <a:p>
+            <a:r>
+              <a:rPr lang="en-US" sz="1000" dirty="0" smtClean="0">
+                <a:solidFill>
+                  <a:schemeClr val="bg1">
+                    <a:lumMod val="50000"/>
+                  </a:schemeClr>
+                </a:solidFill>
+              </a:rPr>
+              <a:t>© iQuest </a:t>
+            </a:r>
+            <a:r>
+              <a:rPr lang="en-US" sz="1000" dirty="0" smtClean="0">
+                <a:solidFill>
+                  <a:schemeClr val="bg1">
+                    <a:lumMod val="50000"/>
+                  </a:schemeClr>
+                </a:solidFill>
+              </a:rPr>
+              <a:t>Group 2013. All rights reserved.</a:t>
+            </a:r>
+            <a:endParaRPr lang="en-US" sz="1000" dirty="0" smtClean="0">
+              <a:solidFill>
+                <a:schemeClr val="bg1">
+                  <a:lumMod val="50000"/>
                 </a:schemeClr>
               </a:solidFill>
             </a:endParaRPr>
@@ -9869,11 +10683,7 @@
           <a:p>
             <a:r>
               <a:rPr lang="en-US" sz="1600" dirty="0" smtClean="0"/>
-              <a:t>We cannot, but we can </a:t>
-            </a:r>
-            <a:r>
-              <a:rPr lang="en-US" sz="1600" dirty="0" smtClean="0"/>
-              <a:t>emulate them.</a:t>
+              <a:t>We cannot, but we can emulate them.</a:t>
             </a:r>
             <a:endParaRPr lang="en-US" sz="1600" dirty="0" smtClean="0">
               <a:latin typeface="Courier New" panose="02070309020205020404" pitchFamily="49" charset="0"/>
@@ -9949,6 +10759,60 @@
               <a:solidFill>
                 <a:schemeClr val="bg1">
                   <a:lumMod val="75000"/>
+                </a:schemeClr>
+              </a:solidFill>
+            </a:endParaRPr>
+          </a:p>
+        </p:txBody>
+      </p:sp>
+      <p:sp>
+        <p:nvSpPr>
+          <p:cNvPr id="6" name="TextBox 5"/>
+          <p:cNvSpPr txBox="1"/>
+          <p:nvPr/>
+        </p:nvSpPr>
+        <p:spPr>
+          <a:xfrm>
+            <a:off x="3352800" y="6459379"/>
+            <a:ext cx="2518638" cy="246221"/>
+          </a:xfrm>
+          <a:prstGeom prst="rect">
+            <a:avLst/>
+          </a:prstGeom>
+          <a:solidFill>
+            <a:schemeClr val="bg1"/>
+          </a:solidFill>
+        </p:spPr>
+        <p:txBody>
+          <a:bodyPr wrap="none" rtlCol="0">
+            <a:spAutoFit/>
+          </a:bodyPr>
+          <a:lstStyle/>
+          <a:p>
+            <a:r>
+              <a:rPr lang="en-US" sz="1000" dirty="0" smtClean="0">
+                <a:solidFill>
+                  <a:schemeClr val="bg1">
+                    <a:lumMod val="50000"/>
+                  </a:schemeClr>
+                </a:solidFill>
+              </a:rPr>
+              <a:t>© iQuest </a:t>
+            </a:r>
+            <a:r>
+              <a:rPr lang="en-US" sz="1000" dirty="0" smtClean="0">
+                <a:solidFill>
+                  <a:schemeClr val="bg1">
+                    <a:lumMod val="50000"/>
+                  </a:schemeClr>
+                </a:solidFill>
+              </a:rPr>
+              <a:t>Group 2013. All rights reserved.</a:t>
+            </a:r>
+            <a:endParaRPr lang="en-US" sz="1000" dirty="0" smtClean="0">
+              <a:solidFill>
+                <a:schemeClr val="bg1">
+                  <a:lumMod val="50000"/>
                 </a:schemeClr>
               </a:solidFill>
             </a:endParaRPr>
@@ -10385,6 +11249,60 @@
           </a:p>
         </p:txBody>
       </p:sp>
+      <p:sp>
+        <p:nvSpPr>
+          <p:cNvPr id="5" name="TextBox 4"/>
+          <p:cNvSpPr txBox="1"/>
+          <p:nvPr/>
+        </p:nvSpPr>
+        <p:spPr>
+          <a:xfrm>
+            <a:off x="3352800" y="6459379"/>
+            <a:ext cx="2518638" cy="246221"/>
+          </a:xfrm>
+          <a:prstGeom prst="rect">
+            <a:avLst/>
+          </a:prstGeom>
+          <a:solidFill>
+            <a:schemeClr val="bg1"/>
+          </a:solidFill>
+        </p:spPr>
+        <p:txBody>
+          <a:bodyPr wrap="none" rtlCol="0">
+            <a:spAutoFit/>
+          </a:bodyPr>
+          <a:lstStyle/>
+          <a:p>
+            <a:r>
+              <a:rPr lang="en-US" sz="1000" dirty="0" smtClean="0">
+                <a:solidFill>
+                  <a:schemeClr val="bg1">
+                    <a:lumMod val="50000"/>
+                  </a:schemeClr>
+                </a:solidFill>
+              </a:rPr>
+              <a:t>© iQuest </a:t>
+            </a:r>
+            <a:r>
+              <a:rPr lang="en-US" sz="1000" dirty="0" smtClean="0">
+                <a:solidFill>
+                  <a:schemeClr val="bg1">
+                    <a:lumMod val="50000"/>
+                  </a:schemeClr>
+                </a:solidFill>
+              </a:rPr>
+              <a:t>Group 2013. All rights reserved.</a:t>
+            </a:r>
+            <a:endParaRPr lang="en-US" sz="1000" dirty="0" smtClean="0">
+              <a:solidFill>
+                <a:schemeClr val="bg1">
+                  <a:lumMod val="50000"/>
+                </a:schemeClr>
+              </a:solidFill>
+            </a:endParaRPr>
+          </a:p>
+        </p:txBody>
+      </p:sp>
     </p:spTree>
     <p:extLst>
       <p:ext uri="{BB962C8B-B14F-4D97-AF65-F5344CB8AC3E}">
@@ -10626,29 +11544,13 @@
           <a:p>
             <a:r>
               <a:rPr lang="en-US" sz="1600" dirty="0" smtClean="0"/>
-              <a:t>1. Create </a:t>
-            </a:r>
+              <a:t>1. Create all as public;</a:t>
+            </a:r>
+          </a:p>
+          <a:p>
             <a:r>
               <a:rPr lang="en-US" sz="1600" dirty="0" smtClean="0"/>
-              <a:t>all </a:t>
-            </a:r>
-            <a:r>
-              <a:rPr lang="en-US" sz="1600" dirty="0" smtClean="0"/>
-              <a:t>as public;</a:t>
-            </a:r>
-          </a:p>
-          <a:p>
-            <a:r>
-              <a:rPr lang="en-US" sz="1600" dirty="0" smtClean="0"/>
-              <a:t>2.</a:t>
-            </a:r>
-            <a:r>
-              <a:rPr lang="en-US" sz="1600" dirty="0" smtClean="0"/>
-              <a:t> Use </a:t>
-            </a:r>
-            <a:r>
-              <a:rPr lang="en-US" sz="1600" dirty="0" smtClean="0"/>
-              <a:t>a </a:t>
+              <a:t>2. Use a </a:t>
             </a:r>
             <a:r>
               <a:rPr lang="en-US" sz="1600" b="1" dirty="0" smtClean="0"/>
@@ -10694,6 +11596,60 @@
               </a:rPr>
               <a:t>();</a:t>
             </a:r>
+          </a:p>
+        </p:txBody>
+      </p:sp>
+      <p:sp>
+        <p:nvSpPr>
+          <p:cNvPr id="7" name="TextBox 6"/>
+          <p:cNvSpPr txBox="1"/>
+          <p:nvPr/>
+        </p:nvSpPr>
+        <p:spPr>
+          <a:xfrm>
+            <a:off x="3352800" y="6459379"/>
+            <a:ext cx="2518638" cy="246221"/>
+          </a:xfrm>
+          <a:prstGeom prst="rect">
+            <a:avLst/>
+          </a:prstGeom>
+          <a:solidFill>
+            <a:schemeClr val="bg1"/>
+          </a:solidFill>
+        </p:spPr>
+        <p:txBody>
+          <a:bodyPr wrap="none" rtlCol="0">
+            <a:spAutoFit/>
+          </a:bodyPr>
+          <a:lstStyle/>
+          <a:p>
+            <a:r>
+              <a:rPr lang="en-US" sz="1000" dirty="0" smtClean="0">
+                <a:solidFill>
+                  <a:schemeClr val="bg1">
+                    <a:lumMod val="50000"/>
+                  </a:schemeClr>
+                </a:solidFill>
+              </a:rPr>
+              <a:t>© iQuest </a:t>
+            </a:r>
+            <a:r>
+              <a:rPr lang="en-US" sz="1000" dirty="0" smtClean="0">
+                <a:solidFill>
+                  <a:schemeClr val="bg1">
+                    <a:lumMod val="50000"/>
+                  </a:schemeClr>
+                </a:solidFill>
+              </a:rPr>
+              <a:t>Group 2013. All rights reserved.</a:t>
+            </a:r>
+            <a:endParaRPr lang="en-US" sz="1000" dirty="0" smtClean="0">
+              <a:solidFill>
+                <a:schemeClr val="bg1">
+                  <a:lumMod val="50000"/>
+                </a:schemeClr>
+              </a:solidFill>
+            </a:endParaRPr>
           </a:p>
         </p:txBody>
       </p:sp>
@@ -10953,6 +11909,60 @@
           </a:p>
         </p:txBody>
       </p:sp>
+      <p:sp>
+        <p:nvSpPr>
+          <p:cNvPr id="5" name="TextBox 4"/>
+          <p:cNvSpPr txBox="1"/>
+          <p:nvPr/>
+        </p:nvSpPr>
+        <p:spPr>
+          <a:xfrm>
+            <a:off x="3352800" y="6459379"/>
+            <a:ext cx="2518638" cy="246221"/>
+          </a:xfrm>
+          <a:prstGeom prst="rect">
+            <a:avLst/>
+          </a:prstGeom>
+          <a:solidFill>
+            <a:schemeClr val="bg1"/>
+          </a:solidFill>
+        </p:spPr>
+        <p:txBody>
+          <a:bodyPr wrap="none" rtlCol="0">
+            <a:spAutoFit/>
+          </a:bodyPr>
+          <a:lstStyle/>
+          <a:p>
+            <a:r>
+              <a:rPr lang="en-US" sz="1000" dirty="0" smtClean="0">
+                <a:solidFill>
+                  <a:schemeClr val="bg1">
+                    <a:lumMod val="50000"/>
+                  </a:schemeClr>
+                </a:solidFill>
+              </a:rPr>
+              <a:t>© iQuest </a:t>
+            </a:r>
+            <a:r>
+              <a:rPr lang="en-US" sz="1000" dirty="0" smtClean="0">
+                <a:solidFill>
+                  <a:schemeClr val="bg1">
+                    <a:lumMod val="50000"/>
+                  </a:schemeClr>
+                </a:solidFill>
+              </a:rPr>
+              <a:t>Group 2013. All rights reserved.</a:t>
+            </a:r>
+            <a:endParaRPr lang="en-US" sz="1000" dirty="0" smtClean="0">
+              <a:solidFill>
+                <a:schemeClr val="bg1">
+                  <a:lumMod val="50000"/>
+                </a:schemeClr>
+              </a:solidFill>
+            </a:endParaRPr>
+          </a:p>
+        </p:txBody>
+      </p:sp>
     </p:spTree>
     <p:extLst>
       <p:ext uri="{BB962C8B-B14F-4D97-AF65-F5344CB8AC3E}">
@@ -11093,6 +12103,60 @@
               <a:rPr lang="ro-RO" altLang="en-US" sz="2400" b="1" dirty="0" smtClean="0"/>
               <a:t>Adapter Pattern</a:t>
             </a:r>
+          </a:p>
+        </p:txBody>
+      </p:sp>
+      <p:sp>
+        <p:nvSpPr>
+          <p:cNvPr id="4" name="TextBox 3"/>
+          <p:cNvSpPr txBox="1"/>
+          <p:nvPr/>
+        </p:nvSpPr>
+        <p:spPr>
+          <a:xfrm>
+            <a:off x="3352800" y="6459379"/>
+            <a:ext cx="2518638" cy="246221"/>
+          </a:xfrm>
+          <a:prstGeom prst="rect">
+            <a:avLst/>
+          </a:prstGeom>
+          <a:solidFill>
+            <a:schemeClr val="bg1"/>
+          </a:solidFill>
+        </p:spPr>
+        <p:txBody>
+          <a:bodyPr wrap="none" rtlCol="0">
+            <a:spAutoFit/>
+          </a:bodyPr>
+          <a:lstStyle/>
+          <a:p>
+            <a:r>
+              <a:rPr lang="en-US" sz="1000" dirty="0" smtClean="0">
+                <a:solidFill>
+                  <a:schemeClr val="bg1">
+                    <a:lumMod val="50000"/>
+                  </a:schemeClr>
+                </a:solidFill>
+              </a:rPr>
+              <a:t>© iQuest </a:t>
+            </a:r>
+            <a:r>
+              <a:rPr lang="en-US" sz="1000" dirty="0" smtClean="0">
+                <a:solidFill>
+                  <a:schemeClr val="bg1">
+                    <a:lumMod val="50000"/>
+                  </a:schemeClr>
+                </a:solidFill>
+              </a:rPr>
+              <a:t>Group 2013. All rights reserved.</a:t>
+            </a:r>
+            <a:endParaRPr lang="en-US" sz="1000" dirty="0" smtClean="0">
+              <a:solidFill>
+                <a:schemeClr val="bg1">
+                  <a:lumMod val="50000"/>
+                </a:schemeClr>
+              </a:solidFill>
+            </a:endParaRPr>
           </a:p>
         </p:txBody>
       </p:sp>
@@ -12007,6 +13071,60 @@
               <a:t>“If it walks like a duck and it quacks like a duck then it’s a duck.”</a:t>
             </a:r>
             <a:endParaRPr lang="en-US" kern="0" dirty="0"/>
+          </a:p>
+        </p:txBody>
+      </p:sp>
+      <p:sp>
+        <p:nvSpPr>
+          <p:cNvPr id="12" name="TextBox 11"/>
+          <p:cNvSpPr txBox="1"/>
+          <p:nvPr/>
+        </p:nvSpPr>
+        <p:spPr>
+          <a:xfrm>
+            <a:off x="3352800" y="6459379"/>
+            <a:ext cx="2518638" cy="246221"/>
+          </a:xfrm>
+          <a:prstGeom prst="rect">
+            <a:avLst/>
+          </a:prstGeom>
+          <a:solidFill>
+            <a:schemeClr val="bg1"/>
+          </a:solidFill>
+        </p:spPr>
+        <p:txBody>
+          <a:bodyPr wrap="none" rtlCol="0">
+            <a:spAutoFit/>
+          </a:bodyPr>
+          <a:lstStyle/>
+          <a:p>
+            <a:r>
+              <a:rPr lang="en-US" sz="1000" dirty="0" smtClean="0">
+                <a:solidFill>
+                  <a:schemeClr val="bg1">
+                    <a:lumMod val="50000"/>
+                  </a:schemeClr>
+                </a:solidFill>
+              </a:rPr>
+              <a:t>© iQuest </a:t>
+            </a:r>
+            <a:r>
+              <a:rPr lang="en-US" sz="1000" dirty="0" smtClean="0">
+                <a:solidFill>
+                  <a:schemeClr val="bg1">
+                    <a:lumMod val="50000"/>
+                  </a:schemeClr>
+                </a:solidFill>
+              </a:rPr>
+              <a:t>Group 2013. All rights reserved.</a:t>
+            </a:r>
+            <a:endParaRPr lang="en-US" sz="1000" dirty="0" smtClean="0">
+              <a:solidFill>
+                <a:schemeClr val="bg1">
+                  <a:lumMod val="50000"/>
+                </a:schemeClr>
+              </a:solidFill>
+            </a:endParaRPr>
           </a:p>
         </p:txBody>
       </p:sp>
@@ -12512,6 +13630,60 @@
           </a:p>
         </p:txBody>
       </p:sp>
+      <p:sp>
+        <p:nvSpPr>
+          <p:cNvPr id="5" name="TextBox 4"/>
+          <p:cNvSpPr txBox="1"/>
+          <p:nvPr/>
+        </p:nvSpPr>
+        <p:spPr>
+          <a:xfrm>
+            <a:off x="3352800" y="6459379"/>
+            <a:ext cx="2518638" cy="246221"/>
+          </a:xfrm>
+          <a:prstGeom prst="rect">
+            <a:avLst/>
+          </a:prstGeom>
+          <a:solidFill>
+            <a:schemeClr val="bg1"/>
+          </a:solidFill>
+        </p:spPr>
+        <p:txBody>
+          <a:bodyPr wrap="none" rtlCol="0">
+            <a:spAutoFit/>
+          </a:bodyPr>
+          <a:lstStyle/>
+          <a:p>
+            <a:r>
+              <a:rPr lang="en-US" sz="1000" dirty="0" smtClean="0">
+                <a:solidFill>
+                  <a:schemeClr val="bg1">
+                    <a:lumMod val="50000"/>
+                  </a:schemeClr>
+                </a:solidFill>
+              </a:rPr>
+              <a:t>© iQuest </a:t>
+            </a:r>
+            <a:r>
+              <a:rPr lang="en-US" sz="1000" dirty="0" smtClean="0">
+                <a:solidFill>
+                  <a:schemeClr val="bg1">
+                    <a:lumMod val="50000"/>
+                  </a:schemeClr>
+                </a:solidFill>
+              </a:rPr>
+              <a:t>Group 2013. All rights reserved.</a:t>
+            </a:r>
+            <a:endParaRPr lang="en-US" sz="1000" dirty="0" smtClean="0">
+              <a:solidFill>
+                <a:schemeClr val="bg1">
+                  <a:lumMod val="50000"/>
+                </a:schemeClr>
+              </a:solidFill>
+            </a:endParaRPr>
+          </a:p>
+        </p:txBody>
+      </p:sp>
     </p:spTree>
     <p:extLst>
       <p:ext uri="{BB962C8B-B14F-4D97-AF65-F5344CB8AC3E}">
@@ -12684,6 +13856,60 @@
               <a:t>BioCalc</a:t>
             </a:r>
             <a:endParaRPr lang="en-US" dirty="0" smtClean="0"/>
+          </a:p>
+        </p:txBody>
+      </p:sp>
+      <p:sp>
+        <p:nvSpPr>
+          <p:cNvPr id="4" name="TextBox 3"/>
+          <p:cNvSpPr txBox="1"/>
+          <p:nvPr/>
+        </p:nvSpPr>
+        <p:spPr>
+          <a:xfrm>
+            <a:off x="3352800" y="6459379"/>
+            <a:ext cx="2518638" cy="246221"/>
+          </a:xfrm>
+          <a:prstGeom prst="rect">
+            <a:avLst/>
+          </a:prstGeom>
+          <a:solidFill>
+            <a:schemeClr val="bg1"/>
+          </a:solidFill>
+        </p:spPr>
+        <p:txBody>
+          <a:bodyPr wrap="none" rtlCol="0">
+            <a:spAutoFit/>
+          </a:bodyPr>
+          <a:lstStyle/>
+          <a:p>
+            <a:r>
+              <a:rPr lang="en-US" sz="1000" dirty="0" smtClean="0">
+                <a:solidFill>
+                  <a:schemeClr val="bg1">
+                    <a:lumMod val="50000"/>
+                  </a:schemeClr>
+                </a:solidFill>
+              </a:rPr>
+              <a:t>© iQuest </a:t>
+            </a:r>
+            <a:r>
+              <a:rPr lang="en-US" sz="1000" dirty="0" smtClean="0">
+                <a:solidFill>
+                  <a:schemeClr val="bg1">
+                    <a:lumMod val="50000"/>
+                  </a:schemeClr>
+                </a:solidFill>
+              </a:rPr>
+              <a:t>Group 2013. All rights reserved.</a:t>
+            </a:r>
+            <a:endParaRPr lang="en-US" sz="1000" dirty="0" smtClean="0">
+              <a:solidFill>
+                <a:schemeClr val="bg1">
+                  <a:lumMod val="50000"/>
+                </a:schemeClr>
+              </a:solidFill>
+            </a:endParaRPr>
           </a:p>
         </p:txBody>
       </p:sp>
@@ -13183,6 +14409,60 @@
           </a:prstGeom>
         </p:spPr>
       </p:pic>
+      <p:sp>
+        <p:nvSpPr>
+          <p:cNvPr id="11" name="TextBox 10"/>
+          <p:cNvSpPr txBox="1"/>
+          <p:nvPr/>
+        </p:nvSpPr>
+        <p:spPr>
+          <a:xfrm>
+            <a:off x="3352800" y="6459379"/>
+            <a:ext cx="2518638" cy="246221"/>
+          </a:xfrm>
+          <a:prstGeom prst="rect">
+            <a:avLst/>
+          </a:prstGeom>
+          <a:solidFill>
+            <a:schemeClr val="bg1"/>
+          </a:solidFill>
+        </p:spPr>
+        <p:txBody>
+          <a:bodyPr wrap="none" rtlCol="0">
+            <a:spAutoFit/>
+          </a:bodyPr>
+          <a:lstStyle/>
+          <a:p>
+            <a:r>
+              <a:rPr lang="en-US" sz="1000" dirty="0" smtClean="0">
+                <a:solidFill>
+                  <a:schemeClr val="bg1">
+                    <a:lumMod val="50000"/>
+                  </a:schemeClr>
+                </a:solidFill>
+              </a:rPr>
+              <a:t>© iQuest </a:t>
+            </a:r>
+            <a:r>
+              <a:rPr lang="en-US" sz="1000" dirty="0" smtClean="0">
+                <a:solidFill>
+                  <a:schemeClr val="bg1">
+                    <a:lumMod val="50000"/>
+                  </a:schemeClr>
+                </a:solidFill>
+              </a:rPr>
+              <a:t>Group 2013. All rights reserved.</a:t>
+            </a:r>
+            <a:endParaRPr lang="en-US" sz="1000" dirty="0" smtClean="0">
+              <a:solidFill>
+                <a:schemeClr val="bg1">
+                  <a:lumMod val="50000"/>
+                </a:schemeClr>
+              </a:solidFill>
+            </a:endParaRPr>
+          </a:p>
+        </p:txBody>
+      </p:sp>
     </p:spTree>
   </p:cSld>
   <p:clrMapOvr>
@@ -13800,6 +15080,60 @@
           <a:chExt cx="0" cy="0"/>
         </a:xfrm>
       </p:grpSpPr>
+      <p:sp>
+        <p:nvSpPr>
+          <p:cNvPr id="5" name="TextBox 4"/>
+          <p:cNvSpPr txBox="1"/>
+          <p:nvPr/>
+        </p:nvSpPr>
+        <p:spPr>
+          <a:xfrm>
+            <a:off x="3352800" y="6459379"/>
+            <a:ext cx="2518638" cy="246221"/>
+          </a:xfrm>
+          <a:prstGeom prst="rect">
+            <a:avLst/>
+          </a:prstGeom>
+          <a:solidFill>
+            <a:schemeClr val="bg1"/>
+          </a:solidFill>
+        </p:spPr>
+        <p:txBody>
+          <a:bodyPr wrap="none" rtlCol="0">
+            <a:spAutoFit/>
+          </a:bodyPr>
+          <a:lstStyle/>
+          <a:p>
+            <a:r>
+              <a:rPr lang="en-US" sz="1000" dirty="0" smtClean="0">
+                <a:solidFill>
+                  <a:schemeClr val="bg1">
+                    <a:lumMod val="50000"/>
+                  </a:schemeClr>
+                </a:solidFill>
+              </a:rPr>
+              <a:t>© iQuest </a:t>
+            </a:r>
+            <a:r>
+              <a:rPr lang="en-US" sz="1000" dirty="0" smtClean="0">
+                <a:solidFill>
+                  <a:schemeClr val="bg1">
+                    <a:lumMod val="50000"/>
+                  </a:schemeClr>
+                </a:solidFill>
+              </a:rPr>
+              <a:t>Group 2013. All rights reserved.</a:t>
+            </a:r>
+            <a:endParaRPr lang="en-US" sz="1000" dirty="0" smtClean="0">
+              <a:solidFill>
+                <a:schemeClr val="bg1">
+                  <a:lumMod val="50000"/>
+                </a:schemeClr>
+              </a:solidFill>
+            </a:endParaRPr>
+          </a:p>
+        </p:txBody>
+      </p:sp>
       <p:pic>
         <p:nvPicPr>
           <p:cNvPr id="4" name="Picture 3"/>
@@ -13811,15 +15145,6 @@
         <p:blipFill>
           <a:blip r:embed="rId2">
             <a:extLst>
-              <a:ext uri="{BEBA8EAE-BF5A-486C-A8C5-ECC9F3942E4B}">
-                <a14:imgProps xmlns:a14="http://schemas.microsoft.com/office/drawing/2010/main">
-                  <a14:imgLayer r:embed="rId3">
-                    <a14:imgEffect>
-                      <a14:artisticCutout/>
-                    </a14:imgEffect>
-                  </a14:imgLayer>
-                </a14:imgProps>
-              </a:ext>
               <a:ext uri="{28A0092B-C50C-407E-A947-70E740481C1C}">
                 <a14:useLocalDpi xmlns:a14="http://schemas.microsoft.com/office/drawing/2010/main" val="0"/>
               </a:ext>
@@ -13870,13 +15195,15 @@
           <a:p>
             <a:r>
               <a:rPr lang="en-US" sz="6000" b="1" dirty="0" smtClean="0">
+                <a:solidFill>
+                  <a:schemeClr val="bg1">
+                    <a:lumMod val="95000"/>
+                  </a:schemeClr>
+                </a:solidFill>
                 <a:latin typeface="Blackadder ITC" panose="04020505051007020D02" pitchFamily="82" charset="0"/>
               </a:rPr>
               <a:t>The end</a:t>
             </a:r>
-            <a:endParaRPr lang="en-US" sz="6000" b="1" dirty="0" smtClean="0">
-              <a:latin typeface="Blackadder ITC" panose="04020505051007020D02" pitchFamily="82" charset="0"/>
-            </a:endParaRPr>
           </a:p>
         </p:txBody>
       </p:sp>
@@ -14022,6 +15349,60 @@
           </a:p>
         </p:txBody>
       </p:sp>
+      <p:sp>
+        <p:nvSpPr>
+          <p:cNvPr id="4" name="TextBox 3"/>
+          <p:cNvSpPr txBox="1"/>
+          <p:nvPr/>
+        </p:nvSpPr>
+        <p:spPr>
+          <a:xfrm>
+            <a:off x="3352800" y="6459379"/>
+            <a:ext cx="2518638" cy="246221"/>
+          </a:xfrm>
+          <a:prstGeom prst="rect">
+            <a:avLst/>
+          </a:prstGeom>
+          <a:solidFill>
+            <a:schemeClr val="bg1"/>
+          </a:solidFill>
+        </p:spPr>
+        <p:txBody>
+          <a:bodyPr wrap="none" rtlCol="0">
+            <a:spAutoFit/>
+          </a:bodyPr>
+          <a:lstStyle/>
+          <a:p>
+            <a:r>
+              <a:rPr lang="en-US" sz="1000" dirty="0" smtClean="0">
+                <a:solidFill>
+                  <a:schemeClr val="bg1">
+                    <a:lumMod val="50000"/>
+                  </a:schemeClr>
+                </a:solidFill>
+              </a:rPr>
+              <a:t>© iQuest </a:t>
+            </a:r>
+            <a:r>
+              <a:rPr lang="en-US" sz="1000" dirty="0" smtClean="0">
+                <a:solidFill>
+                  <a:schemeClr val="bg1">
+                    <a:lumMod val="50000"/>
+                  </a:schemeClr>
+                </a:solidFill>
+              </a:rPr>
+              <a:t>Group 2013. All rights reserved.</a:t>
+            </a:r>
+            <a:endParaRPr lang="en-US" sz="1000" dirty="0" smtClean="0">
+              <a:solidFill>
+                <a:schemeClr val="bg1">
+                  <a:lumMod val="50000"/>
+                </a:schemeClr>
+              </a:solidFill>
+            </a:endParaRPr>
+          </a:p>
+        </p:txBody>
+      </p:sp>
     </p:spTree>
     <p:extLst>
       <p:ext uri="{BB962C8B-B14F-4D97-AF65-F5344CB8AC3E}">
@@ -14183,6 +15564,60 @@
           </a:extLst>
         </p:spPr>
       </p:pic>
+      <p:sp>
+        <p:nvSpPr>
+          <p:cNvPr id="5" name="TextBox 4"/>
+          <p:cNvSpPr txBox="1"/>
+          <p:nvPr/>
+        </p:nvSpPr>
+        <p:spPr>
+          <a:xfrm>
+            <a:off x="3352800" y="6459379"/>
+            <a:ext cx="2518638" cy="246221"/>
+          </a:xfrm>
+          <a:prstGeom prst="rect">
+            <a:avLst/>
+          </a:prstGeom>
+          <a:solidFill>
+            <a:schemeClr val="bg1"/>
+          </a:solidFill>
+        </p:spPr>
+        <p:txBody>
+          <a:bodyPr wrap="none" rtlCol="0">
+            <a:spAutoFit/>
+          </a:bodyPr>
+          <a:lstStyle/>
+          <a:p>
+            <a:r>
+              <a:rPr lang="en-US" sz="1000" dirty="0" smtClean="0">
+                <a:solidFill>
+                  <a:schemeClr val="bg1">
+                    <a:lumMod val="50000"/>
+                  </a:schemeClr>
+                </a:solidFill>
+              </a:rPr>
+              <a:t>© iQuest </a:t>
+            </a:r>
+            <a:r>
+              <a:rPr lang="en-US" sz="1000" dirty="0" smtClean="0">
+                <a:solidFill>
+                  <a:schemeClr val="bg1">
+                    <a:lumMod val="50000"/>
+                  </a:schemeClr>
+                </a:solidFill>
+              </a:rPr>
+              <a:t>Group 2013. All rights reserved.</a:t>
+            </a:r>
+            <a:endParaRPr lang="en-US" sz="1000" dirty="0" smtClean="0">
+              <a:solidFill>
+                <a:schemeClr val="bg1">
+                  <a:lumMod val="50000"/>
+                </a:schemeClr>
+              </a:solidFill>
+            </a:endParaRPr>
+          </a:p>
+        </p:txBody>
+      </p:sp>
     </p:spTree>
     <p:extLst>
       <p:ext uri="{BB962C8B-B14F-4D97-AF65-F5344CB8AC3E}">
@@ -14464,6 +15899,60 @@
               <a:t>BioControls Project</a:t>
             </a:r>
             <a:endParaRPr lang="en-US" dirty="0"/>
+          </a:p>
+        </p:txBody>
+      </p:sp>
+      <p:sp>
+        <p:nvSpPr>
+          <p:cNvPr id="5" name="TextBox 4"/>
+          <p:cNvSpPr txBox="1"/>
+          <p:nvPr/>
+        </p:nvSpPr>
+        <p:spPr>
+          <a:xfrm>
+            <a:off x="3352800" y="6459379"/>
+            <a:ext cx="2518638" cy="246221"/>
+          </a:xfrm>
+          <a:prstGeom prst="rect">
+            <a:avLst/>
+          </a:prstGeom>
+          <a:solidFill>
+            <a:schemeClr val="bg1"/>
+          </a:solidFill>
+        </p:spPr>
+        <p:txBody>
+          <a:bodyPr wrap="none" rtlCol="0">
+            <a:spAutoFit/>
+          </a:bodyPr>
+          <a:lstStyle/>
+          <a:p>
+            <a:r>
+              <a:rPr lang="en-US" sz="1000" dirty="0" smtClean="0">
+                <a:solidFill>
+                  <a:schemeClr val="bg1">
+                    <a:lumMod val="50000"/>
+                  </a:schemeClr>
+                </a:solidFill>
+              </a:rPr>
+              <a:t>© iQuest </a:t>
+            </a:r>
+            <a:r>
+              <a:rPr lang="en-US" sz="1000" dirty="0" smtClean="0">
+                <a:solidFill>
+                  <a:schemeClr val="bg1">
+                    <a:lumMod val="50000"/>
+                  </a:schemeClr>
+                </a:solidFill>
+              </a:rPr>
+              <a:t>Group 2013. All rights reserved.</a:t>
+            </a:r>
+            <a:endParaRPr lang="en-US" sz="1000" dirty="0" smtClean="0">
+              <a:solidFill>
+                <a:schemeClr val="bg1">
+                  <a:lumMod val="50000"/>
+                </a:schemeClr>
+              </a:solidFill>
+            </a:endParaRPr>
           </a:p>
         </p:txBody>
       </p:sp>
@@ -14751,11 +16240,7 @@
           <a:p>
             <a:r>
               <a:rPr lang="ro-RO" altLang="en-US" sz="2400" dirty="0" smtClean="0"/>
-              <a:t>BioCalc </a:t>
-            </a:r>
-            <a:r>
-              <a:rPr lang="ro-RO" altLang="en-US" sz="2400" dirty="0" smtClean="0"/>
-              <a:t>Application</a:t>
+              <a:t>BioCalc Application</a:t>
             </a:r>
             <a:endParaRPr lang="en-US" altLang="en-US" sz="2400" dirty="0" smtClean="0"/>
           </a:p>
@@ -14844,6 +16329,60 @@
           </a:extLst>
         </p:spPr>
       </p:pic>
+      <p:sp>
+        <p:nvSpPr>
+          <p:cNvPr id="5" name="TextBox 4"/>
+          <p:cNvSpPr txBox="1"/>
+          <p:nvPr/>
+        </p:nvSpPr>
+        <p:spPr>
+          <a:xfrm>
+            <a:off x="3352800" y="6459379"/>
+            <a:ext cx="2518638" cy="246221"/>
+          </a:xfrm>
+          <a:prstGeom prst="rect">
+            <a:avLst/>
+          </a:prstGeom>
+          <a:solidFill>
+            <a:schemeClr val="bg1"/>
+          </a:solidFill>
+        </p:spPr>
+        <p:txBody>
+          <a:bodyPr wrap="none" rtlCol="0">
+            <a:spAutoFit/>
+          </a:bodyPr>
+          <a:lstStyle/>
+          <a:p>
+            <a:r>
+              <a:rPr lang="en-US" sz="1000" dirty="0" smtClean="0">
+                <a:solidFill>
+                  <a:schemeClr val="bg1">
+                    <a:lumMod val="50000"/>
+                  </a:schemeClr>
+                </a:solidFill>
+              </a:rPr>
+              <a:t>© iQuest </a:t>
+            </a:r>
+            <a:r>
+              <a:rPr lang="en-US" sz="1000" dirty="0" smtClean="0">
+                <a:solidFill>
+                  <a:schemeClr val="bg1">
+                    <a:lumMod val="50000"/>
+                  </a:schemeClr>
+                </a:solidFill>
+              </a:rPr>
+              <a:t>Group 2013. All rights reserved.</a:t>
+            </a:r>
+            <a:endParaRPr lang="en-US" sz="1000" dirty="0" smtClean="0">
+              <a:solidFill>
+                <a:schemeClr val="bg1">
+                  <a:lumMod val="50000"/>
+                </a:schemeClr>
+              </a:solidFill>
+            </a:endParaRPr>
+          </a:p>
+        </p:txBody>
+      </p:sp>
     </p:spTree>
     <p:extLst>
       <p:ext uri="{BB962C8B-B14F-4D97-AF65-F5344CB8AC3E}">
@@ -14984,6 +16523,60 @@
               <a:rPr lang="ro-RO" altLang="en-US" sz="2400" dirty="0" smtClean="0"/>
               <a:t>Adapter Pattern</a:t>
             </a:r>
+          </a:p>
+        </p:txBody>
+      </p:sp>
+      <p:sp>
+        <p:nvSpPr>
+          <p:cNvPr id="4" name="TextBox 3"/>
+          <p:cNvSpPr txBox="1"/>
+          <p:nvPr/>
+        </p:nvSpPr>
+        <p:spPr>
+          <a:xfrm>
+            <a:off x="3352800" y="6459379"/>
+            <a:ext cx="2518638" cy="246221"/>
+          </a:xfrm>
+          <a:prstGeom prst="rect">
+            <a:avLst/>
+          </a:prstGeom>
+          <a:solidFill>
+            <a:schemeClr val="bg1"/>
+          </a:solidFill>
+        </p:spPr>
+        <p:txBody>
+          <a:bodyPr wrap="none" rtlCol="0">
+            <a:spAutoFit/>
+          </a:bodyPr>
+          <a:lstStyle/>
+          <a:p>
+            <a:r>
+              <a:rPr lang="en-US" sz="1000" dirty="0" smtClean="0">
+                <a:solidFill>
+                  <a:schemeClr val="bg1">
+                    <a:lumMod val="50000"/>
+                  </a:schemeClr>
+                </a:solidFill>
+              </a:rPr>
+              <a:t>© iQuest </a:t>
+            </a:r>
+            <a:r>
+              <a:rPr lang="en-US" sz="1000" dirty="0" smtClean="0">
+                <a:solidFill>
+                  <a:schemeClr val="bg1">
+                    <a:lumMod val="50000"/>
+                  </a:schemeClr>
+                </a:solidFill>
+              </a:rPr>
+              <a:t>Group 2013. All rights reserved.</a:t>
+            </a:r>
+            <a:endParaRPr lang="en-US" sz="1000" dirty="0" smtClean="0">
+              <a:solidFill>
+                <a:schemeClr val="bg1">
+                  <a:lumMod val="50000"/>
+                </a:schemeClr>
+              </a:solidFill>
+            </a:endParaRPr>
           </a:p>
         </p:txBody>
       </p:sp>
@@ -15052,7 +16645,6 @@
               <a:rPr lang="en-US" altLang="en-US" sz="2400" dirty="0" smtClean="0"/>
               <a:t>Function Call</a:t>
             </a:r>
-            <a:endParaRPr lang="en-US" altLang="en-US" sz="2400" dirty="0" smtClean="0"/>
           </a:p>
         </p:txBody>
       </p:sp>
@@ -15364,7 +16956,7 @@
         <p:spPr>
           <a:xfrm>
             <a:off x="1267625" y="4419600"/>
-            <a:ext cx="6295313" cy="1384995"/>
+            <a:ext cx="6481261" cy="1384995"/>
           </a:xfrm>
           <a:prstGeom prst="rect">
             <a:avLst/>
@@ -15489,7 +17081,7 @@
                 <a:cs typeface="Courier New" panose="02070309020205020404" pitchFamily="49" charset="0"/>
                 <a:sym typeface="Wingdings" panose="05000000000000000000" pitchFamily="2" charset="2"/>
               </a:rPr>
-              <a:t>myMethod.call</a:t>
+              <a:t>myFunction.call</a:t>
             </a:r>
             <a:r>
               <a:rPr lang="en-US" sz="1200" dirty="0" smtClean="0">
@@ -15570,7 +17162,7 @@
                 <a:cs typeface="Courier New" panose="02070309020205020404" pitchFamily="49" charset="0"/>
                 <a:sym typeface="Wingdings" panose="05000000000000000000" pitchFamily="2" charset="2"/>
               </a:rPr>
-              <a:t>myMethod.call</a:t>
+              <a:t>myFunction.call</a:t>
             </a:r>
             <a:r>
               <a:rPr lang="en-US" sz="1200" dirty="0" smtClean="0">
@@ -15616,6 +17208,60 @@
               <a:latin typeface="Courier New" panose="02070309020205020404" pitchFamily="49" charset="0"/>
               <a:cs typeface="Courier New" panose="02070309020205020404" pitchFamily="49" charset="0"/>
               <a:sym typeface="Wingdings" panose="05000000000000000000" pitchFamily="2" charset="2"/>
+            </a:endParaRPr>
+          </a:p>
+        </p:txBody>
+      </p:sp>
+      <p:sp>
+        <p:nvSpPr>
+          <p:cNvPr id="9" name="TextBox 8"/>
+          <p:cNvSpPr txBox="1"/>
+          <p:nvPr/>
+        </p:nvSpPr>
+        <p:spPr>
+          <a:xfrm>
+            <a:off x="3352800" y="6459379"/>
+            <a:ext cx="2518638" cy="246221"/>
+          </a:xfrm>
+          <a:prstGeom prst="rect">
+            <a:avLst/>
+          </a:prstGeom>
+          <a:solidFill>
+            <a:schemeClr val="bg1"/>
+          </a:solidFill>
+        </p:spPr>
+        <p:txBody>
+          <a:bodyPr wrap="none" rtlCol="0">
+            <a:spAutoFit/>
+          </a:bodyPr>
+          <a:lstStyle/>
+          <a:p>
+            <a:r>
+              <a:rPr lang="en-US" sz="1000" dirty="0" smtClean="0">
+                <a:solidFill>
+                  <a:schemeClr val="bg1">
+                    <a:lumMod val="50000"/>
+                  </a:schemeClr>
+                </a:solidFill>
+              </a:rPr>
+              <a:t>© iQuest </a:t>
+            </a:r>
+            <a:r>
+              <a:rPr lang="en-US" sz="1000" dirty="0" smtClean="0">
+                <a:solidFill>
+                  <a:schemeClr val="bg1">
+                    <a:lumMod val="50000"/>
+                  </a:schemeClr>
+                </a:solidFill>
+              </a:rPr>
+              <a:t>Group 2013. All rights reserved.</a:t>
+            </a:r>
+            <a:endParaRPr lang="en-US" sz="1000" dirty="0" smtClean="0">
+              <a:solidFill>
+                <a:schemeClr val="bg1">
+                  <a:lumMod val="50000"/>
+                </a:schemeClr>
+              </a:solidFill>
             </a:endParaRPr>
           </a:p>
         </p:txBody>
@@ -16792,6 +18438,10 @@
 </file>
 
 <file path=customXml/item1.xml><?xml version="1.0" encoding="utf-8"?>
+<LongProperties xmlns="http://schemas.microsoft.com/office/2006/metadata/longProperties"/>
+</file>
+
+<file path=customXml/item2.xml><?xml version="1.0" encoding="utf-8"?>
 <?mso-contentType ?>
 <FormTemplates xmlns="http://schemas.microsoft.com/sharepoint/v3/contenttype/forms">
   <Display>DocumentLibraryForm</Display>
@@ -16800,11 +18450,13 @@
 </FormTemplates>
 </file>
 
-<file path=customXml/item2.xml><?xml version="1.0" encoding="utf-8"?>
-<LongProperties xmlns="http://schemas.microsoft.com/office/2006/metadata/longProperties"/>
+<file path=customXml/item3.xml><?xml version="1.0" encoding="utf-8"?>
+<p:properties xmlns:p="http://schemas.microsoft.com/office/2006/metadata/properties" xmlns:xsi="http://www.w3.org/2001/XMLSchema-instance" xmlns:pc="http://schemas.microsoft.com/office/infopath/2007/PartnerControls">
+  <documentManagement/>
+</p:properties>
 </file>
 
-<file path=customXml/item3.xml><?xml version="1.0" encoding="utf-8"?>
+<file path=customXml/item4.xml><?xml version="1.0" encoding="utf-8"?>
 <ct:contentTypeSchema xmlns:ct="http://schemas.microsoft.com/office/2006/metadata/contentType" xmlns:ma="http://schemas.microsoft.com/office/2006/metadata/properties/metaAttributes" ct:_="" ma:_="" ma:contentTypeName="Document" ma:contentTypeID="0x010100152A3CFC636B004F874CAA4462160261" ma:contentTypeVersion="0" ma:contentTypeDescription="Create a new document." ma:contentTypeScope="" ma:versionID="54724255b6a7e390441e7f802fb831c9">
   <xsd:schema xmlns:xsd="http://www.w3.org/2001/XMLSchema" xmlns:xs="http://www.w3.org/2001/XMLSchema" xmlns:p="http://schemas.microsoft.com/office/2006/metadata/properties" targetNamespace="http://schemas.microsoft.com/office/2006/metadata/properties" ma:root="true" ma:fieldsID="c64490b4aec6201516c3a874156f37b2">
     <xsd:element name="properties">
@@ -16918,13 +18570,15 @@
 </ct:contentTypeSchema>
 </file>
 
-<file path=customXml/item4.xml><?xml version="1.0" encoding="utf-8"?>
-<p:properties xmlns:p="http://schemas.microsoft.com/office/2006/metadata/properties" xmlns:xsi="http://www.w3.org/2001/XMLSchema-instance" xmlns:pc="http://schemas.microsoft.com/office/infopath/2007/PartnerControls">
-  <documentManagement/>
-</p:properties>
+<file path=customXml/itemProps1.xml><?xml version="1.0" encoding="utf-8"?>
+<ds:datastoreItem xmlns:ds="http://schemas.openxmlformats.org/officeDocument/2006/customXml" ds:itemID="{E16A62CF-B99A-493C-8B5C-42B74BCBDFA7}">
+  <ds:schemaRefs>
+    <ds:schemaRef ds:uri="http://schemas.microsoft.com/office/2006/metadata/longProperties"/>
+  </ds:schemaRefs>
+</ds:datastoreItem>
 </file>
 
-<file path=customXml/itemProps1.xml><?xml version="1.0" encoding="utf-8"?>
+<file path=customXml/itemProps2.xml><?xml version="1.0" encoding="utf-8"?>
 <ds:datastoreItem xmlns:ds="http://schemas.openxmlformats.org/officeDocument/2006/customXml" ds:itemID="{DDAAD0C2-8AA2-4903-8770-A9DDE0A43745}">
   <ds:schemaRefs>
     <ds:schemaRef ds:uri="http://schemas.microsoft.com/sharepoint/v3/contenttype/forms"/>
@@ -16932,15 +18586,22 @@
 </ds:datastoreItem>
 </file>
 
-<file path=customXml/itemProps2.xml><?xml version="1.0" encoding="utf-8"?>
-<ds:datastoreItem xmlns:ds="http://schemas.openxmlformats.org/officeDocument/2006/customXml" ds:itemID="{E16A62CF-B99A-493C-8B5C-42B74BCBDFA7}">
+<file path=customXml/itemProps3.xml><?xml version="1.0" encoding="utf-8"?>
+<ds:datastoreItem xmlns:ds="http://schemas.openxmlformats.org/officeDocument/2006/customXml" ds:itemID="{D3E1AC4D-42DF-494E-976D-E107797B8048}">
   <ds:schemaRefs>
-    <ds:schemaRef ds:uri="http://schemas.microsoft.com/office/2006/metadata/longProperties"/>
+    <ds:schemaRef ds:uri="http://purl.org/dc/elements/1.1/"/>
+    <ds:schemaRef ds:uri="http://purl.org/dc/terms/"/>
+    <ds:schemaRef ds:uri="http://www.w3.org/XML/1998/namespace"/>
+    <ds:schemaRef ds:uri="http://purl.org/dc/dcmitype/"/>
+    <ds:schemaRef ds:uri="http://schemas.microsoft.com/office/2006/documentManagement/types"/>
+    <ds:schemaRef ds:uri="http://schemas.microsoft.com/office/2006/metadata/properties"/>
+    <ds:schemaRef ds:uri="http://schemas.microsoft.com/office/infopath/2007/PartnerControls"/>
+    <ds:schemaRef ds:uri="http://schemas.openxmlformats.org/package/2006/metadata/core-properties"/>
   </ds:schemaRefs>
 </ds:datastoreItem>
 </file>
 
-<file path=customXml/itemProps3.xml><?xml version="1.0" encoding="utf-8"?>
+<file path=customXml/itemProps4.xml><?xml version="1.0" encoding="utf-8"?>
 <ds:datastoreItem xmlns:ds="http://schemas.openxmlformats.org/officeDocument/2006/customXml" ds:itemID="{13855BF2-3E1B-4048-8F5D-5069A0D184FE}">
   <ds:schemaRefs>
     <ds:schemaRef ds:uri="http://schemas.microsoft.com/office/2006/metadata/contentType"/>
@@ -16954,19 +18615,4 @@
     <ds:schemaRef ds:uri="http://schemas.microsoft.com/office/infopath/2007/PartnerControls"/>
   </ds:schemaRefs>
 </ds:datastoreItem>
-</file>
-
-<file path=customXml/itemProps4.xml><?xml version="1.0" encoding="utf-8"?>
-<ds:datastoreItem xmlns:ds="http://schemas.openxmlformats.org/officeDocument/2006/customXml" ds:itemID="{D3E1AC4D-42DF-494E-976D-E107797B8048}">
-  <ds:schemaRefs>
-    <ds:schemaRef ds:uri="http://purl.org/dc/elements/1.1/"/>
-    <ds:schemaRef ds:uri="http://purl.org/dc/terms/"/>
-    <ds:schemaRef ds:uri="http://www.w3.org/XML/1998/namespace"/>
-    <ds:schemaRef ds:uri="http://purl.org/dc/dcmitype/"/>
-    <ds:schemaRef ds:uri="http://schemas.microsoft.com/office/2006/documentManagement/types"/>
-    <ds:schemaRef ds:uri="http://schemas.microsoft.com/office/2006/metadata/properties"/>
-    <ds:schemaRef ds:uri="http://schemas.microsoft.com/office/infopath/2007/PartnerControls"/>
-    <ds:schemaRef ds:uri="http://schemas.openxmlformats.org/package/2006/metadata/core-properties"/>
-  </ds:schemaRefs>
-</ds:datastoreItem>
 </file>
</xml_diff>

<commit_message>
i updated presentation. i replaced the p and c notation with prototype and constructor.
</commit_message>
<xml_diff>
--- a/doc/BioCalc Presentation.pptx
+++ b/doc/BioCalc Presentation.pptx
@@ -5,7 +5,7 @@
     <p:sldMasterId id="2147483661" r:id="rId5"/>
   </p:sldMasterIdLst>
   <p:notesMasterIdLst>
-    <p:notesMasterId r:id="rId31"/>
+    <p:notesMasterId r:id="rId32"/>
   </p:notesMasterIdLst>
   <p:sldIdLst>
     <p:sldId id="269" r:id="rId6"/>
@@ -21,18 +21,19 @@
     <p:sldId id="305" r:id="rId16"/>
     <p:sldId id="306" r:id="rId17"/>
     <p:sldId id="303" r:id="rId18"/>
-    <p:sldId id="282" r:id="rId19"/>
-    <p:sldId id="283" r:id="rId20"/>
-    <p:sldId id="284" r:id="rId21"/>
-    <p:sldId id="285" r:id="rId22"/>
-    <p:sldId id="286" r:id="rId23"/>
-    <p:sldId id="287" r:id="rId24"/>
-    <p:sldId id="288" r:id="rId25"/>
-    <p:sldId id="301" r:id="rId26"/>
-    <p:sldId id="289" r:id="rId27"/>
-    <p:sldId id="304" r:id="rId28"/>
-    <p:sldId id="299" r:id="rId29"/>
-    <p:sldId id="300" r:id="rId30"/>
+    <p:sldId id="310" r:id="rId19"/>
+    <p:sldId id="282" r:id="rId20"/>
+    <p:sldId id="283" r:id="rId21"/>
+    <p:sldId id="284" r:id="rId22"/>
+    <p:sldId id="285" r:id="rId23"/>
+    <p:sldId id="286" r:id="rId24"/>
+    <p:sldId id="287" r:id="rId25"/>
+    <p:sldId id="288" r:id="rId26"/>
+    <p:sldId id="301" r:id="rId27"/>
+    <p:sldId id="289" r:id="rId28"/>
+    <p:sldId id="304" r:id="rId29"/>
+    <p:sldId id="299" r:id="rId30"/>
+    <p:sldId id="300" r:id="rId31"/>
   </p:sldIdLst>
   <p:sldSz cx="9144000" cy="6858000" type="screen4x3"/>
   <p:notesSz cx="6858000" cy="9144000"/>
@@ -259,7 +260,7 @@
             <a:fld id="{075D426C-3CEB-476F-A82F-ADFA14719D2A}" type="datetimeFigureOut">
               <a:rPr lang="en-US" altLang="en-US"/>
               <a:pPr/>
-              <a:t>9/22/2013</a:t>
+              <a:t>9/23/2013</a:t>
             </a:fld>
             <a:endParaRPr lang="en-US" altLang="en-US"/>
           </a:p>
@@ -6714,6 +6715,9 @@
                     <p:cTn id="3" fill="hold">
                       <p:stCondLst>
                         <p:cond delay="indefinite"/>
+                        <p:cond evt="onBegin" delay="0">
+                          <p:tn val="2"/>
+                        </p:cond>
                       </p:stCondLst>
                       <p:childTnLst>
                         <p:par>
@@ -6723,7 +6727,7 @@
                             </p:stCondLst>
                             <p:childTnLst>
                               <p:par>
-                                <p:cTn id="5" presetID="53" presetClass="entr" presetSubtype="16" fill="hold" grpId="0" nodeType="clickEffect">
+                                <p:cTn id="5" presetID="53" presetClass="entr" presetSubtype="16" fill="hold" grpId="0" nodeType="withEffect">
                                   <p:stCondLst>
                                     <p:cond delay="0"/>
                                   </p:stCondLst>
@@ -6731,6 +6735,283 @@
                                     <p:set>
                                       <p:cBhvr>
                                         <p:cTn id="6" dur="1" fill="hold">
+                                          <p:stCondLst>
+                                            <p:cond delay="0"/>
+                                          </p:stCondLst>
+                                        </p:cTn>
+                                        <p:tgtEl>
+                                          <p:spTgt spid="8">
+                                            <p:txEl>
+                                              <p:pRg st="0" end="0"/>
+                                            </p:txEl>
+                                          </p:spTgt>
+                                        </p:tgtEl>
+                                        <p:attrNameLst>
+                                          <p:attrName>style.visibility</p:attrName>
+                                        </p:attrNameLst>
+                                      </p:cBhvr>
+                                      <p:to>
+                                        <p:strVal val="visible"/>
+                                      </p:to>
+                                    </p:set>
+                                    <p:anim calcmode="lin" valueType="num">
+                                      <p:cBhvr>
+                                        <p:cTn id="7" dur="500" fill="hold"/>
+                                        <p:tgtEl>
+                                          <p:spTgt spid="8">
+                                            <p:txEl>
+                                              <p:pRg st="0" end="0"/>
+                                            </p:txEl>
+                                          </p:spTgt>
+                                        </p:tgtEl>
+                                        <p:attrNameLst>
+                                          <p:attrName>ppt_w</p:attrName>
+                                        </p:attrNameLst>
+                                      </p:cBhvr>
+                                      <p:tavLst>
+                                        <p:tav tm="0">
+                                          <p:val>
+                                            <p:fltVal val="0"/>
+                                          </p:val>
+                                        </p:tav>
+                                        <p:tav tm="100000">
+                                          <p:val>
+                                            <p:strVal val="#ppt_w"/>
+                                          </p:val>
+                                        </p:tav>
+                                      </p:tavLst>
+                                    </p:anim>
+                                    <p:anim calcmode="lin" valueType="num">
+                                      <p:cBhvr>
+                                        <p:cTn id="8" dur="500" fill="hold"/>
+                                        <p:tgtEl>
+                                          <p:spTgt spid="8">
+                                            <p:txEl>
+                                              <p:pRg st="0" end="0"/>
+                                            </p:txEl>
+                                          </p:spTgt>
+                                        </p:tgtEl>
+                                        <p:attrNameLst>
+                                          <p:attrName>ppt_h</p:attrName>
+                                        </p:attrNameLst>
+                                      </p:cBhvr>
+                                      <p:tavLst>
+                                        <p:tav tm="0">
+                                          <p:val>
+                                            <p:fltVal val="0"/>
+                                          </p:val>
+                                        </p:tav>
+                                        <p:tav tm="100000">
+                                          <p:val>
+                                            <p:strVal val="#ppt_h"/>
+                                          </p:val>
+                                        </p:tav>
+                                      </p:tavLst>
+                                    </p:anim>
+                                    <p:animEffect transition="in" filter="fade">
+                                      <p:cBhvr>
+                                        <p:cTn id="9" dur="500"/>
+                                        <p:tgtEl>
+                                          <p:spTgt spid="8">
+                                            <p:txEl>
+                                              <p:pRg st="0" end="0"/>
+                                            </p:txEl>
+                                          </p:spTgt>
+                                        </p:tgtEl>
+                                      </p:cBhvr>
+                                    </p:animEffect>
+                                  </p:childTnLst>
+                                </p:cTn>
+                              </p:par>
+                              <p:par>
+                                <p:cTn id="10" presetID="53" presetClass="entr" presetSubtype="16" fill="hold" grpId="0" nodeType="withEffect">
+                                  <p:stCondLst>
+                                    <p:cond delay="0"/>
+                                  </p:stCondLst>
+                                  <p:childTnLst>
+                                    <p:set>
+                                      <p:cBhvr>
+                                        <p:cTn id="11" dur="1" fill="hold">
+                                          <p:stCondLst>
+                                            <p:cond delay="0"/>
+                                          </p:stCondLst>
+                                        </p:cTn>
+                                        <p:tgtEl>
+                                          <p:spTgt spid="5"/>
+                                        </p:tgtEl>
+                                        <p:attrNameLst>
+                                          <p:attrName>style.visibility</p:attrName>
+                                        </p:attrNameLst>
+                                      </p:cBhvr>
+                                      <p:to>
+                                        <p:strVal val="visible"/>
+                                      </p:to>
+                                    </p:set>
+                                    <p:anim calcmode="lin" valueType="num">
+                                      <p:cBhvr>
+                                        <p:cTn id="12" dur="500" fill="hold"/>
+                                        <p:tgtEl>
+                                          <p:spTgt spid="5"/>
+                                        </p:tgtEl>
+                                        <p:attrNameLst>
+                                          <p:attrName>ppt_w</p:attrName>
+                                        </p:attrNameLst>
+                                      </p:cBhvr>
+                                      <p:tavLst>
+                                        <p:tav tm="0">
+                                          <p:val>
+                                            <p:fltVal val="0"/>
+                                          </p:val>
+                                        </p:tav>
+                                        <p:tav tm="100000">
+                                          <p:val>
+                                            <p:strVal val="#ppt_w"/>
+                                          </p:val>
+                                        </p:tav>
+                                      </p:tavLst>
+                                    </p:anim>
+                                    <p:anim calcmode="lin" valueType="num">
+                                      <p:cBhvr>
+                                        <p:cTn id="13" dur="500" fill="hold"/>
+                                        <p:tgtEl>
+                                          <p:spTgt spid="5"/>
+                                        </p:tgtEl>
+                                        <p:attrNameLst>
+                                          <p:attrName>ppt_h</p:attrName>
+                                        </p:attrNameLst>
+                                      </p:cBhvr>
+                                      <p:tavLst>
+                                        <p:tav tm="0">
+                                          <p:val>
+                                            <p:fltVal val="0"/>
+                                          </p:val>
+                                        </p:tav>
+                                        <p:tav tm="100000">
+                                          <p:val>
+                                            <p:strVal val="#ppt_h"/>
+                                          </p:val>
+                                        </p:tav>
+                                      </p:tavLst>
+                                    </p:anim>
+                                    <p:animEffect transition="in" filter="fade">
+                                      <p:cBhvr>
+                                        <p:cTn id="14" dur="500"/>
+                                        <p:tgtEl>
+                                          <p:spTgt spid="5"/>
+                                        </p:tgtEl>
+                                      </p:cBhvr>
+                                    </p:animEffect>
+                                  </p:childTnLst>
+                                </p:cTn>
+                              </p:par>
+                            </p:childTnLst>
+                          </p:cTn>
+                        </p:par>
+                      </p:childTnLst>
+                    </p:cTn>
+                  </p:par>
+                  <p:par>
+                    <p:cTn id="15" fill="hold">
+                      <p:stCondLst>
+                        <p:cond delay="indefinite"/>
+                      </p:stCondLst>
+                      <p:childTnLst>
+                        <p:par>
+                          <p:cTn id="16" fill="hold">
+                            <p:stCondLst>
+                              <p:cond delay="0"/>
+                            </p:stCondLst>
+                            <p:childTnLst>
+                              <p:par>
+                                <p:cTn id="17" presetID="53" presetClass="entr" presetSubtype="16" fill="hold" grpId="0" nodeType="clickEffect">
+                                  <p:stCondLst>
+                                    <p:cond delay="0"/>
+                                  </p:stCondLst>
+                                  <p:childTnLst>
+                                    <p:set>
+                                      <p:cBhvr>
+                                        <p:cTn id="18" dur="1" fill="hold">
+                                          <p:stCondLst>
+                                            <p:cond delay="0"/>
+                                          </p:stCondLst>
+                                        </p:cTn>
+                                        <p:tgtEl>
+                                          <p:spTgt spid="10"/>
+                                        </p:tgtEl>
+                                        <p:attrNameLst>
+                                          <p:attrName>style.visibility</p:attrName>
+                                        </p:attrNameLst>
+                                      </p:cBhvr>
+                                      <p:to>
+                                        <p:strVal val="visible"/>
+                                      </p:to>
+                                    </p:set>
+                                    <p:anim calcmode="lin" valueType="num">
+                                      <p:cBhvr>
+                                        <p:cTn id="19" dur="500" fill="hold"/>
+                                        <p:tgtEl>
+                                          <p:spTgt spid="10"/>
+                                        </p:tgtEl>
+                                        <p:attrNameLst>
+                                          <p:attrName>ppt_w</p:attrName>
+                                        </p:attrNameLst>
+                                      </p:cBhvr>
+                                      <p:tavLst>
+                                        <p:tav tm="0">
+                                          <p:val>
+                                            <p:fltVal val="0"/>
+                                          </p:val>
+                                        </p:tav>
+                                        <p:tav tm="100000">
+                                          <p:val>
+                                            <p:strVal val="#ppt_w"/>
+                                          </p:val>
+                                        </p:tav>
+                                      </p:tavLst>
+                                    </p:anim>
+                                    <p:anim calcmode="lin" valueType="num">
+                                      <p:cBhvr>
+                                        <p:cTn id="20" dur="500" fill="hold"/>
+                                        <p:tgtEl>
+                                          <p:spTgt spid="10"/>
+                                        </p:tgtEl>
+                                        <p:attrNameLst>
+                                          <p:attrName>ppt_h</p:attrName>
+                                        </p:attrNameLst>
+                                      </p:cBhvr>
+                                      <p:tavLst>
+                                        <p:tav tm="0">
+                                          <p:val>
+                                            <p:fltVal val="0"/>
+                                          </p:val>
+                                        </p:tav>
+                                        <p:tav tm="100000">
+                                          <p:val>
+                                            <p:strVal val="#ppt_h"/>
+                                          </p:val>
+                                        </p:tav>
+                                      </p:tavLst>
+                                    </p:anim>
+                                    <p:animEffect transition="in" filter="fade">
+                                      <p:cBhvr>
+                                        <p:cTn id="21" dur="500"/>
+                                        <p:tgtEl>
+                                          <p:spTgt spid="10"/>
+                                        </p:tgtEl>
+                                      </p:cBhvr>
+                                    </p:animEffect>
+                                  </p:childTnLst>
+                                </p:cTn>
+                              </p:par>
+                              <p:par>
+                                <p:cTn id="22" presetID="53" presetClass="entr" presetSubtype="16" fill="hold" grpId="0" nodeType="withEffect">
+                                  <p:stCondLst>
+                                    <p:cond delay="0"/>
+                                  </p:stCondLst>
+                                  <p:childTnLst>
+                                    <p:set>
+                                      <p:cBhvr>
+                                        <p:cTn id="23" dur="1" fill="hold">
                                           <p:stCondLst>
                                             <p:cond delay="0"/>
                                           </p:stCondLst>
@@ -6748,7 +7029,7 @@
                                     </p:set>
                                     <p:anim calcmode="lin" valueType="num">
                                       <p:cBhvr>
-                                        <p:cTn id="7" dur="500" fill="hold"/>
+                                        <p:cTn id="24" dur="500" fill="hold"/>
                                         <p:tgtEl>
                                           <p:spTgt spid="6"/>
                                         </p:tgtEl>
@@ -6771,7 +7052,7 @@
                                     </p:anim>
                                     <p:anim calcmode="lin" valueType="num">
                                       <p:cBhvr>
-                                        <p:cTn id="8" dur="500" fill="hold"/>
+                                        <p:cTn id="25" dur="500" fill="hold"/>
                                         <p:tgtEl>
                                           <p:spTgt spid="6"/>
                                         </p:tgtEl>
@@ -6794,7 +7075,7 @@
                                     </p:anim>
                                     <p:animEffect transition="in" filter="fade">
                                       <p:cBhvr>
-                                        <p:cTn id="9" dur="500"/>
+                                        <p:cTn id="26" dur="500"/>
                                         <p:tgtEl>
                                           <p:spTgt spid="6"/>
                                         </p:tgtEl>
@@ -6810,26 +7091,107 @@
                     </p:cTn>
                   </p:par>
                   <p:par>
-                    <p:cTn id="10" fill="hold">
+                    <p:cTn id="27" fill="hold">
                       <p:stCondLst>
                         <p:cond delay="indefinite"/>
                       </p:stCondLst>
                       <p:childTnLst>
                         <p:par>
-                          <p:cTn id="11" fill="hold">
+                          <p:cTn id="28" fill="hold">
                             <p:stCondLst>
                               <p:cond delay="0"/>
                             </p:stCondLst>
                             <p:childTnLst>
                               <p:par>
-                                <p:cTn id="12" presetID="53" presetClass="entr" presetSubtype="16" fill="hold" grpId="0" nodeType="clickEffect">
+                                <p:cTn id="29" presetID="53" presetClass="entr" presetSubtype="16" fill="hold" grpId="0" nodeType="clickEffect">
                                   <p:stCondLst>
                                     <p:cond delay="0"/>
                                   </p:stCondLst>
                                   <p:childTnLst>
                                     <p:set>
                                       <p:cBhvr>
-                                        <p:cTn id="13" dur="1" fill="hold">
+                                        <p:cTn id="30" dur="1" fill="hold">
+                                          <p:stCondLst>
+                                            <p:cond delay="0"/>
+                                          </p:stCondLst>
+                                        </p:cTn>
+                                        <p:tgtEl>
+                                          <p:spTgt spid="11"/>
+                                        </p:tgtEl>
+                                        <p:attrNameLst>
+                                          <p:attrName>style.visibility</p:attrName>
+                                        </p:attrNameLst>
+                                      </p:cBhvr>
+                                      <p:to>
+                                        <p:strVal val="visible"/>
+                                      </p:to>
+                                    </p:set>
+                                    <p:anim calcmode="lin" valueType="num">
+                                      <p:cBhvr>
+                                        <p:cTn id="31" dur="500" fill="hold"/>
+                                        <p:tgtEl>
+                                          <p:spTgt spid="11"/>
+                                        </p:tgtEl>
+                                        <p:attrNameLst>
+                                          <p:attrName>ppt_w</p:attrName>
+                                        </p:attrNameLst>
+                                      </p:cBhvr>
+                                      <p:tavLst>
+                                        <p:tav tm="0">
+                                          <p:val>
+                                            <p:fltVal val="0"/>
+                                          </p:val>
+                                        </p:tav>
+                                        <p:tav tm="100000">
+                                          <p:val>
+                                            <p:strVal val="#ppt_w"/>
+                                          </p:val>
+                                        </p:tav>
+                                      </p:tavLst>
+                                    </p:anim>
+                                    <p:anim calcmode="lin" valueType="num">
+                                      <p:cBhvr>
+                                        <p:cTn id="32" dur="500" fill="hold"/>
+                                        <p:tgtEl>
+                                          <p:spTgt spid="11"/>
+                                        </p:tgtEl>
+                                        <p:attrNameLst>
+                                          <p:attrName>ppt_h</p:attrName>
+                                        </p:attrNameLst>
+                                      </p:cBhvr>
+                                      <p:tavLst>
+                                        <p:tav tm="0">
+                                          <p:val>
+                                            <p:fltVal val="0"/>
+                                          </p:val>
+                                        </p:tav>
+                                        <p:tav tm="100000">
+                                          <p:val>
+                                            <p:strVal val="#ppt_h"/>
+                                          </p:val>
+                                        </p:tav>
+                                      </p:tavLst>
+                                    </p:anim>
+                                    <p:animEffect transition="in" filter="fade">
+                                      <p:cBhvr>
+                                        <p:cTn id="33" dur="500"/>
+                                        <p:tgtEl>
+                                          <p:spTgt spid="11"/>
+                                        </p:tgtEl>
+                                      </p:cBhvr>
+                                    </p:animEffect>
+                                  </p:childTnLst>
+                                </p:cTn>
+                              </p:par>
+                              <p:par>
+                                <p:cTn id="34" presetID="53" presetClass="entr" presetSubtype="16" fill="hold" grpId="0" nodeType="withEffect">
+                                  <p:stCondLst>
+                                    <p:cond delay="0"/>
+                                  </p:stCondLst>
+                                  <p:childTnLst>
+                                    <p:set>
+                                      <p:cBhvr>
+                                        <p:cTn id="35" dur="1" fill="hold">
                                           <p:stCondLst>
                                             <p:cond delay="0"/>
                                           </p:stCondLst>
@@ -6847,7 +7209,7 @@
                                     </p:set>
                                     <p:anim calcmode="lin" valueType="num">
                                       <p:cBhvr>
-                                        <p:cTn id="14" dur="500" fill="hold"/>
+                                        <p:cTn id="36" dur="500" fill="hold"/>
                                         <p:tgtEl>
                                           <p:spTgt spid="7"/>
                                         </p:tgtEl>
@@ -6870,7 +7232,7 @@
                                     </p:anim>
                                     <p:anim calcmode="lin" valueType="num">
                                       <p:cBhvr>
-                                        <p:cTn id="15" dur="500" fill="hold"/>
+                                        <p:cTn id="37" dur="500" fill="hold"/>
                                         <p:tgtEl>
                                           <p:spTgt spid="7"/>
                                         </p:tgtEl>
@@ -6893,7 +7255,7 @@
                                     </p:anim>
                                     <p:animEffect transition="in" filter="fade">
                                       <p:cBhvr>
-                                        <p:cTn id="16" dur="500"/>
+                                        <p:cTn id="38" dur="500"/>
                                         <p:tgtEl>
                                           <p:spTgt spid="7"/>
                                         </p:tgtEl>
@@ -6930,8 +7292,12 @@
       </p:par>
     </p:tnLst>
     <p:bldLst>
+      <p:bldP spid="8" grpId="0" build="p"/>
+      <p:bldP spid="5" grpId="0"/>
       <p:bldP spid="6" grpId="0"/>
       <p:bldP spid="7" grpId="0"/>
+      <p:bldP spid="10" grpId="0"/>
+      <p:bldP spid="11" grpId="0"/>
     </p:bldLst>
   </p:timing>
 </p:sld>
@@ -7144,15 +7510,11 @@
           <a:p>
             <a:r>
               <a:rPr lang="ro-RO" altLang="en-US" sz="2400" dirty="0" smtClean="0"/>
-              <a:t>Inheritance – </a:t>
+              <a:t>Inheritance</a:t>
             </a:r>
             <a:r>
               <a:rPr lang="en-US" altLang="en-US" sz="2400" dirty="0" smtClean="0"/>
-              <a:t>B</a:t>
-            </a:r>
-            <a:r>
-              <a:rPr lang="ro-RO" altLang="en-US" sz="2400" dirty="0" smtClean="0"/>
-              <a:t>asic</a:t>
+              <a:t> – Explain notations</a:t>
             </a:r>
             <a:endParaRPr lang="en-US" altLang="en-US" sz="2400" dirty="0" smtClean="0"/>
           </a:p>
@@ -7160,56 +7522,44 @@
       </p:sp>
       <p:sp>
         <p:nvSpPr>
-          <p:cNvPr id="8" name="Content Placeholder 2"/>
-          <p:cNvSpPr>
-            <a:spLocks noGrp="1"/>
-          </p:cNvSpPr>
-          <p:nvPr>
-            <p:ph idx="1"/>
-          </p:nvPr>
+          <p:cNvPr id="5" name="TextBox 4"/>
+          <p:cNvSpPr txBox="1"/>
+          <p:nvPr/>
         </p:nvSpPr>
         <p:spPr>
           <a:xfrm>
-            <a:off x="685800" y="1371600"/>
-            <a:ext cx="6172200" cy="1143000"/>
+            <a:off x="3352800" y="6459379"/>
+            <a:ext cx="2518638" cy="246221"/>
           </a:xfrm>
+          <a:prstGeom prst="rect">
+            <a:avLst/>
+          </a:prstGeom>
+          <a:solidFill>
+            <a:schemeClr val="bg1"/>
+          </a:solidFill>
         </p:spPr>
         <p:txBody>
-          <a:bodyPr/>
+          <a:bodyPr wrap="none" rtlCol="0">
+            <a:spAutoFit/>
+          </a:bodyPr>
           <a:lstStyle/>
           <a:p>
             <a:r>
-              <a:rPr lang="ro-RO" altLang="en-US" sz="2400" dirty="0" smtClean="0"/>
-              <a:t>Create two functions (</a:t>
-            </a:r>
-            <a:r>
-              <a:rPr lang="ro-RO" altLang="en-US" sz="2400" dirty="0" smtClean="0">
-                <a:latin typeface="Courier New" panose="02070309020205020404" pitchFamily="49" charset="0"/>
-                <a:cs typeface="Courier New" panose="02070309020205020404" pitchFamily="49" charset="0"/>
+              <a:rPr lang="en-US" sz="1000" dirty="0" smtClean="0">
+                <a:solidFill>
+                  <a:schemeClr val="bg1">
+                    <a:lumMod val="50000"/>
+                  </a:schemeClr>
+                </a:solidFill>
               </a:rPr>
-              <a:t>Animal</a:t>
-            </a:r>
-            <a:r>
-              <a:rPr lang="ro-RO" altLang="en-US" sz="2400" dirty="0" smtClean="0"/>
-              <a:t> and </a:t>
-            </a:r>
-            <a:r>
-              <a:rPr lang="ro-RO" altLang="en-US" sz="2400" dirty="0" smtClean="0">
-                <a:latin typeface="Courier New" panose="02070309020205020404" pitchFamily="49" charset="0"/>
-                <a:cs typeface="Courier New" panose="02070309020205020404" pitchFamily="49" charset="0"/>
-              </a:rPr>
-              <a:t>Dog</a:t>
-            </a:r>
-            <a:r>
-              <a:rPr lang="ro-RO" altLang="en-US" sz="2400" dirty="0" smtClean="0"/>
-              <a:t>)</a:t>
+              <a:t>© iQuest Group 2013. All rights reserved.</a:t>
             </a:r>
           </a:p>
         </p:txBody>
       </p:sp>
       <p:pic>
         <p:nvPicPr>
-          <p:cNvPr id="3074" name="Picture 2"/>
+          <p:cNvPr id="1031" name="Picture 7"/>
           <p:cNvPicPr>
             <a:picLocks noChangeAspect="1" noChangeArrowheads="1"/>
           </p:cNvPicPr>
@@ -7230,8 +7580,8 @@
         </p:blipFill>
         <p:spPr bwMode="auto">
           <a:xfrm>
-            <a:off x="1028700" y="2057400"/>
-            <a:ext cx="6743700" cy="3886200"/>
+            <a:off x="1576388" y="2057400"/>
+            <a:ext cx="5991225" cy="3067050"/>
           </a:xfrm>
           <a:prstGeom prst="rect">
             <a:avLst/>
@@ -7261,43 +7611,6 @@
           </a:extLst>
         </p:spPr>
       </p:pic>
-      <p:sp>
-        <p:nvSpPr>
-          <p:cNvPr id="5" name="TextBox 4"/>
-          <p:cNvSpPr txBox="1"/>
-          <p:nvPr/>
-        </p:nvSpPr>
-        <p:spPr>
-          <a:xfrm>
-            <a:off x="3352800" y="6459379"/>
-            <a:ext cx="2518638" cy="246221"/>
-          </a:xfrm>
-          <a:prstGeom prst="rect">
-            <a:avLst/>
-          </a:prstGeom>
-          <a:solidFill>
-            <a:schemeClr val="bg1"/>
-          </a:solidFill>
-        </p:spPr>
-        <p:txBody>
-          <a:bodyPr wrap="none" rtlCol="0">
-            <a:spAutoFit/>
-          </a:bodyPr>
-          <a:lstStyle/>
-          <a:p>
-            <a:r>
-              <a:rPr lang="en-US" sz="1000" dirty="0" smtClean="0">
-                <a:solidFill>
-                  <a:schemeClr val="bg1">
-                    <a:lumMod val="50000"/>
-                  </a:schemeClr>
-                </a:solidFill>
-              </a:rPr>
-              <a:t>© iQuest Group 2013. All rights reserved.</a:t>
-            </a:r>
-          </a:p>
-        </p:txBody>
-      </p:sp>
     </p:spTree>
     <p:extLst>
       <p:ext uri="{BB962C8B-B14F-4D97-AF65-F5344CB8AC3E}">
@@ -7373,7 +7686,7 @@
       </p:sp>
       <p:sp>
         <p:nvSpPr>
-          <p:cNvPr id="6" name="Content Placeholder 2"/>
+          <p:cNvPr id="8" name="Content Placeholder 2"/>
           <p:cNvSpPr>
             <a:spLocks noGrp="1"/>
           </p:cNvSpPr>
@@ -7384,7 +7697,7 @@
         <p:spPr>
           <a:xfrm>
             <a:off x="685800" y="1371600"/>
-            <a:ext cx="7696200" cy="1143000"/>
+            <a:ext cx="6172200" cy="1143000"/>
           </a:xfrm>
         </p:spPr>
         <p:txBody>
@@ -7393,18 +7706,18 @@
           <a:p>
             <a:r>
               <a:rPr lang="ro-RO" altLang="en-US" sz="2400" dirty="0" smtClean="0"/>
-              <a:t>Set the </a:t>
+              <a:t>Create two functions (</a:t>
             </a:r>
             <a:r>
               <a:rPr lang="ro-RO" altLang="en-US" sz="2400" dirty="0" smtClean="0">
                 <a:latin typeface="Courier New" panose="02070309020205020404" pitchFamily="49" charset="0"/>
                 <a:cs typeface="Courier New" panose="02070309020205020404" pitchFamily="49" charset="0"/>
               </a:rPr>
-              <a:t>prototype</a:t>
+              <a:t>Animal</a:t>
             </a:r>
             <a:r>
               <a:rPr lang="ro-RO" altLang="en-US" sz="2400" dirty="0" smtClean="0"/>
-              <a:t> property of the </a:t>
+              <a:t> and </a:t>
             </a:r>
             <a:r>
               <a:rPr lang="ro-RO" altLang="en-US" sz="2400" dirty="0" smtClean="0">
@@ -7414,19 +7727,52 @@
               <a:t>Dog</a:t>
             </a:r>
             <a:r>
-              <a:rPr lang="ro-RO" altLang="en-US" sz="2400" dirty="0"/>
-              <a:t> </a:t>
-            </a:r>
-            <a:r>
               <a:rPr lang="ro-RO" altLang="en-US" sz="2400" dirty="0" smtClean="0"/>
-              <a:t>function</a:t>
+              <a:t>)</a:t>
+            </a:r>
+          </a:p>
+        </p:txBody>
+      </p:sp>
+      <p:sp>
+        <p:nvSpPr>
+          <p:cNvPr id="5" name="TextBox 4"/>
+          <p:cNvSpPr txBox="1"/>
+          <p:nvPr/>
+        </p:nvSpPr>
+        <p:spPr>
+          <a:xfrm>
+            <a:off x="3352800" y="6459379"/>
+            <a:ext cx="2518638" cy="246221"/>
+          </a:xfrm>
+          <a:prstGeom prst="rect">
+            <a:avLst/>
+          </a:prstGeom>
+          <a:solidFill>
+            <a:schemeClr val="bg1"/>
+          </a:solidFill>
+        </p:spPr>
+        <p:txBody>
+          <a:bodyPr wrap="none" rtlCol="0">
+            <a:spAutoFit/>
+          </a:bodyPr>
+          <a:lstStyle/>
+          <a:p>
+            <a:r>
+              <a:rPr lang="en-US" sz="1000" dirty="0" smtClean="0">
+                <a:solidFill>
+                  <a:schemeClr val="bg1">
+                    <a:lumMod val="50000"/>
+                  </a:schemeClr>
+                </a:solidFill>
+              </a:rPr>
+              <a:t>© iQuest Group 2013. All rights reserved.</a:t>
             </a:r>
           </a:p>
         </p:txBody>
       </p:sp>
       <p:pic>
         <p:nvPicPr>
-          <p:cNvPr id="4098" name="Picture 2"/>
+          <p:cNvPr id="2050" name="Picture 2"/>
           <p:cNvPicPr>
             <a:picLocks noChangeAspect="1" noChangeArrowheads="1"/>
           </p:cNvPicPr>
@@ -7447,8 +7793,8 @@
         </p:blipFill>
         <p:spPr bwMode="auto">
           <a:xfrm>
-            <a:off x="1066800" y="1981200"/>
-            <a:ext cx="6696075" cy="4248150"/>
+            <a:off x="1200150" y="2133600"/>
+            <a:ext cx="6743700" cy="3886200"/>
           </a:xfrm>
           <a:prstGeom prst="rect">
             <a:avLst/>
@@ -7478,47 +7824,10 @@
           </a:extLst>
         </p:spPr>
       </p:pic>
-      <p:sp>
-        <p:nvSpPr>
-          <p:cNvPr id="5" name="TextBox 4"/>
-          <p:cNvSpPr txBox="1"/>
-          <p:nvPr/>
-        </p:nvSpPr>
-        <p:spPr>
-          <a:xfrm>
-            <a:off x="3352800" y="6459379"/>
-            <a:ext cx="2518638" cy="246221"/>
-          </a:xfrm>
-          <a:prstGeom prst="rect">
-            <a:avLst/>
-          </a:prstGeom>
-          <a:solidFill>
-            <a:schemeClr val="bg1"/>
-          </a:solidFill>
-        </p:spPr>
-        <p:txBody>
-          <a:bodyPr wrap="none" rtlCol="0">
-            <a:spAutoFit/>
-          </a:bodyPr>
-          <a:lstStyle/>
-          <a:p>
-            <a:r>
-              <a:rPr lang="en-US" sz="1000" dirty="0" smtClean="0">
-                <a:solidFill>
-                  <a:schemeClr val="bg1">
-                    <a:lumMod val="50000"/>
-                  </a:schemeClr>
-                </a:solidFill>
-              </a:rPr>
-              <a:t>© iQuest Group 2013. All rights reserved.</a:t>
-            </a:r>
-          </a:p>
-        </p:txBody>
-      </p:sp>
     </p:spTree>
     <p:extLst>
       <p:ext uri="{BB962C8B-B14F-4D97-AF65-F5344CB8AC3E}">
-        <p14:creationId xmlns:p14="http://schemas.microsoft.com/office/powerpoint/2010/main" val="3815883155"/>
+        <p14:creationId xmlns:p14="http://schemas.microsoft.com/office/powerpoint/2010/main" val="3740782922"/>
       </p:ext>
     </p:extLst>
   </p:cSld>
@@ -7552,9 +7861,135 @@
           <a:chExt cx="0" cy="0"/>
         </a:xfrm>
       </p:grpSpPr>
+      <p:sp>
+        <p:nvSpPr>
+          <p:cNvPr id="5122" name="Title 1"/>
+          <p:cNvSpPr>
+            <a:spLocks noGrp="1"/>
+          </p:cNvSpPr>
+          <p:nvPr>
+            <p:ph type="title"/>
+          </p:nvPr>
+        </p:nvSpPr>
+        <p:spPr>
+          <a:xfrm>
+            <a:off x="2286000" y="228600"/>
+            <a:ext cx="6400800" cy="563562"/>
+          </a:xfrm>
+        </p:spPr>
+        <p:txBody>
+          <a:bodyPr/>
+          <a:lstStyle/>
+          <a:p>
+            <a:r>
+              <a:rPr lang="ro-RO" altLang="en-US" sz="2400" dirty="0" smtClean="0"/>
+              <a:t>Inheritance – </a:t>
+            </a:r>
+            <a:r>
+              <a:rPr lang="en-US" altLang="en-US" sz="2400" dirty="0" smtClean="0"/>
+              <a:t>B</a:t>
+            </a:r>
+            <a:r>
+              <a:rPr lang="ro-RO" altLang="en-US" sz="2400" dirty="0" smtClean="0"/>
+              <a:t>asic</a:t>
+            </a:r>
+            <a:endParaRPr lang="en-US" altLang="en-US" sz="2400" dirty="0" smtClean="0"/>
+          </a:p>
+        </p:txBody>
+      </p:sp>
+      <p:sp>
+        <p:nvSpPr>
+          <p:cNvPr id="6" name="Content Placeholder 2"/>
+          <p:cNvSpPr>
+            <a:spLocks noGrp="1"/>
+          </p:cNvSpPr>
+          <p:nvPr>
+            <p:ph idx="1"/>
+          </p:nvPr>
+        </p:nvSpPr>
+        <p:spPr>
+          <a:xfrm>
+            <a:off x="685800" y="1371600"/>
+            <a:ext cx="7696200" cy="1143000"/>
+          </a:xfrm>
+        </p:spPr>
+        <p:txBody>
+          <a:bodyPr/>
+          <a:lstStyle/>
+          <a:p>
+            <a:r>
+              <a:rPr lang="ro-RO" altLang="en-US" sz="2400" dirty="0" smtClean="0"/>
+              <a:t>Set the </a:t>
+            </a:r>
+            <a:r>
+              <a:rPr lang="ro-RO" altLang="en-US" sz="2400" dirty="0" smtClean="0">
+                <a:latin typeface="Courier New" panose="02070309020205020404" pitchFamily="49" charset="0"/>
+                <a:cs typeface="Courier New" panose="02070309020205020404" pitchFamily="49" charset="0"/>
+              </a:rPr>
+              <a:t>prototype</a:t>
+            </a:r>
+            <a:r>
+              <a:rPr lang="ro-RO" altLang="en-US" sz="2400" dirty="0" smtClean="0"/>
+              <a:t> property of the </a:t>
+            </a:r>
+            <a:r>
+              <a:rPr lang="ro-RO" altLang="en-US" sz="2400" dirty="0" smtClean="0">
+                <a:latin typeface="Courier New" panose="02070309020205020404" pitchFamily="49" charset="0"/>
+                <a:cs typeface="Courier New" panose="02070309020205020404" pitchFamily="49" charset="0"/>
+              </a:rPr>
+              <a:t>Dog</a:t>
+            </a:r>
+            <a:r>
+              <a:rPr lang="ro-RO" altLang="en-US" sz="2400" dirty="0"/>
+              <a:t> </a:t>
+            </a:r>
+            <a:r>
+              <a:rPr lang="ro-RO" altLang="en-US" sz="2400" dirty="0" smtClean="0"/>
+              <a:t>function</a:t>
+            </a:r>
+          </a:p>
+        </p:txBody>
+      </p:sp>
+      <p:sp>
+        <p:nvSpPr>
+          <p:cNvPr id="5" name="TextBox 4"/>
+          <p:cNvSpPr txBox="1"/>
+          <p:nvPr/>
+        </p:nvSpPr>
+        <p:spPr>
+          <a:xfrm>
+            <a:off x="3352800" y="6459379"/>
+            <a:ext cx="2518638" cy="246221"/>
+          </a:xfrm>
+          <a:prstGeom prst="rect">
+            <a:avLst/>
+          </a:prstGeom>
+          <a:solidFill>
+            <a:schemeClr val="bg1"/>
+          </a:solidFill>
+        </p:spPr>
+        <p:txBody>
+          <a:bodyPr wrap="none" rtlCol="0">
+            <a:spAutoFit/>
+          </a:bodyPr>
+          <a:lstStyle/>
+          <a:p>
+            <a:r>
+              <a:rPr lang="en-US" sz="1000" dirty="0" smtClean="0">
+                <a:solidFill>
+                  <a:schemeClr val="bg1">
+                    <a:lumMod val="50000"/>
+                  </a:schemeClr>
+                </a:solidFill>
+              </a:rPr>
+              <a:t>© iQuest Group 2013. All rights reserved.</a:t>
+            </a:r>
+          </a:p>
+        </p:txBody>
+      </p:sp>
       <p:pic>
         <p:nvPicPr>
-          <p:cNvPr id="2" name="Picture 2"/>
+          <p:cNvPr id="3074" name="Picture 2"/>
           <p:cNvPicPr>
             <a:picLocks noChangeAspect="1" noChangeArrowheads="1"/>
           </p:cNvPicPr>
@@ -7575,7 +8010,98 @@
         </p:blipFill>
         <p:spPr bwMode="auto">
           <a:xfrm>
-            <a:off x="1219200" y="2011911"/>
+            <a:off x="1223963" y="1981200"/>
+            <a:ext cx="6696075" cy="4067175"/>
+          </a:xfrm>
+          <a:prstGeom prst="rect">
+            <a:avLst/>
+          </a:prstGeom>
+          <a:noFill/>
+          <a:ln>
+            <a:noFill/>
+          </a:ln>
+          <a:extLst>
+            <a:ext uri="{909E8E84-426E-40DD-AFC4-6F175D3DCCD1}">
+              <a14:hiddenFill xmlns:a14="http://schemas.microsoft.com/office/drawing/2010/main">
+                <a:solidFill>
+                  <a:schemeClr val="accent1"/>
+                </a:solidFill>
+              </a14:hiddenFill>
+            </a:ext>
+            <a:ext uri="{91240B29-F687-4F45-9708-019B960494DF}">
+              <a14:hiddenLine xmlns:a14="http://schemas.microsoft.com/office/drawing/2010/main" w="9525">
+                <a:solidFill>
+                  <a:schemeClr val="tx1"/>
+                </a:solidFill>
+                <a:miter lim="800000"/>
+                <a:headEnd/>
+                <a:tailEnd/>
+              </a14:hiddenLine>
+            </a:ext>
+          </a:extLst>
+        </p:spPr>
+      </p:pic>
+    </p:spTree>
+    <p:extLst>
+      <p:ext uri="{BB962C8B-B14F-4D97-AF65-F5344CB8AC3E}">
+        <p14:creationId xmlns:p14="http://schemas.microsoft.com/office/powerpoint/2010/main" val="3815883155"/>
+      </p:ext>
+    </p:extLst>
+  </p:cSld>
+  <p:clrMapOvr>
+    <a:masterClrMapping/>
+  </p:clrMapOvr>
+  <p:timing>
+    <p:tnLst>
+      <p:par>
+        <p:cTn id="1" dur="indefinite" restart="never" nodeType="tmRoot"/>
+      </p:par>
+    </p:tnLst>
+  </p:timing>
+</p:sld>
+</file>
+
+<file path=ppt/slides/slide16.xml><?xml version="1.0" encoding="utf-8"?>
+<p:sld xmlns:a="http://schemas.openxmlformats.org/drawingml/2006/main" xmlns:r="http://schemas.openxmlformats.org/officeDocument/2006/relationships" xmlns:p="http://schemas.openxmlformats.org/presentationml/2006/main">
+  <p:cSld>
+    <p:spTree>
+      <p:nvGrpSpPr>
+        <p:cNvPr id="1" name=""/>
+        <p:cNvGrpSpPr/>
+        <p:nvPr/>
+      </p:nvGrpSpPr>
+      <p:grpSpPr>
+        <a:xfrm>
+          <a:off x="0" y="0"/>
+          <a:ext cx="0" cy="0"/>
+          <a:chOff x="0" y="0"/>
+          <a:chExt cx="0" cy="0"/>
+        </a:xfrm>
+      </p:grpSpPr>
+      <p:pic>
+        <p:nvPicPr>
+          <p:cNvPr id="4098" name="Picture 2"/>
+          <p:cNvPicPr>
+            <a:picLocks noChangeAspect="1" noChangeArrowheads="1"/>
+          </p:cNvPicPr>
+          <p:nvPr/>
+        </p:nvPicPr>
+        <p:blipFill>
+          <a:blip r:embed="rId2">
+            <a:extLst>
+              <a:ext uri="{28A0092B-C50C-407E-A947-70E740481C1C}">
+                <a14:useLocalDpi xmlns:a14="http://schemas.microsoft.com/office/drawing/2010/main" val="0"/>
+              </a:ext>
+            </a:extLst>
+          </a:blip>
+          <a:srcRect/>
+          <a:stretch>
+            <a:fillRect/>
+          </a:stretch>
+        </p:blipFill>
+        <p:spPr bwMode="auto">
+          <a:xfrm>
+            <a:off x="1233488" y="2057400"/>
             <a:ext cx="6677025" cy="3857625"/>
           </a:xfrm>
           <a:prstGeom prst="rect">
@@ -8101,7 +8627,7 @@
 </p:sld>
 </file>
 
-<file path=ppt/slides/slide16.xml><?xml version="1.0" encoding="utf-8"?>
+<file path=ppt/slides/slide17.xml><?xml version="1.0" encoding="utf-8"?>
 <p:sld xmlns:a="http://schemas.openxmlformats.org/drawingml/2006/main" xmlns:r="http://schemas.openxmlformats.org/officeDocument/2006/relationships" xmlns:p="http://schemas.openxmlformats.org/presentationml/2006/main">
   <p:cSld>
     <p:spTree>
@@ -8120,7 +8646,7 @@
       </p:grpSpPr>
       <p:pic>
         <p:nvPicPr>
-          <p:cNvPr id="1026" name="Picture 2"/>
+          <p:cNvPr id="3" name="Picture 2"/>
           <p:cNvPicPr>
             <a:picLocks noChangeAspect="1" noChangeArrowheads="1"/>
           </p:cNvPicPr>
@@ -8141,8 +8667,8 @@
         </p:blipFill>
         <p:spPr bwMode="auto">
           <a:xfrm>
-            <a:off x="1419225" y="2895600"/>
-            <a:ext cx="6305550" cy="1790700"/>
+            <a:off x="1457325" y="2705100"/>
+            <a:ext cx="6267450" cy="1790700"/>
           </a:xfrm>
           <a:prstGeom prst="rect">
             <a:avLst/>
@@ -8790,7 +9316,7 @@
 </p:sld>
 </file>
 
-<file path=ppt/slides/slide17.xml><?xml version="1.0" encoding="utf-8"?>
+<file path=ppt/slides/slide18.xml><?xml version="1.0" encoding="utf-8"?>
 <p:sld xmlns:a="http://schemas.openxmlformats.org/drawingml/2006/main" xmlns:r="http://schemas.openxmlformats.org/officeDocument/2006/relationships" xmlns:p="http://schemas.openxmlformats.org/presentationml/2006/main">
   <p:cSld>
     <p:spTree>
@@ -8807,140 +9333,9 @@
           <a:chExt cx="0" cy="0"/>
         </a:xfrm>
       </p:grpSpPr>
-      <p:sp>
-        <p:nvSpPr>
-          <p:cNvPr id="5122" name="Title 1"/>
-          <p:cNvSpPr>
-            <a:spLocks noGrp="1"/>
-          </p:cNvSpPr>
-          <p:nvPr>
-            <p:ph type="title"/>
-          </p:nvPr>
-        </p:nvSpPr>
-        <p:spPr>
-          <a:xfrm>
-            <a:off x="2286000" y="228600"/>
-            <a:ext cx="6400800" cy="563562"/>
-          </a:xfrm>
-        </p:spPr>
-        <p:txBody>
-          <a:bodyPr/>
-          <a:lstStyle/>
-          <a:p>
-            <a:r>
-              <a:rPr lang="ro-RO" altLang="en-US" sz="2400" dirty="0" smtClean="0"/>
-              <a:t>Inheritance – </a:t>
-            </a:r>
-            <a:r>
-              <a:rPr lang="en-US" altLang="en-US" sz="2400" dirty="0" smtClean="0"/>
-              <a:t>W</a:t>
-            </a:r>
-            <a:r>
-              <a:rPr lang="ro-RO" altLang="en-US" sz="2400" dirty="0" smtClean="0"/>
-              <a:t>ith </a:t>
-            </a:r>
-            <a:r>
-              <a:rPr lang="en-US" altLang="en-US" sz="2400" dirty="0" smtClean="0"/>
-              <a:t>P</a:t>
-            </a:r>
-            <a:r>
-              <a:rPr lang="ro-RO" altLang="en-US" sz="2400" dirty="0" smtClean="0"/>
-              <a:t>arameters</a:t>
-            </a:r>
-            <a:endParaRPr lang="en-US" altLang="en-US" sz="2400" dirty="0" smtClean="0"/>
-          </a:p>
-        </p:txBody>
-      </p:sp>
-      <p:sp>
-        <p:nvSpPr>
-          <p:cNvPr id="8" name="Content Placeholder 2"/>
-          <p:cNvSpPr>
-            <a:spLocks noGrp="1"/>
-          </p:cNvSpPr>
-          <p:nvPr>
-            <p:ph idx="1"/>
-          </p:nvPr>
-        </p:nvSpPr>
-        <p:spPr>
-          <a:xfrm>
-            <a:off x="685800" y="1371600"/>
-            <a:ext cx="7772400" cy="1143000"/>
-          </a:xfrm>
-        </p:spPr>
-        <p:txBody>
-          <a:bodyPr/>
-          <a:lstStyle/>
-          <a:p>
-            <a:r>
-              <a:rPr lang="ro-RO" altLang="en-US" sz="2400" dirty="0" smtClean="0"/>
-              <a:t>Create the constructor function named </a:t>
-            </a:r>
-            <a:r>
-              <a:rPr lang="ro-RO" altLang="en-US" sz="2400" dirty="0" smtClean="0">
-                <a:latin typeface="Courier New" panose="02070309020205020404" pitchFamily="49" charset="0"/>
-                <a:cs typeface="Courier New" panose="02070309020205020404" pitchFamily="49" charset="0"/>
-              </a:rPr>
-              <a:t>FakeBase</a:t>
-            </a:r>
-          </a:p>
-        </p:txBody>
-      </p:sp>
-      <p:sp>
-        <p:nvSpPr>
-          <p:cNvPr id="2" name="TextBox 1"/>
-          <p:cNvSpPr txBox="1"/>
-          <p:nvPr/>
-        </p:nvSpPr>
-        <p:spPr>
-          <a:xfrm>
-            <a:off x="3733800" y="5329646"/>
-            <a:ext cx="4724400" cy="523220"/>
-          </a:xfrm>
-          <a:prstGeom prst="rect">
-            <a:avLst/>
-          </a:prstGeom>
-          <a:noFill/>
-        </p:spPr>
-        <p:txBody>
-          <a:bodyPr wrap="square" rtlCol="0">
-            <a:spAutoFit/>
-          </a:bodyPr>
-          <a:lstStyle/>
-          <a:p>
-            <a:pPr algn="r"/>
-            <a:r>
-              <a:rPr lang="ro-RO" sz="1400" dirty="0" smtClean="0"/>
-              <a:t>We’ll use the parameterless </a:t>
-            </a:r>
-            <a:r>
-              <a:rPr lang="ro-RO" sz="1400" dirty="0" smtClean="0">
-                <a:latin typeface="Courier New" panose="02070309020205020404" pitchFamily="49" charset="0"/>
-                <a:cs typeface="Courier New" panose="02070309020205020404" pitchFamily="49" charset="0"/>
-              </a:rPr>
-              <a:t>FakeBase</a:t>
-            </a:r>
-            <a:r>
-              <a:rPr lang="ro-RO" sz="1400" dirty="0" smtClean="0"/>
-              <a:t> constructor instead of the </a:t>
-            </a:r>
-            <a:r>
-              <a:rPr lang="ro-RO" sz="1400" dirty="0" smtClean="0">
-                <a:latin typeface="Courier New" panose="02070309020205020404" pitchFamily="49" charset="0"/>
-                <a:cs typeface="Courier New" panose="02070309020205020404" pitchFamily="49" charset="0"/>
-              </a:rPr>
-              <a:t>Animal</a:t>
-            </a:r>
-            <a:r>
-              <a:rPr lang="ro-RO" sz="1400" dirty="0" smtClean="0"/>
-              <a:t> constructor.</a:t>
-            </a:r>
-            <a:endParaRPr lang="en-US" sz="1400" dirty="0" smtClean="0"/>
-          </a:p>
-        </p:txBody>
-      </p:sp>
       <p:pic>
         <p:nvPicPr>
-          <p:cNvPr id="3074" name="Picture 2"/>
+          <p:cNvPr id="6146" name="Picture 2"/>
           <p:cNvPicPr>
             <a:picLocks noChangeAspect="1" noChangeArrowheads="1"/>
           </p:cNvPicPr>
@@ -8961,7 +9356,7 @@
         </p:blipFill>
         <p:spPr bwMode="auto">
           <a:xfrm>
-            <a:off x="1138238" y="2790825"/>
+            <a:off x="1138238" y="2819400"/>
             <a:ext cx="6867525" cy="1552575"/>
           </a:xfrm>
           <a:prstGeom prst="rect">
@@ -8992,9 +9387,177 @@
           </a:extLst>
         </p:spPr>
       </p:pic>
+      <p:sp>
+        <p:nvSpPr>
+          <p:cNvPr id="5122" name="Title 1"/>
+          <p:cNvSpPr>
+            <a:spLocks noGrp="1"/>
+          </p:cNvSpPr>
+          <p:nvPr>
+            <p:ph type="title"/>
+          </p:nvPr>
+        </p:nvSpPr>
+        <p:spPr>
+          <a:xfrm>
+            <a:off x="2286000" y="228600"/>
+            <a:ext cx="6400800" cy="563562"/>
+          </a:xfrm>
+        </p:spPr>
+        <p:txBody>
+          <a:bodyPr/>
+          <a:lstStyle/>
+          <a:p>
+            <a:r>
+              <a:rPr lang="ro-RO" altLang="en-US" sz="2400" dirty="0" smtClean="0"/>
+              <a:t>Inheritance – </a:t>
+            </a:r>
+            <a:r>
+              <a:rPr lang="en-US" altLang="en-US" sz="2400" dirty="0" smtClean="0"/>
+              <a:t>W</a:t>
+            </a:r>
+            <a:r>
+              <a:rPr lang="ro-RO" altLang="en-US" sz="2400" dirty="0" smtClean="0"/>
+              <a:t>ith </a:t>
+            </a:r>
+            <a:r>
+              <a:rPr lang="en-US" altLang="en-US" sz="2400" dirty="0" smtClean="0"/>
+              <a:t>P</a:t>
+            </a:r>
+            <a:r>
+              <a:rPr lang="ro-RO" altLang="en-US" sz="2400" dirty="0" smtClean="0"/>
+              <a:t>arameters</a:t>
+            </a:r>
+            <a:endParaRPr lang="en-US" altLang="en-US" sz="2400" dirty="0" smtClean="0"/>
+          </a:p>
+        </p:txBody>
+      </p:sp>
+      <p:sp>
+        <p:nvSpPr>
+          <p:cNvPr id="8" name="Content Placeholder 2"/>
+          <p:cNvSpPr>
+            <a:spLocks noGrp="1"/>
+          </p:cNvSpPr>
+          <p:nvPr>
+            <p:ph idx="1"/>
+          </p:nvPr>
+        </p:nvSpPr>
+        <p:spPr>
+          <a:xfrm>
+            <a:off x="685800" y="1371600"/>
+            <a:ext cx="7772400" cy="1143000"/>
+          </a:xfrm>
+        </p:spPr>
+        <p:txBody>
+          <a:bodyPr/>
+          <a:lstStyle/>
+          <a:p>
+            <a:r>
+              <a:rPr lang="ro-RO" altLang="en-US" sz="2400" dirty="0" smtClean="0"/>
+              <a:t>Create the constructor function named </a:t>
+            </a:r>
+            <a:r>
+              <a:rPr lang="ro-RO" altLang="en-US" sz="2400" dirty="0" smtClean="0">
+                <a:latin typeface="Courier New" panose="02070309020205020404" pitchFamily="49" charset="0"/>
+                <a:cs typeface="Courier New" panose="02070309020205020404" pitchFamily="49" charset="0"/>
+              </a:rPr>
+              <a:t>FakeBase</a:t>
+            </a:r>
+          </a:p>
+        </p:txBody>
+      </p:sp>
+      <p:sp>
+        <p:nvSpPr>
+          <p:cNvPr id="2" name="TextBox 1"/>
+          <p:cNvSpPr txBox="1"/>
+          <p:nvPr/>
+        </p:nvSpPr>
+        <p:spPr>
+          <a:xfrm>
+            <a:off x="3733800" y="5329646"/>
+            <a:ext cx="4724400" cy="523220"/>
+          </a:xfrm>
+          <a:prstGeom prst="rect">
+            <a:avLst/>
+          </a:prstGeom>
+          <a:noFill/>
+        </p:spPr>
+        <p:txBody>
+          <a:bodyPr wrap="square" rtlCol="0">
+            <a:spAutoFit/>
+          </a:bodyPr>
+          <a:lstStyle/>
+          <a:p>
+            <a:pPr algn="r"/>
+            <a:r>
+              <a:rPr lang="ro-RO" sz="1400" dirty="0" smtClean="0"/>
+              <a:t>We’ll use the parameterless </a:t>
+            </a:r>
+            <a:r>
+              <a:rPr lang="ro-RO" sz="1400" dirty="0" smtClean="0">
+                <a:latin typeface="Courier New" panose="02070309020205020404" pitchFamily="49" charset="0"/>
+                <a:cs typeface="Courier New" panose="02070309020205020404" pitchFamily="49" charset="0"/>
+              </a:rPr>
+              <a:t>FakeBase</a:t>
+            </a:r>
+            <a:r>
+              <a:rPr lang="ro-RO" sz="1400" dirty="0" smtClean="0"/>
+              <a:t> constructor instead of the </a:t>
+            </a:r>
+            <a:r>
+              <a:rPr lang="ro-RO" sz="1400" dirty="0" smtClean="0">
+                <a:latin typeface="Courier New" panose="02070309020205020404" pitchFamily="49" charset="0"/>
+                <a:cs typeface="Courier New" panose="02070309020205020404" pitchFamily="49" charset="0"/>
+              </a:rPr>
+              <a:t>Animal</a:t>
+            </a:r>
+            <a:r>
+              <a:rPr lang="ro-RO" sz="1400" dirty="0" smtClean="0"/>
+              <a:t> constructor.</a:t>
+            </a:r>
+            <a:endParaRPr lang="en-US" sz="1400" dirty="0" smtClean="0"/>
+          </a:p>
+        </p:txBody>
+      </p:sp>
+      <p:sp>
+        <p:nvSpPr>
+          <p:cNvPr id="9" name="TextBox 8"/>
+          <p:cNvSpPr txBox="1"/>
+          <p:nvPr/>
+        </p:nvSpPr>
+        <p:spPr>
+          <a:xfrm>
+            <a:off x="3352800" y="6459379"/>
+            <a:ext cx="2518638" cy="246221"/>
+          </a:xfrm>
+          <a:prstGeom prst="rect">
+            <a:avLst/>
+          </a:prstGeom>
+          <a:solidFill>
+            <a:schemeClr val="bg1"/>
+          </a:solidFill>
+        </p:spPr>
+        <p:txBody>
+          <a:bodyPr wrap="none" rtlCol="0">
+            <a:spAutoFit/>
+          </a:bodyPr>
+          <a:lstStyle/>
+          <a:p>
+            <a:r>
+              <a:rPr lang="en-US" sz="1000" dirty="0" smtClean="0">
+                <a:solidFill>
+                  <a:schemeClr val="bg1">
+                    <a:lumMod val="50000"/>
+                  </a:schemeClr>
+                </a:solidFill>
+              </a:rPr>
+              <a:t>© iQuest Group 2013. All rights reserved.</a:t>
+            </a:r>
+          </a:p>
+        </p:txBody>
+      </p:sp>
       <p:pic>
         <p:nvPicPr>
-          <p:cNvPr id="3076" name="Picture 4"/>
+          <p:cNvPr id="6147" name="Picture 3"/>
           <p:cNvPicPr>
             <a:picLocks noChangeAspect="1" noChangeArrowheads="1"/>
           </p:cNvPicPr>
@@ -9015,8 +9578,8 @@
         </p:blipFill>
         <p:spPr bwMode="auto">
           <a:xfrm>
-            <a:off x="2628900" y="2790825"/>
-            <a:ext cx="1333500" cy="1533525"/>
+            <a:off x="2762250" y="2830512"/>
+            <a:ext cx="1533525" cy="1552575"/>
           </a:xfrm>
           <a:prstGeom prst="rect">
             <a:avLst/>
@@ -9048,7 +9611,7 @@
       </p:pic>
       <p:pic>
         <p:nvPicPr>
-          <p:cNvPr id="3078" name="Picture 6"/>
+          <p:cNvPr id="6148" name="Picture 4"/>
           <p:cNvPicPr>
             <a:picLocks noChangeAspect="1" noChangeArrowheads="1"/>
           </p:cNvPicPr>
@@ -9069,7 +9632,7 @@
         </p:blipFill>
         <p:spPr bwMode="auto">
           <a:xfrm>
-            <a:off x="5691188" y="2785172"/>
+            <a:off x="5699124" y="2830512"/>
             <a:ext cx="2314575" cy="752475"/>
           </a:xfrm>
           <a:prstGeom prst="rect">
@@ -9100,43 +9663,6 @@
           </a:extLst>
         </p:spPr>
       </p:pic>
-      <p:sp>
-        <p:nvSpPr>
-          <p:cNvPr id="9" name="TextBox 8"/>
-          <p:cNvSpPr txBox="1"/>
-          <p:nvPr/>
-        </p:nvSpPr>
-        <p:spPr>
-          <a:xfrm>
-            <a:off x="3352800" y="6459379"/>
-            <a:ext cx="2518638" cy="246221"/>
-          </a:xfrm>
-          <a:prstGeom prst="rect">
-            <a:avLst/>
-          </a:prstGeom>
-          <a:solidFill>
-            <a:schemeClr val="bg1"/>
-          </a:solidFill>
-        </p:spPr>
-        <p:txBody>
-          <a:bodyPr wrap="none" rtlCol="0">
-            <a:spAutoFit/>
-          </a:bodyPr>
-          <a:lstStyle/>
-          <a:p>
-            <a:r>
-              <a:rPr lang="en-US" sz="1000" dirty="0" smtClean="0">
-                <a:solidFill>
-                  <a:schemeClr val="bg1">
-                    <a:lumMod val="50000"/>
-                  </a:schemeClr>
-                </a:solidFill>
-              </a:rPr>
-              <a:t>© iQuest Group 2013. All rights reserved.</a:t>
-            </a:r>
-          </a:p>
-        </p:txBody>
-      </p:sp>
     </p:spTree>
     <p:extLst>
       <p:ext uri="{BB962C8B-B14F-4D97-AF65-F5344CB8AC3E}">
@@ -9181,7 +9707,7 @@
                                           </p:stCondLst>
                                         </p:cTn>
                                         <p:tgtEl>
-                                          <p:spTgt spid="3076"/>
+                                          <p:spTgt spid="6148"/>
                                         </p:tgtEl>
                                         <p:attrNameLst>
                                           <p:attrName>style.visibility</p:attrName>
@@ -9195,7 +9721,7 @@
                                       <p:cBhvr>
                                         <p:cTn id="7" dur="500" fill="hold"/>
                                         <p:tgtEl>
-                                          <p:spTgt spid="3076"/>
+                                          <p:spTgt spid="6148"/>
                                         </p:tgtEl>
                                         <p:attrNameLst>
                                           <p:attrName>ppt_w</p:attrName>
@@ -9218,7 +9744,7 @@
                                       <p:cBhvr>
                                         <p:cTn id="8" dur="500" fill="hold"/>
                                         <p:tgtEl>
-                                          <p:spTgt spid="3076"/>
+                                          <p:spTgt spid="6148"/>
                                         </p:tgtEl>
                                         <p:attrNameLst>
                                           <p:attrName>ppt_h</p:attrName>
@@ -9241,7 +9767,7 @@
                                       <p:cBhvr>
                                         <p:cTn id="9" dur="500"/>
                                         <p:tgtEl>
-                                          <p:spTgt spid="3076"/>
+                                          <p:spTgt spid="6148"/>
                                         </p:tgtEl>
                                       </p:cBhvr>
                                     </p:animEffect>
@@ -9262,7 +9788,7 @@
                                           </p:stCondLst>
                                         </p:cTn>
                                         <p:tgtEl>
-                                          <p:spTgt spid="3078"/>
+                                          <p:spTgt spid="6147"/>
                                         </p:tgtEl>
                                         <p:attrNameLst>
                                           <p:attrName>style.visibility</p:attrName>
@@ -9276,7 +9802,7 @@
                                       <p:cBhvr>
                                         <p:cTn id="12" dur="500" fill="hold"/>
                                         <p:tgtEl>
-                                          <p:spTgt spid="3078"/>
+                                          <p:spTgt spid="6147"/>
                                         </p:tgtEl>
                                         <p:attrNameLst>
                                           <p:attrName>ppt_w</p:attrName>
@@ -9299,7 +9825,7 @@
                                       <p:cBhvr>
                                         <p:cTn id="13" dur="500" fill="hold"/>
                                         <p:tgtEl>
-                                          <p:spTgt spid="3078"/>
+                                          <p:spTgt spid="6147"/>
                                         </p:tgtEl>
                                         <p:attrNameLst>
                                           <p:attrName>ppt_h</p:attrName>
@@ -9322,7 +9848,7 @@
                                       <p:cBhvr>
                                         <p:cTn id="14" dur="500"/>
                                         <p:tgtEl>
-                                          <p:spTgt spid="3078"/>
+                                          <p:spTgt spid="6147"/>
                                         </p:tgtEl>
                                       </p:cBhvr>
                                     </p:animEffect>
@@ -9354,227 +9880,6 @@
             </p:seq>
           </p:childTnLst>
         </p:cTn>
-      </p:par>
-    </p:tnLst>
-  </p:timing>
-</p:sld>
-</file>
-
-<file path=ppt/slides/slide18.xml><?xml version="1.0" encoding="utf-8"?>
-<p:sld xmlns:a="http://schemas.openxmlformats.org/drawingml/2006/main" xmlns:r="http://schemas.openxmlformats.org/officeDocument/2006/relationships" xmlns:p="http://schemas.openxmlformats.org/presentationml/2006/main">
-  <p:cSld>
-    <p:spTree>
-      <p:nvGrpSpPr>
-        <p:cNvPr id="1" name=""/>
-        <p:cNvGrpSpPr/>
-        <p:nvPr/>
-      </p:nvGrpSpPr>
-      <p:grpSpPr>
-        <a:xfrm>
-          <a:off x="0" y="0"/>
-          <a:ext cx="0" cy="0"/>
-          <a:chOff x="0" y="0"/>
-          <a:chExt cx="0" cy="0"/>
-        </a:xfrm>
-      </p:grpSpPr>
-      <p:sp>
-        <p:nvSpPr>
-          <p:cNvPr id="5122" name="Title 1"/>
-          <p:cNvSpPr>
-            <a:spLocks noGrp="1"/>
-          </p:cNvSpPr>
-          <p:nvPr>
-            <p:ph type="title"/>
-          </p:nvPr>
-        </p:nvSpPr>
-        <p:spPr>
-          <a:xfrm>
-            <a:off x="2286000" y="228600"/>
-            <a:ext cx="6400800" cy="563562"/>
-          </a:xfrm>
-        </p:spPr>
-        <p:txBody>
-          <a:bodyPr/>
-          <a:lstStyle/>
-          <a:p>
-            <a:r>
-              <a:rPr lang="ro-RO" altLang="en-US" sz="2400" dirty="0" smtClean="0"/>
-              <a:t>Inheritance – </a:t>
-            </a:r>
-            <a:r>
-              <a:rPr lang="en-US" altLang="en-US" sz="2400" dirty="0" smtClean="0"/>
-              <a:t>W</a:t>
-            </a:r>
-            <a:r>
-              <a:rPr lang="ro-RO" altLang="en-US" sz="2400" dirty="0" smtClean="0"/>
-              <a:t>ith </a:t>
-            </a:r>
-            <a:r>
-              <a:rPr lang="en-US" altLang="en-US" sz="2400" dirty="0" smtClean="0"/>
-              <a:t>P</a:t>
-            </a:r>
-            <a:r>
-              <a:rPr lang="ro-RO" altLang="en-US" sz="2400" dirty="0" smtClean="0"/>
-              <a:t>arameters</a:t>
-            </a:r>
-            <a:endParaRPr lang="en-US" altLang="en-US" sz="2400" dirty="0" smtClean="0"/>
-          </a:p>
-        </p:txBody>
-      </p:sp>
-      <p:sp>
-        <p:nvSpPr>
-          <p:cNvPr id="8" name="Content Placeholder 2"/>
-          <p:cNvSpPr>
-            <a:spLocks noGrp="1"/>
-          </p:cNvSpPr>
-          <p:nvPr>
-            <p:ph idx="1"/>
-          </p:nvPr>
-        </p:nvSpPr>
-        <p:spPr>
-          <a:xfrm>
-            <a:off x="685800" y="1371600"/>
-            <a:ext cx="7696200" cy="1143000"/>
-          </a:xfrm>
-        </p:spPr>
-        <p:txBody>
-          <a:bodyPr/>
-          <a:lstStyle/>
-          <a:p>
-            <a:r>
-              <a:rPr lang="ro-RO" altLang="en-US" sz="2400" dirty="0" smtClean="0"/>
-              <a:t>Set the </a:t>
-            </a:r>
-            <a:r>
-              <a:rPr lang="ro-RO" altLang="en-US" sz="2400" dirty="0" smtClean="0">
-                <a:latin typeface="Courier New" panose="02070309020205020404" pitchFamily="49" charset="0"/>
-                <a:cs typeface="Courier New" panose="02070309020205020404" pitchFamily="49" charset="0"/>
-              </a:rPr>
-              <a:t>prototype</a:t>
-            </a:r>
-            <a:r>
-              <a:rPr lang="ro-RO" altLang="en-US" sz="2400" dirty="0" smtClean="0"/>
-              <a:t> property of the </a:t>
-            </a:r>
-            <a:r>
-              <a:rPr lang="ro-RO" altLang="en-US" sz="2400" dirty="0" smtClean="0">
-                <a:latin typeface="Courier New" panose="02070309020205020404" pitchFamily="49" charset="0"/>
-                <a:cs typeface="Courier New" panose="02070309020205020404" pitchFamily="49" charset="0"/>
-              </a:rPr>
-              <a:t>FakeBase</a:t>
-            </a:r>
-            <a:r>
-              <a:rPr lang="ro-RO" altLang="en-US" sz="2400" dirty="0" smtClean="0"/>
-              <a:t> function</a:t>
-            </a:r>
-          </a:p>
-        </p:txBody>
-      </p:sp>
-      <p:sp>
-        <p:nvSpPr>
-          <p:cNvPr id="5" name="TextBox 4"/>
-          <p:cNvSpPr txBox="1"/>
-          <p:nvPr/>
-        </p:nvSpPr>
-        <p:spPr>
-          <a:xfrm>
-            <a:off x="3352800" y="6459379"/>
-            <a:ext cx="2518638" cy="246221"/>
-          </a:xfrm>
-          <a:prstGeom prst="rect">
-            <a:avLst/>
-          </a:prstGeom>
-          <a:solidFill>
-            <a:schemeClr val="bg1"/>
-          </a:solidFill>
-        </p:spPr>
-        <p:txBody>
-          <a:bodyPr wrap="none" rtlCol="0">
-            <a:spAutoFit/>
-          </a:bodyPr>
-          <a:lstStyle/>
-          <a:p>
-            <a:r>
-              <a:rPr lang="en-US" sz="1000" dirty="0" smtClean="0">
-                <a:solidFill>
-                  <a:schemeClr val="bg1">
-                    <a:lumMod val="50000"/>
-                  </a:schemeClr>
-                </a:solidFill>
-              </a:rPr>
-              <a:t>© iQuest Group 2013. All rights reserved.</a:t>
-            </a:r>
-          </a:p>
-        </p:txBody>
-      </p:sp>
-      <p:pic>
-        <p:nvPicPr>
-          <p:cNvPr id="2" name="Picture 2"/>
-          <p:cNvPicPr>
-            <a:picLocks noChangeAspect="1" noChangeArrowheads="1"/>
-          </p:cNvPicPr>
-          <p:nvPr/>
-        </p:nvPicPr>
-        <p:blipFill>
-          <a:blip r:embed="rId2">
-            <a:extLst>
-              <a:ext uri="{28A0092B-C50C-407E-A947-70E740481C1C}">
-                <a14:useLocalDpi xmlns:a14="http://schemas.microsoft.com/office/drawing/2010/main" val="0"/>
-              </a:ext>
-            </a:extLst>
-          </a:blip>
-          <a:srcRect/>
-          <a:stretch>
-            <a:fillRect/>
-          </a:stretch>
-        </p:blipFill>
-        <p:spPr bwMode="auto">
-          <a:xfrm>
-            <a:off x="1195388" y="2952750"/>
-            <a:ext cx="6753225" cy="1619250"/>
-          </a:xfrm>
-          <a:prstGeom prst="rect">
-            <a:avLst/>
-          </a:prstGeom>
-          <a:noFill/>
-          <a:ln>
-            <a:noFill/>
-          </a:ln>
-          <a:extLst>
-            <a:ext uri="{909E8E84-426E-40DD-AFC4-6F175D3DCCD1}">
-              <a14:hiddenFill xmlns:a14="http://schemas.microsoft.com/office/drawing/2010/main">
-                <a:solidFill>
-                  <a:schemeClr val="accent1"/>
-                </a:solidFill>
-              </a14:hiddenFill>
-            </a:ext>
-            <a:ext uri="{91240B29-F687-4F45-9708-019B960494DF}">
-              <a14:hiddenLine xmlns:a14="http://schemas.microsoft.com/office/drawing/2010/main" w="9525">
-                <a:solidFill>
-                  <a:schemeClr val="tx1"/>
-                </a:solidFill>
-                <a:miter lim="800000"/>
-                <a:headEnd/>
-                <a:tailEnd/>
-              </a14:hiddenLine>
-            </a:ext>
-          </a:extLst>
-        </p:spPr>
-      </p:pic>
-    </p:spTree>
-    <p:extLst>
-      <p:ext uri="{BB962C8B-B14F-4D97-AF65-F5344CB8AC3E}">
-        <p14:creationId xmlns:p14="http://schemas.microsoft.com/office/powerpoint/2010/main" val="1861461591"/>
-      </p:ext>
-    </p:extLst>
-  </p:cSld>
-  <p:clrMapOvr>
-    <a:masterClrMapping/>
-  </p:clrMapOvr>
-  <p:timing>
-    <p:tnLst>
-      <p:par>
-        <p:cTn id="1" dur="indefinite" restart="never" nodeType="tmRoot"/>
       </p:par>
     </p:tnLst>
   </p:timing>
@@ -9644,7 +9949,7 @@
       </p:sp>
       <p:sp>
         <p:nvSpPr>
-          <p:cNvPr id="6" name="Content Placeholder 2"/>
+          <p:cNvPr id="8" name="Content Placeholder 2"/>
           <p:cNvSpPr>
             <a:spLocks noGrp="1"/>
           </p:cNvSpPr>
@@ -9682,11 +9987,11 @@
                 <a:latin typeface="Courier New" panose="02070309020205020404" pitchFamily="49" charset="0"/>
                 <a:cs typeface="Courier New" panose="02070309020205020404" pitchFamily="49" charset="0"/>
               </a:rPr>
-              <a:t>Dog </a:t>
+              <a:t>FakeBase</a:t>
             </a:r>
             <a:r>
               <a:rPr lang="ro-RO" altLang="en-US" sz="2400" dirty="0" smtClean="0"/>
-              <a:t>function</a:t>
+              <a:t> function</a:t>
             </a:r>
           </a:p>
         </p:txBody>
@@ -9730,7 +10035,7 @@
       </p:sp>
       <p:pic>
         <p:nvPicPr>
-          <p:cNvPr id="4098" name="Picture 2"/>
+          <p:cNvPr id="7170" name="Picture 2"/>
           <p:cNvPicPr>
             <a:picLocks noChangeAspect="1" noChangeArrowheads="1"/>
           </p:cNvPicPr>
@@ -9751,8 +10056,8 @@
         </p:blipFill>
         <p:spPr bwMode="auto">
           <a:xfrm>
-            <a:off x="1176338" y="2038350"/>
-            <a:ext cx="6791325" cy="4057650"/>
+            <a:off x="1200150" y="2895600"/>
+            <a:ext cx="6743700" cy="1619250"/>
           </a:xfrm>
           <a:prstGeom prst="rect">
             <a:avLst/>
@@ -9785,7 +10090,7 @@
     </p:spTree>
     <p:extLst>
       <p:ext uri="{BB962C8B-B14F-4D97-AF65-F5344CB8AC3E}">
-        <p14:creationId xmlns:p14="http://schemas.microsoft.com/office/powerpoint/2010/main" val="3125307590"/>
+        <p14:creationId xmlns:p14="http://schemas.microsoft.com/office/powerpoint/2010/main" val="1861461591"/>
       </p:ext>
     </p:extLst>
   </p:cSld>
@@ -10033,7 +10338,7 @@
       </p:sp>
       <p:sp>
         <p:nvSpPr>
-          <p:cNvPr id="5" name="Content Placeholder 2"/>
+          <p:cNvPr id="6" name="Content Placeholder 2"/>
           <p:cNvSpPr>
             <a:spLocks noGrp="1"/>
           </p:cNvSpPr>
@@ -10044,7 +10349,7 @@
         <p:spPr>
           <a:xfrm>
             <a:off x="685800" y="1371600"/>
-            <a:ext cx="7772400" cy="1143000"/>
+            <a:ext cx="7696200" cy="1143000"/>
           </a:xfrm>
         </p:spPr>
         <p:txBody>
@@ -10053,30 +10358,28 @@
           <a:p>
             <a:r>
               <a:rPr lang="ro-RO" altLang="en-US" sz="2400" dirty="0" smtClean="0"/>
-              <a:t>Fix the „</a:t>
+              <a:t>Set the </a:t>
             </a:r>
             <a:r>
               <a:rPr lang="ro-RO" altLang="en-US" sz="2400" dirty="0" smtClean="0">
                 <a:latin typeface="Courier New" panose="02070309020205020404" pitchFamily="49" charset="0"/>
                 <a:cs typeface="Courier New" panose="02070309020205020404" pitchFamily="49" charset="0"/>
               </a:rPr>
-              <a:t>constructor</a:t>
+              <a:t>prototype</a:t>
             </a:r>
             <a:r>
               <a:rPr lang="ro-RO" altLang="en-US" sz="2400" dirty="0" smtClean="0"/>
-              <a:t>” property of the </a:t>
+              <a:t> property of the </a:t>
             </a:r>
             <a:r>
               <a:rPr lang="ro-RO" altLang="en-US" sz="2400" dirty="0" smtClean="0">
                 <a:latin typeface="Courier New" panose="02070309020205020404" pitchFamily="49" charset="0"/>
                 <a:cs typeface="Courier New" panose="02070309020205020404" pitchFamily="49" charset="0"/>
               </a:rPr>
-              <a:t>FakeBase </a:t>
-            </a:r>
-            <a:r>
-              <a:rPr lang="ro-RO" altLang="en-US" sz="2400" dirty="0" smtClean="0">
-                <a:cs typeface="Courier New" panose="02070309020205020404" pitchFamily="49" charset="0"/>
-              </a:rPr>
+              <a:t>Dog </a:t>
+            </a:r>
+            <a:r>
+              <a:rPr lang="ro-RO" altLang="en-US" sz="2400" dirty="0" smtClean="0"/>
               <a:t>function</a:t>
             </a:r>
           </a:p>
@@ -10084,7 +10387,7 @@
       </p:sp>
       <p:sp>
         <p:nvSpPr>
-          <p:cNvPr id="6" name="TextBox 5"/>
+          <p:cNvPr id="5" name="TextBox 4"/>
           <p:cNvSpPr txBox="1"/>
           <p:nvPr/>
         </p:nvSpPr>
@@ -10121,7 +10424,7 @@
       </p:sp>
       <p:pic>
         <p:nvPicPr>
-          <p:cNvPr id="3074" name="Picture 2"/>
+          <p:cNvPr id="8194" name="Picture 2"/>
           <p:cNvPicPr>
             <a:picLocks noChangeAspect="1" noChangeArrowheads="1"/>
           </p:cNvPicPr>
@@ -10142,8 +10445,8 @@
         </p:blipFill>
         <p:spPr bwMode="auto">
           <a:xfrm>
-            <a:off x="1152525" y="2971800"/>
-            <a:ext cx="6838950" cy="1828800"/>
+            <a:off x="1176338" y="1962150"/>
+            <a:ext cx="6791325" cy="4057650"/>
           </a:xfrm>
           <a:prstGeom prst="rect">
             <a:avLst/>
@@ -10176,7 +10479,7 @@
     </p:spTree>
     <p:extLst>
       <p:ext uri="{BB962C8B-B14F-4D97-AF65-F5344CB8AC3E}">
-        <p14:creationId xmlns:p14="http://schemas.microsoft.com/office/powerpoint/2010/main" val="3138581112"/>
+        <p14:creationId xmlns:p14="http://schemas.microsoft.com/office/powerpoint/2010/main" val="3125307590"/>
       </p:ext>
     </p:extLst>
   </p:cSld>
@@ -10275,12 +10578,33 @@
           <a:lstStyle/>
           <a:p>
             <a:r>
-              <a:rPr lang="en-US" altLang="en-US" sz="2400" dirty="0" smtClean="0"/>
-              <a:t>Call base constructor.</a:t>
-            </a:r>
-            <a:endParaRPr lang="ro-RO" altLang="en-US" sz="2400" dirty="0" smtClean="0">
-              <a:cs typeface="Courier New" panose="02070309020205020404" pitchFamily="49" charset="0"/>
-            </a:endParaRPr>
+              <a:rPr lang="ro-RO" altLang="en-US" sz="2400" dirty="0" smtClean="0"/>
+              <a:t>Fix the „</a:t>
+            </a:r>
+            <a:r>
+              <a:rPr lang="ro-RO" altLang="en-US" sz="2400" dirty="0" smtClean="0">
+                <a:latin typeface="Courier New" panose="02070309020205020404" pitchFamily="49" charset="0"/>
+                <a:cs typeface="Courier New" panose="02070309020205020404" pitchFamily="49" charset="0"/>
+              </a:rPr>
+              <a:t>constructor</a:t>
+            </a:r>
+            <a:r>
+              <a:rPr lang="ro-RO" altLang="en-US" sz="2400" dirty="0" smtClean="0"/>
+              <a:t>” property of the </a:t>
+            </a:r>
+            <a:r>
+              <a:rPr lang="ro-RO" altLang="en-US" sz="2400" dirty="0" smtClean="0">
+                <a:latin typeface="Courier New" panose="02070309020205020404" pitchFamily="49" charset="0"/>
+                <a:cs typeface="Courier New" panose="02070309020205020404" pitchFamily="49" charset="0"/>
+              </a:rPr>
+              <a:t>FakeBase </a:t>
+            </a:r>
+            <a:r>
+              <a:rPr lang="ro-RO" altLang="en-US" sz="2400" dirty="0" smtClean="0">
+                <a:cs typeface="Courier New" panose="02070309020205020404" pitchFamily="49" charset="0"/>
+              </a:rPr>
+              <a:t>function</a:t>
+            </a:r>
           </a:p>
         </p:txBody>
       </p:sp>
@@ -10323,7 +10647,7 @@
       </p:sp>
       <p:pic>
         <p:nvPicPr>
-          <p:cNvPr id="2051" name="Picture 3"/>
+          <p:cNvPr id="9218" name="Picture 2"/>
           <p:cNvPicPr>
             <a:picLocks noChangeAspect="1" noChangeArrowheads="1"/>
           </p:cNvPicPr>
@@ -10344,8 +10668,8 @@
         </p:blipFill>
         <p:spPr bwMode="auto">
           <a:xfrm>
-            <a:off x="1152525" y="1981200"/>
-            <a:ext cx="6838950" cy="4171950"/>
+            <a:off x="1152525" y="2819400"/>
+            <a:ext cx="6838950" cy="1828800"/>
           </a:xfrm>
           <a:prstGeom prst="rect">
             <a:avLst/>
@@ -10378,7 +10702,7 @@
     </p:spTree>
     <p:extLst>
       <p:ext uri="{BB962C8B-B14F-4D97-AF65-F5344CB8AC3E}">
-        <p14:creationId xmlns:p14="http://schemas.microsoft.com/office/powerpoint/2010/main" val="4027063244"/>
+        <p14:creationId xmlns:p14="http://schemas.microsoft.com/office/powerpoint/2010/main" val="3138581112"/>
       </p:ext>
     </p:extLst>
   </p:cSld>
@@ -10468,8 +10792,8 @@
         </p:nvSpPr>
         <p:spPr>
           <a:xfrm>
-            <a:off x="685800" y="1295400"/>
-            <a:ext cx="5029200" cy="533400"/>
+            <a:off x="685800" y="1371600"/>
+            <a:ext cx="7772400" cy="1143000"/>
           </a:xfrm>
         </p:spPr>
         <p:txBody>
@@ -10477,15 +10801,55 @@
           <a:lstStyle/>
           <a:p>
             <a:r>
-              <a:rPr lang="ro-RO" altLang="en-US" sz="2400" dirty="0" smtClean="0"/>
-              <a:t>In ECMA Script 5</a:t>
+              <a:rPr lang="en-US" altLang="en-US" sz="2400" dirty="0" smtClean="0"/>
+              <a:t>Call base constructor.</a:t>
+            </a:r>
+            <a:endParaRPr lang="ro-RO" altLang="en-US" sz="2400" dirty="0" smtClean="0">
+              <a:cs typeface="Courier New" panose="02070309020205020404" pitchFamily="49" charset="0"/>
+            </a:endParaRPr>
+          </a:p>
+        </p:txBody>
+      </p:sp>
+      <p:sp>
+        <p:nvSpPr>
+          <p:cNvPr id="6" name="TextBox 5"/>
+          <p:cNvSpPr txBox="1"/>
+          <p:nvPr/>
+        </p:nvSpPr>
+        <p:spPr>
+          <a:xfrm>
+            <a:off x="3352800" y="6459379"/>
+            <a:ext cx="2518638" cy="246221"/>
+          </a:xfrm>
+          <a:prstGeom prst="rect">
+            <a:avLst/>
+          </a:prstGeom>
+          <a:solidFill>
+            <a:schemeClr val="bg1"/>
+          </a:solidFill>
+        </p:spPr>
+        <p:txBody>
+          <a:bodyPr wrap="none" rtlCol="0">
+            <a:spAutoFit/>
+          </a:bodyPr>
+          <a:lstStyle/>
+          <a:p>
+            <a:r>
+              <a:rPr lang="en-US" sz="1000" dirty="0" smtClean="0">
+                <a:solidFill>
+                  <a:schemeClr val="bg1">
+                    <a:lumMod val="50000"/>
+                  </a:schemeClr>
+                </a:solidFill>
+              </a:rPr>
+              <a:t>© iQuest Group 2013. All rights reserved.</a:t>
             </a:r>
           </a:p>
         </p:txBody>
       </p:sp>
       <p:pic>
         <p:nvPicPr>
-          <p:cNvPr id="6146" name="Picture 2"/>
+          <p:cNvPr id="10242" name="Picture 2"/>
           <p:cNvPicPr>
             <a:picLocks noChangeAspect="1" noChangeArrowheads="1"/>
           </p:cNvPicPr>
@@ -10506,8 +10870,8 @@
         </p:blipFill>
         <p:spPr bwMode="auto">
           <a:xfrm>
-            <a:off x="1245817" y="1981200"/>
-            <a:ext cx="6686550" cy="3981450"/>
+            <a:off x="1157288" y="2057400"/>
+            <a:ext cx="6829425" cy="3952875"/>
           </a:xfrm>
           <a:prstGeom prst="rect">
             <a:avLst/>
@@ -10537,110 +10901,10 @@
           </a:extLst>
         </p:spPr>
       </p:pic>
-      <p:sp>
-        <p:nvSpPr>
-          <p:cNvPr id="6" name="TextBox 5"/>
-          <p:cNvSpPr txBox="1"/>
-          <p:nvPr/>
-        </p:nvSpPr>
-        <p:spPr>
-          <a:xfrm>
-            <a:off x="6400800" y="6027139"/>
-            <a:ext cx="2169184" cy="246221"/>
-          </a:xfrm>
-          <a:prstGeom prst="rect">
-            <a:avLst/>
-          </a:prstGeom>
-          <a:noFill/>
-        </p:spPr>
-        <p:txBody>
-          <a:bodyPr wrap="none" rtlCol="0">
-            <a:spAutoFit/>
-          </a:bodyPr>
-          <a:lstStyle/>
-          <a:p>
-            <a:pPr algn="r"/>
-            <a:r>
-              <a:rPr lang="ro-RO" sz="1000" dirty="0" smtClean="0">
-                <a:solidFill>
-                  <a:schemeClr val="bg1">
-                    <a:lumMod val="75000"/>
-                  </a:schemeClr>
-                </a:solidFill>
-              </a:rPr>
-              <a:t>[</a:t>
-            </a:r>
-            <a:r>
-              <a:rPr lang="en-US" sz="1000" dirty="0" smtClean="0">
-                <a:solidFill>
-                  <a:schemeClr val="bg1">
-                    <a:lumMod val="75000"/>
-                  </a:schemeClr>
-                </a:solidFill>
-              </a:rPr>
-              <a:t>show code: Biorhythm inheritance</a:t>
-            </a:r>
-            <a:r>
-              <a:rPr lang="ro-RO" sz="1000" dirty="0" smtClean="0">
-                <a:solidFill>
-                  <a:schemeClr val="bg1">
-                    <a:lumMod val="75000"/>
-                  </a:schemeClr>
-                </a:solidFill>
-              </a:rPr>
-              <a:t>]</a:t>
-            </a:r>
-            <a:endParaRPr lang="en-US" sz="1000" dirty="0">
-              <a:solidFill>
-                <a:schemeClr val="bg1">
-                  <a:lumMod val="75000"/>
-                </a:schemeClr>
-              </a:solidFill>
-            </a:endParaRPr>
-          </a:p>
-        </p:txBody>
-      </p:sp>
-      <p:sp>
-        <p:nvSpPr>
-          <p:cNvPr id="7" name="TextBox 6"/>
-          <p:cNvSpPr txBox="1"/>
-          <p:nvPr/>
-        </p:nvSpPr>
-        <p:spPr>
-          <a:xfrm>
-            <a:off x="3352800" y="6459379"/>
-            <a:ext cx="2518638" cy="246221"/>
-          </a:xfrm>
-          <a:prstGeom prst="rect">
-            <a:avLst/>
-          </a:prstGeom>
-          <a:solidFill>
-            <a:schemeClr val="bg1"/>
-          </a:solidFill>
-        </p:spPr>
-        <p:txBody>
-          <a:bodyPr wrap="none" rtlCol="0">
-            <a:spAutoFit/>
-          </a:bodyPr>
-          <a:lstStyle/>
-          <a:p>
-            <a:r>
-              <a:rPr lang="en-US" sz="1000" dirty="0" smtClean="0">
-                <a:solidFill>
-                  <a:schemeClr val="bg1">
-                    <a:lumMod val="50000"/>
-                  </a:schemeClr>
-                </a:solidFill>
-              </a:rPr>
-              <a:t>© iQuest Group 2013. All rights reserved.</a:t>
-            </a:r>
-          </a:p>
-        </p:txBody>
-      </p:sp>
     </p:spTree>
     <p:extLst>
       <p:ext uri="{BB962C8B-B14F-4D97-AF65-F5344CB8AC3E}">
-        <p14:creationId xmlns:p14="http://schemas.microsoft.com/office/powerpoint/2010/main" val="1830154489"/>
+        <p14:creationId xmlns:p14="http://schemas.microsoft.com/office/powerpoint/2010/main" val="4027063244"/>
       </p:ext>
     </p:extLst>
   </p:cSld>
@@ -10700,8 +10964,21 @@
             </a:r>
             <a:r>
               <a:rPr lang="en-US" altLang="en-US" sz="2400" dirty="0" smtClean="0"/>
-              <a:t>Conclusion</a:t>
-            </a:r>
+              <a:t>W</a:t>
+            </a:r>
+            <a:r>
+              <a:rPr lang="ro-RO" altLang="en-US" sz="2400" dirty="0" smtClean="0"/>
+              <a:t>ith </a:t>
+            </a:r>
+            <a:r>
+              <a:rPr lang="en-US" altLang="en-US" sz="2400" dirty="0" smtClean="0"/>
+              <a:t>P</a:t>
+            </a:r>
+            <a:r>
+              <a:rPr lang="ro-RO" altLang="en-US" sz="2400" dirty="0" smtClean="0"/>
+              <a:t>arameters</a:t>
+            </a:r>
+            <a:endParaRPr lang="en-US" altLang="en-US" sz="2400" dirty="0" smtClean="0"/>
           </a:p>
         </p:txBody>
       </p:sp>
@@ -10726,14 +11003,9 @@
           <a:lstStyle/>
           <a:p>
             <a:r>
-              <a:rPr lang="en-US" altLang="en-US" sz="2400" dirty="0" smtClean="0"/>
-              <a:t>Inheritance – no </a:t>
-            </a:r>
-            <a:r>
-              <a:rPr lang="en-US" altLang="en-US" sz="2400" dirty="0" err="1" smtClean="0"/>
-              <a:t>params</a:t>
-            </a:r>
-            <a:endParaRPr lang="ro-RO" altLang="en-US" sz="2400" dirty="0" smtClean="0"/>
+              <a:rPr lang="ro-RO" altLang="en-US" sz="2400" dirty="0" smtClean="0"/>
+              <a:t>In ECMA Script 5</a:t>
+            </a:r>
           </a:p>
         </p:txBody>
       </p:sp>
@@ -10837,284 +11109,31 @@
           </a:p>
         </p:txBody>
       </p:sp>
-      <p:sp>
-        <p:nvSpPr>
-          <p:cNvPr id="3" name="TextBox 2"/>
-          <p:cNvSpPr txBox="1"/>
+      <p:pic>
+        <p:nvPicPr>
+          <p:cNvPr id="11267" name="Picture 3"/>
+          <p:cNvPicPr>
+            <a:picLocks noChangeAspect="1" noChangeArrowheads="1"/>
+          </p:cNvPicPr>
           <p:nvPr/>
-        </p:nvSpPr>
-        <p:spPr>
-          <a:xfrm>
-            <a:off x="2057400" y="1905000"/>
-            <a:ext cx="3159839" cy="1200329"/>
-          </a:xfrm>
-          <a:prstGeom prst="rect">
-            <a:avLst/>
-          </a:prstGeom>
-          <a:noFill/>
-        </p:spPr>
-        <p:txBody>
-          <a:bodyPr wrap="none" rtlCol="0">
-            <a:spAutoFit/>
-          </a:bodyPr>
-          <a:lstStyle/>
-          <a:p>
-            <a:r>
-              <a:rPr lang="en-US" sz="1200" dirty="0">
-                <a:latin typeface="Courier New" panose="02070309020205020404" pitchFamily="49" charset="0"/>
-                <a:cs typeface="Courier New" panose="02070309020205020404" pitchFamily="49" charset="0"/>
-              </a:rPr>
-              <a:t>function Animal() </a:t>
-            </a:r>
-            <a:r>
-              <a:rPr lang="en-US" sz="1200" dirty="0" smtClean="0">
-                <a:latin typeface="Courier New" panose="02070309020205020404" pitchFamily="49" charset="0"/>
-                <a:cs typeface="Courier New" panose="02070309020205020404" pitchFamily="49" charset="0"/>
-              </a:rPr>
-              <a:t>{}</a:t>
-            </a:r>
-          </a:p>
-          <a:p>
-            <a:endParaRPr lang="en-US" sz="1200" dirty="0">
-              <a:latin typeface="Courier New" panose="02070309020205020404" pitchFamily="49" charset="0"/>
-              <a:cs typeface="Courier New" panose="02070309020205020404" pitchFamily="49" charset="0"/>
-            </a:endParaRPr>
-          </a:p>
-          <a:p>
-            <a:r>
-              <a:rPr lang="en-US" sz="1200" dirty="0">
-                <a:latin typeface="Courier New" panose="02070309020205020404" pitchFamily="49" charset="0"/>
-                <a:cs typeface="Courier New" panose="02070309020205020404" pitchFamily="49" charset="0"/>
-              </a:rPr>
-              <a:t>function Dog() {}</a:t>
-            </a:r>
-          </a:p>
-          <a:p>
-            <a:endParaRPr lang="en-US" sz="1200" dirty="0">
-              <a:latin typeface="Courier New" panose="02070309020205020404" pitchFamily="49" charset="0"/>
-              <a:cs typeface="Courier New" panose="02070309020205020404" pitchFamily="49" charset="0"/>
-            </a:endParaRPr>
-          </a:p>
-          <a:p>
-            <a:r>
-              <a:rPr lang="en-US" sz="1200" dirty="0" err="1">
-                <a:latin typeface="Courier New" panose="02070309020205020404" pitchFamily="49" charset="0"/>
-                <a:cs typeface="Courier New" panose="02070309020205020404" pitchFamily="49" charset="0"/>
-              </a:rPr>
-              <a:t>Dog.prototype</a:t>
-            </a:r>
-            <a:r>
-              <a:rPr lang="en-US" sz="1200" dirty="0">
-                <a:latin typeface="Courier New" panose="02070309020205020404" pitchFamily="49" charset="0"/>
-                <a:cs typeface="Courier New" panose="02070309020205020404" pitchFamily="49" charset="0"/>
-              </a:rPr>
-              <a:t> = new Animal();</a:t>
-            </a:r>
-          </a:p>
-          <a:p>
-            <a:r>
-              <a:rPr lang="en-US" sz="1200" dirty="0" err="1">
-                <a:latin typeface="Courier New" panose="02070309020205020404" pitchFamily="49" charset="0"/>
-                <a:cs typeface="Courier New" panose="02070309020205020404" pitchFamily="49" charset="0"/>
-              </a:rPr>
-              <a:t>Dog.prototype.constructor</a:t>
-            </a:r>
-            <a:r>
-              <a:rPr lang="en-US" sz="1200" dirty="0">
-                <a:latin typeface="Courier New" panose="02070309020205020404" pitchFamily="49" charset="0"/>
-                <a:cs typeface="Courier New" panose="02070309020205020404" pitchFamily="49" charset="0"/>
-              </a:rPr>
-              <a:t> = Dog</a:t>
-            </a:r>
-            <a:r>
-              <a:rPr lang="en-US" sz="1200" dirty="0" smtClean="0">
-                <a:latin typeface="Courier New" panose="02070309020205020404" pitchFamily="49" charset="0"/>
-                <a:cs typeface="Courier New" panose="02070309020205020404" pitchFamily="49" charset="0"/>
-              </a:rPr>
-              <a:t>;</a:t>
-            </a:r>
-            <a:endParaRPr lang="en-US" sz="1200" dirty="0">
-              <a:latin typeface="Courier New" panose="02070309020205020404" pitchFamily="49" charset="0"/>
-              <a:cs typeface="Courier New" panose="02070309020205020404" pitchFamily="49" charset="0"/>
-            </a:endParaRPr>
-          </a:p>
-        </p:txBody>
-      </p:sp>
-      <p:sp>
-        <p:nvSpPr>
-          <p:cNvPr id="4" name="TextBox 3"/>
-          <p:cNvSpPr txBox="1"/>
-          <p:nvPr/>
-        </p:nvSpPr>
-        <p:spPr>
-          <a:xfrm>
-            <a:off x="2058174" y="4084260"/>
-            <a:ext cx="4647426" cy="1569660"/>
-          </a:xfrm>
-          <a:prstGeom prst="rect">
-            <a:avLst/>
-          </a:prstGeom>
-          <a:noFill/>
-        </p:spPr>
-        <p:txBody>
-          <a:bodyPr wrap="none" rtlCol="0">
-            <a:spAutoFit/>
-          </a:bodyPr>
-          <a:lstStyle/>
-          <a:p>
-            <a:r>
-              <a:rPr lang="en-US" sz="1200" dirty="0">
-                <a:latin typeface="Courier New" panose="02070309020205020404" pitchFamily="49" charset="0"/>
-                <a:cs typeface="Courier New" panose="02070309020205020404" pitchFamily="49" charset="0"/>
-              </a:rPr>
-              <a:t>function Animal(name) </a:t>
-            </a:r>
-            <a:r>
-              <a:rPr lang="en-US" sz="1200" dirty="0" smtClean="0">
-                <a:latin typeface="Courier New" panose="02070309020205020404" pitchFamily="49" charset="0"/>
-                <a:cs typeface="Courier New" panose="02070309020205020404" pitchFamily="49" charset="0"/>
-              </a:rPr>
-              <a:t>{}</a:t>
-            </a:r>
-          </a:p>
-          <a:p>
-            <a:endParaRPr lang="en-US" sz="1200" dirty="0">
-              <a:latin typeface="Courier New" panose="02070309020205020404" pitchFamily="49" charset="0"/>
-              <a:cs typeface="Courier New" panose="02070309020205020404" pitchFamily="49" charset="0"/>
-            </a:endParaRPr>
-          </a:p>
-          <a:p>
-            <a:r>
-              <a:rPr lang="en-US" sz="1200" dirty="0">
-                <a:latin typeface="Courier New" panose="02070309020205020404" pitchFamily="49" charset="0"/>
-                <a:cs typeface="Courier New" panose="02070309020205020404" pitchFamily="49" charset="0"/>
-              </a:rPr>
-              <a:t>function Dog(name) {</a:t>
-            </a:r>
-          </a:p>
-          <a:p>
-            <a:r>
-              <a:rPr lang="en-US" sz="1200" dirty="0">
-                <a:latin typeface="Courier New" panose="02070309020205020404" pitchFamily="49" charset="0"/>
-                <a:cs typeface="Courier New" panose="02070309020205020404" pitchFamily="49" charset="0"/>
-              </a:rPr>
-              <a:t>    </a:t>
-            </a:r>
-            <a:r>
-              <a:rPr lang="en-US" sz="1200" dirty="0" err="1">
-                <a:latin typeface="Courier New" panose="02070309020205020404" pitchFamily="49" charset="0"/>
-                <a:cs typeface="Courier New" panose="02070309020205020404" pitchFamily="49" charset="0"/>
-              </a:rPr>
-              <a:t>Animal.call</a:t>
-            </a:r>
-            <a:r>
-              <a:rPr lang="en-US" sz="1200" dirty="0">
-                <a:latin typeface="Courier New" panose="02070309020205020404" pitchFamily="49" charset="0"/>
-                <a:cs typeface="Courier New" panose="02070309020205020404" pitchFamily="49" charset="0"/>
-              </a:rPr>
-              <a:t>(this, name);</a:t>
-            </a:r>
-          </a:p>
-          <a:p>
-            <a:r>
-              <a:rPr lang="en-US" sz="1200" dirty="0">
-                <a:latin typeface="Courier New" panose="02070309020205020404" pitchFamily="49" charset="0"/>
-                <a:cs typeface="Courier New" panose="02070309020205020404" pitchFamily="49" charset="0"/>
-              </a:rPr>
-              <a:t>}</a:t>
-            </a:r>
-          </a:p>
-          <a:p>
-            <a:endParaRPr lang="en-US" sz="1200" dirty="0">
-              <a:latin typeface="Courier New" panose="02070309020205020404" pitchFamily="49" charset="0"/>
-              <a:cs typeface="Courier New" panose="02070309020205020404" pitchFamily="49" charset="0"/>
-            </a:endParaRPr>
-          </a:p>
-          <a:p>
-            <a:r>
-              <a:rPr lang="en-US" sz="1200" dirty="0" err="1">
-                <a:latin typeface="Courier New" panose="02070309020205020404" pitchFamily="49" charset="0"/>
-                <a:cs typeface="Courier New" panose="02070309020205020404" pitchFamily="49" charset="0"/>
-              </a:rPr>
-              <a:t>Dog.prototype</a:t>
-            </a:r>
-            <a:r>
-              <a:rPr lang="en-US" sz="1200" dirty="0">
-                <a:latin typeface="Courier New" panose="02070309020205020404" pitchFamily="49" charset="0"/>
-                <a:cs typeface="Courier New" panose="02070309020205020404" pitchFamily="49" charset="0"/>
-              </a:rPr>
-              <a:t> = </a:t>
-            </a:r>
-            <a:r>
-              <a:rPr lang="en-US" sz="1200" dirty="0" err="1">
-                <a:latin typeface="Courier New" panose="02070309020205020404" pitchFamily="49" charset="0"/>
-                <a:cs typeface="Courier New" panose="02070309020205020404" pitchFamily="49" charset="0"/>
-              </a:rPr>
-              <a:t>Object.create</a:t>
-            </a:r>
-            <a:r>
-              <a:rPr lang="en-US" sz="1200" dirty="0">
-                <a:latin typeface="Courier New" panose="02070309020205020404" pitchFamily="49" charset="0"/>
-                <a:cs typeface="Courier New" panose="02070309020205020404" pitchFamily="49" charset="0"/>
-              </a:rPr>
-              <a:t>(</a:t>
-            </a:r>
-            <a:r>
-              <a:rPr lang="en-US" sz="1200" dirty="0" err="1">
-                <a:latin typeface="Courier New" panose="02070309020205020404" pitchFamily="49" charset="0"/>
-                <a:cs typeface="Courier New" panose="02070309020205020404" pitchFamily="49" charset="0"/>
-              </a:rPr>
-              <a:t>Animal.prototype</a:t>
-            </a:r>
-            <a:r>
-              <a:rPr lang="en-US" sz="1200" dirty="0">
-                <a:latin typeface="Courier New" panose="02070309020205020404" pitchFamily="49" charset="0"/>
-                <a:cs typeface="Courier New" panose="02070309020205020404" pitchFamily="49" charset="0"/>
-              </a:rPr>
-              <a:t>);</a:t>
-            </a:r>
-          </a:p>
-          <a:p>
-            <a:r>
-              <a:rPr lang="en-US" sz="1200" dirty="0" err="1">
-                <a:latin typeface="Courier New" panose="02070309020205020404" pitchFamily="49" charset="0"/>
-                <a:cs typeface="Courier New" panose="02070309020205020404" pitchFamily="49" charset="0"/>
-              </a:rPr>
-              <a:t>Dog.prototype.constructor</a:t>
-            </a:r>
-            <a:r>
-              <a:rPr lang="en-US" sz="1200" dirty="0">
-                <a:latin typeface="Courier New" panose="02070309020205020404" pitchFamily="49" charset="0"/>
-                <a:cs typeface="Courier New" panose="02070309020205020404" pitchFamily="49" charset="0"/>
-              </a:rPr>
-              <a:t> = Dog</a:t>
-            </a:r>
-            <a:r>
-              <a:rPr lang="en-US" sz="1200" dirty="0" smtClean="0">
-                <a:latin typeface="Courier New" panose="02070309020205020404" pitchFamily="49" charset="0"/>
-                <a:cs typeface="Courier New" panose="02070309020205020404" pitchFamily="49" charset="0"/>
-              </a:rPr>
-              <a:t>;</a:t>
-            </a:r>
-            <a:endParaRPr lang="en-US" sz="1200" dirty="0">
-              <a:latin typeface="Courier New" panose="02070309020205020404" pitchFamily="49" charset="0"/>
-              <a:cs typeface="Courier New" panose="02070309020205020404" pitchFamily="49" charset="0"/>
-            </a:endParaRPr>
-          </a:p>
-        </p:txBody>
-      </p:sp>
-      <p:sp>
-        <p:nvSpPr>
-          <p:cNvPr id="10" name="Content Placeholder 2"/>
-          <p:cNvSpPr txBox="1">
-            <a:spLocks/>
-          </p:cNvSpPr>
-          <p:nvPr/>
-        </p:nvSpPr>
+        </p:nvPicPr>
+        <p:blipFill>
+          <a:blip r:embed="rId2">
+            <a:extLst>
+              <a:ext uri="{28A0092B-C50C-407E-A947-70E740481C1C}">
+                <a14:useLocalDpi xmlns:a14="http://schemas.microsoft.com/office/drawing/2010/main" val="0"/>
+              </a:ext>
+            </a:extLst>
+          </a:blip>
+          <a:srcRect/>
+          <a:stretch>
+            <a:fillRect/>
+          </a:stretch>
+        </p:blipFill>
         <p:spPr bwMode="auto">
           <a:xfrm>
-            <a:off x="685800" y="3493093"/>
-            <a:ext cx="5029200" cy="533400"/>
+            <a:off x="1233488" y="1962150"/>
+            <a:ext cx="6677025" cy="3981450"/>
           </a:xfrm>
           <a:prstGeom prst="rect">
             <a:avLst/>
@@ -11127,14 +11146,14 @@
             <a:ext uri="{909E8E84-426E-40DD-AFC4-6F175D3DCCD1}">
               <a14:hiddenFill xmlns:a14="http://schemas.microsoft.com/office/drawing/2010/main">
                 <a:solidFill>
-                  <a:srgbClr val="FFFFFF"/>
+                  <a:schemeClr val="accent1"/>
                 </a:solidFill>
               </a14:hiddenFill>
             </a:ext>
             <a:ext uri="{91240B29-F687-4F45-9708-019B960494DF}">
               <a14:hiddenLine xmlns:a14="http://schemas.microsoft.com/office/drawing/2010/main" w="9525">
                 <a:solidFill>
-                  <a:srgbClr val="000000"/>
+                  <a:schemeClr val="tx1"/>
                 </a:solidFill>
                 <a:miter lim="800000"/>
                 <a:headEnd/>
@@ -11143,182 +11162,11 @@
             </a:ext>
           </a:extLst>
         </p:spPr>
-        <p:txBody>
-          <a:bodyPr vert="horz" wrap="square" lIns="91440" tIns="45720" rIns="91440" bIns="45720" numCol="1" anchor="t" anchorCtr="0" compatLnSpc="1">
-            <a:prstTxWarp prst="textNoShape">
-              <a:avLst/>
-            </a:prstTxWarp>
-          </a:bodyPr>
-          <a:lstStyle>
-            <a:lvl1pPr marL="190500" indent="-190500" algn="l" rtl="0" eaLnBrk="0" fontAlgn="base" hangingPunct="0">
-              <a:spcBef>
-                <a:spcPct val="20000"/>
-              </a:spcBef>
-              <a:spcAft>
-                <a:spcPct val="0"/>
-              </a:spcAft>
-              <a:buSzPct val="80000"/>
-              <a:buFont typeface="Wingdings" pitchFamily="2" charset="2"/>
-              <a:buChar char="§"/>
-              <a:defRPr sz="2000">
-                <a:solidFill>
-                  <a:srgbClr val="32496A"/>
-                </a:solidFill>
-                <a:latin typeface="+mn-lt"/>
-                <a:ea typeface="+mn-ea"/>
-                <a:cs typeface="+mn-cs"/>
-              </a:defRPr>
-            </a:lvl1pPr>
-            <a:lvl2pPr marL="571500" indent="-190500" algn="l" rtl="0" eaLnBrk="0" fontAlgn="base" hangingPunct="0">
-              <a:spcBef>
-                <a:spcPct val="20000"/>
-              </a:spcBef>
-              <a:spcAft>
-                <a:spcPct val="0"/>
-              </a:spcAft>
-              <a:buClr>
-                <a:srgbClr val="32496A"/>
-              </a:buClr>
-              <a:buSzPct val="80000"/>
-              <a:buFont typeface="Arial" charset="0"/>
-              <a:buChar char="-"/>
-              <a:defRPr sz="2800">
-                <a:solidFill>
-                  <a:srgbClr val="32496A"/>
-                </a:solidFill>
-                <a:latin typeface="+mn-lt"/>
-              </a:defRPr>
-            </a:lvl2pPr>
-            <a:lvl3pPr marL="952500" indent="-190500" algn="l" rtl="0" eaLnBrk="0" fontAlgn="base" hangingPunct="0">
-              <a:spcBef>
-                <a:spcPct val="20000"/>
-              </a:spcBef>
-              <a:spcAft>
-                <a:spcPct val="0"/>
-              </a:spcAft>
-              <a:buClr>
-                <a:srgbClr val="32496A"/>
-              </a:buClr>
-              <a:buSzPct val="70000"/>
-              <a:buFont typeface="Wingdings" pitchFamily="2" charset="2"/>
-              <a:buChar char="à"/>
-              <a:defRPr sz="1400">
-                <a:solidFill>
-                  <a:srgbClr val="32496A"/>
-                </a:solidFill>
-                <a:latin typeface="+mn-lt"/>
-              </a:defRPr>
-            </a:lvl3pPr>
-            <a:lvl4pPr marL="1333500" indent="-190500" algn="l" rtl="0" eaLnBrk="0" fontAlgn="base" hangingPunct="0">
-              <a:spcBef>
-                <a:spcPct val="20000"/>
-              </a:spcBef>
-              <a:spcAft>
-                <a:spcPct val="0"/>
-              </a:spcAft>
-              <a:buSzPct val="80000"/>
-              <a:buFont typeface="Wingdings" pitchFamily="2" charset="2"/>
-              <a:buChar char="§"/>
-              <a:defRPr sz="1400">
-                <a:solidFill>
-                  <a:srgbClr val="32496A"/>
-                </a:solidFill>
-                <a:latin typeface="+mn-lt"/>
-              </a:defRPr>
-            </a:lvl4pPr>
-            <a:lvl5pPr marL="1714500" indent="-190500" algn="l" rtl="0" eaLnBrk="0" fontAlgn="base" hangingPunct="0">
-              <a:spcBef>
-                <a:spcPct val="20000"/>
-              </a:spcBef>
-              <a:spcAft>
-                <a:spcPct val="0"/>
-              </a:spcAft>
-              <a:buChar char="»"/>
-              <a:defRPr sz="2000">
-                <a:solidFill>
-                  <a:schemeClr val="tx1"/>
-                </a:solidFill>
-                <a:latin typeface="+mn-lt"/>
-              </a:defRPr>
-            </a:lvl5pPr>
-            <a:lvl6pPr marL="2171700" indent="-190500" algn="l" rtl="0" fontAlgn="base">
-              <a:spcBef>
-                <a:spcPct val="20000"/>
-              </a:spcBef>
-              <a:spcAft>
-                <a:spcPct val="0"/>
-              </a:spcAft>
-              <a:buChar char="»"/>
-              <a:defRPr sz="2000">
-                <a:solidFill>
-                  <a:schemeClr val="tx1"/>
-                </a:solidFill>
-                <a:latin typeface="+mn-lt"/>
-              </a:defRPr>
-            </a:lvl6pPr>
-            <a:lvl7pPr marL="2628900" indent="-190500" algn="l" rtl="0" fontAlgn="base">
-              <a:spcBef>
-                <a:spcPct val="20000"/>
-              </a:spcBef>
-              <a:spcAft>
-                <a:spcPct val="0"/>
-              </a:spcAft>
-              <a:buChar char="»"/>
-              <a:defRPr sz="2000">
-                <a:solidFill>
-                  <a:schemeClr val="tx1"/>
-                </a:solidFill>
-                <a:latin typeface="+mn-lt"/>
-              </a:defRPr>
-            </a:lvl7pPr>
-            <a:lvl8pPr marL="3086100" indent="-190500" algn="l" rtl="0" fontAlgn="base">
-              <a:spcBef>
-                <a:spcPct val="20000"/>
-              </a:spcBef>
-              <a:spcAft>
-                <a:spcPct val="0"/>
-              </a:spcAft>
-              <a:buChar char="»"/>
-              <a:defRPr sz="2000">
-                <a:solidFill>
-                  <a:schemeClr val="tx1"/>
-                </a:solidFill>
-                <a:latin typeface="+mn-lt"/>
-              </a:defRPr>
-            </a:lvl8pPr>
-            <a:lvl9pPr marL="3543300" indent="-190500" algn="l" rtl="0" fontAlgn="base">
-              <a:spcBef>
-                <a:spcPct val="20000"/>
-              </a:spcBef>
-              <a:spcAft>
-                <a:spcPct val="0"/>
-              </a:spcAft>
-              <a:buChar char="»"/>
-              <a:defRPr sz="2000">
-                <a:solidFill>
-                  <a:schemeClr val="tx1"/>
-                </a:solidFill>
-                <a:latin typeface="+mn-lt"/>
-              </a:defRPr>
-            </a:lvl9pPr>
-          </a:lstStyle>
-          <a:p>
-            <a:r>
-              <a:rPr lang="en-US" altLang="en-US" sz="2400" kern="0" dirty="0" smtClean="0"/>
-              <a:t>Inheritance – with </a:t>
-            </a:r>
-            <a:r>
-              <a:rPr lang="en-US" altLang="en-US" sz="2400" kern="0" dirty="0" err="1" smtClean="0"/>
-              <a:t>params</a:t>
-            </a:r>
-            <a:endParaRPr lang="ro-RO" altLang="en-US" sz="2400" kern="0" dirty="0" smtClean="0"/>
-          </a:p>
-        </p:txBody>
-      </p:sp>
+      </p:pic>
     </p:spTree>
     <p:extLst>
       <p:ext uri="{BB962C8B-B14F-4D97-AF65-F5344CB8AC3E}">
-        <p14:creationId xmlns:p14="http://schemas.microsoft.com/office/powerpoint/2010/main" val="1117583433"/>
+        <p14:creationId xmlns:p14="http://schemas.microsoft.com/office/powerpoint/2010/main" val="1830154489"/>
       </p:ext>
     </p:extLst>
   </p:cSld>
@@ -11354,6 +11202,684 @@
       </p:grpSpPr>
       <p:sp>
         <p:nvSpPr>
+          <p:cNvPr id="5122" name="Title 1"/>
+          <p:cNvSpPr>
+            <a:spLocks noGrp="1"/>
+          </p:cNvSpPr>
+          <p:nvPr>
+            <p:ph type="title"/>
+          </p:nvPr>
+        </p:nvSpPr>
+        <p:spPr>
+          <a:xfrm>
+            <a:off x="2286000" y="228600"/>
+            <a:ext cx="6400800" cy="563562"/>
+          </a:xfrm>
+        </p:spPr>
+        <p:txBody>
+          <a:bodyPr/>
+          <a:lstStyle/>
+          <a:p>
+            <a:r>
+              <a:rPr lang="ro-RO" altLang="en-US" sz="2400" dirty="0" smtClean="0"/>
+              <a:t>Inheritance – </a:t>
+            </a:r>
+            <a:r>
+              <a:rPr lang="en-US" altLang="en-US" sz="2400" dirty="0" smtClean="0"/>
+              <a:t>Conclusion</a:t>
+            </a:r>
+          </a:p>
+        </p:txBody>
+      </p:sp>
+      <p:sp>
+        <p:nvSpPr>
+          <p:cNvPr id="5" name="Content Placeholder 2"/>
+          <p:cNvSpPr>
+            <a:spLocks noGrp="1"/>
+          </p:cNvSpPr>
+          <p:nvPr>
+            <p:ph idx="1"/>
+          </p:nvPr>
+        </p:nvSpPr>
+        <p:spPr>
+          <a:xfrm>
+            <a:off x="685800" y="1295400"/>
+            <a:ext cx="5029200" cy="533400"/>
+          </a:xfrm>
+        </p:spPr>
+        <p:txBody>
+          <a:bodyPr/>
+          <a:lstStyle/>
+          <a:p>
+            <a:r>
+              <a:rPr lang="en-US" altLang="en-US" sz="2400" dirty="0" smtClean="0"/>
+              <a:t>Inheritance – no </a:t>
+            </a:r>
+            <a:r>
+              <a:rPr lang="en-US" altLang="en-US" sz="2400" dirty="0" err="1" smtClean="0"/>
+              <a:t>params</a:t>
+            </a:r>
+            <a:endParaRPr lang="ro-RO" altLang="en-US" sz="2400" dirty="0" smtClean="0"/>
+          </a:p>
+        </p:txBody>
+      </p:sp>
+      <p:sp>
+        <p:nvSpPr>
+          <p:cNvPr id="6" name="TextBox 5"/>
+          <p:cNvSpPr txBox="1"/>
+          <p:nvPr/>
+        </p:nvSpPr>
+        <p:spPr>
+          <a:xfrm>
+            <a:off x="6400800" y="6027139"/>
+            <a:ext cx="2169184" cy="246221"/>
+          </a:xfrm>
+          <a:prstGeom prst="rect">
+            <a:avLst/>
+          </a:prstGeom>
+          <a:noFill/>
+        </p:spPr>
+        <p:txBody>
+          <a:bodyPr wrap="none" rtlCol="0">
+            <a:spAutoFit/>
+          </a:bodyPr>
+          <a:lstStyle/>
+          <a:p>
+            <a:pPr algn="r"/>
+            <a:r>
+              <a:rPr lang="ro-RO" sz="1000" dirty="0" smtClean="0">
+                <a:solidFill>
+                  <a:schemeClr val="bg1">
+                    <a:lumMod val="75000"/>
+                  </a:schemeClr>
+                </a:solidFill>
+              </a:rPr>
+              <a:t>[</a:t>
+            </a:r>
+            <a:r>
+              <a:rPr lang="en-US" sz="1000" dirty="0" smtClean="0">
+                <a:solidFill>
+                  <a:schemeClr val="bg1">
+                    <a:lumMod val="75000"/>
+                  </a:schemeClr>
+                </a:solidFill>
+              </a:rPr>
+              <a:t>show code: Biorhythm inheritance</a:t>
+            </a:r>
+            <a:r>
+              <a:rPr lang="ro-RO" sz="1000" dirty="0" smtClean="0">
+                <a:solidFill>
+                  <a:schemeClr val="bg1">
+                    <a:lumMod val="75000"/>
+                  </a:schemeClr>
+                </a:solidFill>
+              </a:rPr>
+              <a:t>]</a:t>
+            </a:r>
+            <a:endParaRPr lang="en-US" sz="1000" dirty="0">
+              <a:solidFill>
+                <a:schemeClr val="bg1">
+                  <a:lumMod val="75000"/>
+                </a:schemeClr>
+              </a:solidFill>
+            </a:endParaRPr>
+          </a:p>
+        </p:txBody>
+      </p:sp>
+      <p:sp>
+        <p:nvSpPr>
+          <p:cNvPr id="7" name="TextBox 6"/>
+          <p:cNvSpPr txBox="1"/>
+          <p:nvPr/>
+        </p:nvSpPr>
+        <p:spPr>
+          <a:xfrm>
+            <a:off x="3352800" y="6459379"/>
+            <a:ext cx="2518638" cy="246221"/>
+          </a:xfrm>
+          <a:prstGeom prst="rect">
+            <a:avLst/>
+          </a:prstGeom>
+          <a:solidFill>
+            <a:schemeClr val="bg1"/>
+          </a:solidFill>
+        </p:spPr>
+        <p:txBody>
+          <a:bodyPr wrap="none" rtlCol="0">
+            <a:spAutoFit/>
+          </a:bodyPr>
+          <a:lstStyle/>
+          <a:p>
+            <a:r>
+              <a:rPr lang="en-US" sz="1000" dirty="0" smtClean="0">
+                <a:solidFill>
+                  <a:schemeClr val="bg1">
+                    <a:lumMod val="50000"/>
+                  </a:schemeClr>
+                </a:solidFill>
+              </a:rPr>
+              <a:t>© iQuest Group 2013. All rights reserved.</a:t>
+            </a:r>
+          </a:p>
+        </p:txBody>
+      </p:sp>
+      <p:sp>
+        <p:nvSpPr>
+          <p:cNvPr id="3" name="TextBox 2"/>
+          <p:cNvSpPr txBox="1"/>
+          <p:nvPr/>
+        </p:nvSpPr>
+        <p:spPr>
+          <a:xfrm>
+            <a:off x="2057400" y="1905000"/>
+            <a:ext cx="3159839" cy="1200329"/>
+          </a:xfrm>
+          <a:prstGeom prst="rect">
+            <a:avLst/>
+          </a:prstGeom>
+          <a:noFill/>
+        </p:spPr>
+        <p:txBody>
+          <a:bodyPr wrap="none" rtlCol="0">
+            <a:spAutoFit/>
+          </a:bodyPr>
+          <a:lstStyle/>
+          <a:p>
+            <a:r>
+              <a:rPr lang="en-US" sz="1200" dirty="0">
+                <a:latin typeface="Courier New" panose="02070309020205020404" pitchFamily="49" charset="0"/>
+                <a:cs typeface="Courier New" panose="02070309020205020404" pitchFamily="49" charset="0"/>
+              </a:rPr>
+              <a:t>function Animal() </a:t>
+            </a:r>
+            <a:r>
+              <a:rPr lang="en-US" sz="1200" dirty="0" smtClean="0">
+                <a:latin typeface="Courier New" panose="02070309020205020404" pitchFamily="49" charset="0"/>
+                <a:cs typeface="Courier New" panose="02070309020205020404" pitchFamily="49" charset="0"/>
+              </a:rPr>
+              <a:t>{}</a:t>
+            </a:r>
+          </a:p>
+          <a:p>
+            <a:endParaRPr lang="en-US" sz="1200" dirty="0">
+              <a:latin typeface="Courier New" panose="02070309020205020404" pitchFamily="49" charset="0"/>
+              <a:cs typeface="Courier New" panose="02070309020205020404" pitchFamily="49" charset="0"/>
+            </a:endParaRPr>
+          </a:p>
+          <a:p>
+            <a:r>
+              <a:rPr lang="en-US" sz="1200" dirty="0">
+                <a:latin typeface="Courier New" panose="02070309020205020404" pitchFamily="49" charset="0"/>
+                <a:cs typeface="Courier New" panose="02070309020205020404" pitchFamily="49" charset="0"/>
+              </a:rPr>
+              <a:t>function Dog() {}</a:t>
+            </a:r>
+          </a:p>
+          <a:p>
+            <a:endParaRPr lang="en-US" sz="1200" dirty="0">
+              <a:latin typeface="Courier New" panose="02070309020205020404" pitchFamily="49" charset="0"/>
+              <a:cs typeface="Courier New" panose="02070309020205020404" pitchFamily="49" charset="0"/>
+            </a:endParaRPr>
+          </a:p>
+          <a:p>
+            <a:r>
+              <a:rPr lang="en-US" sz="1200" dirty="0" err="1">
+                <a:latin typeface="Courier New" panose="02070309020205020404" pitchFamily="49" charset="0"/>
+                <a:cs typeface="Courier New" panose="02070309020205020404" pitchFamily="49" charset="0"/>
+              </a:rPr>
+              <a:t>Dog.prototype</a:t>
+            </a:r>
+            <a:r>
+              <a:rPr lang="en-US" sz="1200" dirty="0">
+                <a:latin typeface="Courier New" panose="02070309020205020404" pitchFamily="49" charset="0"/>
+                <a:cs typeface="Courier New" panose="02070309020205020404" pitchFamily="49" charset="0"/>
+              </a:rPr>
+              <a:t> = new Animal();</a:t>
+            </a:r>
+          </a:p>
+          <a:p>
+            <a:r>
+              <a:rPr lang="en-US" sz="1200" dirty="0" err="1">
+                <a:latin typeface="Courier New" panose="02070309020205020404" pitchFamily="49" charset="0"/>
+                <a:cs typeface="Courier New" panose="02070309020205020404" pitchFamily="49" charset="0"/>
+              </a:rPr>
+              <a:t>Dog.prototype.constructor</a:t>
+            </a:r>
+            <a:r>
+              <a:rPr lang="en-US" sz="1200" dirty="0">
+                <a:latin typeface="Courier New" panose="02070309020205020404" pitchFamily="49" charset="0"/>
+                <a:cs typeface="Courier New" panose="02070309020205020404" pitchFamily="49" charset="0"/>
+              </a:rPr>
+              <a:t> = Dog</a:t>
+            </a:r>
+            <a:r>
+              <a:rPr lang="en-US" sz="1200" dirty="0" smtClean="0">
+                <a:latin typeface="Courier New" panose="02070309020205020404" pitchFamily="49" charset="0"/>
+                <a:cs typeface="Courier New" panose="02070309020205020404" pitchFamily="49" charset="0"/>
+              </a:rPr>
+              <a:t>;</a:t>
+            </a:r>
+            <a:endParaRPr lang="en-US" sz="1200" dirty="0">
+              <a:latin typeface="Courier New" panose="02070309020205020404" pitchFamily="49" charset="0"/>
+              <a:cs typeface="Courier New" panose="02070309020205020404" pitchFamily="49" charset="0"/>
+            </a:endParaRPr>
+          </a:p>
+        </p:txBody>
+      </p:sp>
+      <p:sp>
+        <p:nvSpPr>
+          <p:cNvPr id="4" name="TextBox 3"/>
+          <p:cNvSpPr txBox="1"/>
+          <p:nvPr/>
+        </p:nvSpPr>
+        <p:spPr>
+          <a:xfrm>
+            <a:off x="2058174" y="4084260"/>
+            <a:ext cx="4647426" cy="1569660"/>
+          </a:xfrm>
+          <a:prstGeom prst="rect">
+            <a:avLst/>
+          </a:prstGeom>
+          <a:noFill/>
+        </p:spPr>
+        <p:txBody>
+          <a:bodyPr wrap="none" rtlCol="0">
+            <a:spAutoFit/>
+          </a:bodyPr>
+          <a:lstStyle/>
+          <a:p>
+            <a:r>
+              <a:rPr lang="en-US" sz="1200" dirty="0">
+                <a:latin typeface="Courier New" panose="02070309020205020404" pitchFamily="49" charset="0"/>
+                <a:cs typeface="Courier New" panose="02070309020205020404" pitchFamily="49" charset="0"/>
+              </a:rPr>
+              <a:t>function Animal(name) </a:t>
+            </a:r>
+            <a:r>
+              <a:rPr lang="en-US" sz="1200" dirty="0" smtClean="0">
+                <a:latin typeface="Courier New" panose="02070309020205020404" pitchFamily="49" charset="0"/>
+                <a:cs typeface="Courier New" panose="02070309020205020404" pitchFamily="49" charset="0"/>
+              </a:rPr>
+              <a:t>{}</a:t>
+            </a:r>
+          </a:p>
+          <a:p>
+            <a:endParaRPr lang="en-US" sz="1200" dirty="0">
+              <a:latin typeface="Courier New" panose="02070309020205020404" pitchFamily="49" charset="0"/>
+              <a:cs typeface="Courier New" panose="02070309020205020404" pitchFamily="49" charset="0"/>
+            </a:endParaRPr>
+          </a:p>
+          <a:p>
+            <a:r>
+              <a:rPr lang="en-US" sz="1200" dirty="0">
+                <a:latin typeface="Courier New" panose="02070309020205020404" pitchFamily="49" charset="0"/>
+                <a:cs typeface="Courier New" panose="02070309020205020404" pitchFamily="49" charset="0"/>
+              </a:rPr>
+              <a:t>function Dog(name) {</a:t>
+            </a:r>
+          </a:p>
+          <a:p>
+            <a:r>
+              <a:rPr lang="en-US" sz="1200" dirty="0">
+                <a:latin typeface="Courier New" panose="02070309020205020404" pitchFamily="49" charset="0"/>
+                <a:cs typeface="Courier New" panose="02070309020205020404" pitchFamily="49" charset="0"/>
+              </a:rPr>
+              <a:t>    </a:t>
+            </a:r>
+            <a:r>
+              <a:rPr lang="en-US" sz="1200" dirty="0" err="1">
+                <a:latin typeface="Courier New" panose="02070309020205020404" pitchFamily="49" charset="0"/>
+                <a:cs typeface="Courier New" panose="02070309020205020404" pitchFamily="49" charset="0"/>
+              </a:rPr>
+              <a:t>Animal.call</a:t>
+            </a:r>
+            <a:r>
+              <a:rPr lang="en-US" sz="1200" dirty="0">
+                <a:latin typeface="Courier New" panose="02070309020205020404" pitchFamily="49" charset="0"/>
+                <a:cs typeface="Courier New" panose="02070309020205020404" pitchFamily="49" charset="0"/>
+              </a:rPr>
+              <a:t>(this, name);</a:t>
+            </a:r>
+          </a:p>
+          <a:p>
+            <a:r>
+              <a:rPr lang="en-US" sz="1200" dirty="0">
+                <a:latin typeface="Courier New" panose="02070309020205020404" pitchFamily="49" charset="0"/>
+                <a:cs typeface="Courier New" panose="02070309020205020404" pitchFamily="49" charset="0"/>
+              </a:rPr>
+              <a:t>}</a:t>
+            </a:r>
+          </a:p>
+          <a:p>
+            <a:endParaRPr lang="en-US" sz="1200" dirty="0">
+              <a:latin typeface="Courier New" panose="02070309020205020404" pitchFamily="49" charset="0"/>
+              <a:cs typeface="Courier New" panose="02070309020205020404" pitchFamily="49" charset="0"/>
+            </a:endParaRPr>
+          </a:p>
+          <a:p>
+            <a:r>
+              <a:rPr lang="en-US" sz="1200" dirty="0" err="1">
+                <a:latin typeface="Courier New" panose="02070309020205020404" pitchFamily="49" charset="0"/>
+                <a:cs typeface="Courier New" panose="02070309020205020404" pitchFamily="49" charset="0"/>
+              </a:rPr>
+              <a:t>Dog.prototype</a:t>
+            </a:r>
+            <a:r>
+              <a:rPr lang="en-US" sz="1200" dirty="0">
+                <a:latin typeface="Courier New" panose="02070309020205020404" pitchFamily="49" charset="0"/>
+                <a:cs typeface="Courier New" panose="02070309020205020404" pitchFamily="49" charset="0"/>
+              </a:rPr>
+              <a:t> = </a:t>
+            </a:r>
+            <a:r>
+              <a:rPr lang="en-US" sz="1200" dirty="0" err="1">
+                <a:latin typeface="Courier New" panose="02070309020205020404" pitchFamily="49" charset="0"/>
+                <a:cs typeface="Courier New" panose="02070309020205020404" pitchFamily="49" charset="0"/>
+              </a:rPr>
+              <a:t>Object.create</a:t>
+            </a:r>
+            <a:r>
+              <a:rPr lang="en-US" sz="1200" dirty="0">
+                <a:latin typeface="Courier New" panose="02070309020205020404" pitchFamily="49" charset="0"/>
+                <a:cs typeface="Courier New" panose="02070309020205020404" pitchFamily="49" charset="0"/>
+              </a:rPr>
+              <a:t>(</a:t>
+            </a:r>
+            <a:r>
+              <a:rPr lang="en-US" sz="1200" dirty="0" err="1">
+                <a:latin typeface="Courier New" panose="02070309020205020404" pitchFamily="49" charset="0"/>
+                <a:cs typeface="Courier New" panose="02070309020205020404" pitchFamily="49" charset="0"/>
+              </a:rPr>
+              <a:t>Animal.prototype</a:t>
+            </a:r>
+            <a:r>
+              <a:rPr lang="en-US" sz="1200" dirty="0">
+                <a:latin typeface="Courier New" panose="02070309020205020404" pitchFamily="49" charset="0"/>
+                <a:cs typeface="Courier New" panose="02070309020205020404" pitchFamily="49" charset="0"/>
+              </a:rPr>
+              <a:t>);</a:t>
+            </a:r>
+          </a:p>
+          <a:p>
+            <a:r>
+              <a:rPr lang="en-US" sz="1200" dirty="0" err="1">
+                <a:latin typeface="Courier New" panose="02070309020205020404" pitchFamily="49" charset="0"/>
+                <a:cs typeface="Courier New" panose="02070309020205020404" pitchFamily="49" charset="0"/>
+              </a:rPr>
+              <a:t>Dog.prototype.constructor</a:t>
+            </a:r>
+            <a:r>
+              <a:rPr lang="en-US" sz="1200" dirty="0">
+                <a:latin typeface="Courier New" panose="02070309020205020404" pitchFamily="49" charset="0"/>
+                <a:cs typeface="Courier New" panose="02070309020205020404" pitchFamily="49" charset="0"/>
+              </a:rPr>
+              <a:t> = Dog</a:t>
+            </a:r>
+            <a:r>
+              <a:rPr lang="en-US" sz="1200" dirty="0" smtClean="0">
+                <a:latin typeface="Courier New" panose="02070309020205020404" pitchFamily="49" charset="0"/>
+                <a:cs typeface="Courier New" panose="02070309020205020404" pitchFamily="49" charset="0"/>
+              </a:rPr>
+              <a:t>;</a:t>
+            </a:r>
+            <a:endParaRPr lang="en-US" sz="1200" dirty="0">
+              <a:latin typeface="Courier New" panose="02070309020205020404" pitchFamily="49" charset="0"/>
+              <a:cs typeface="Courier New" panose="02070309020205020404" pitchFamily="49" charset="0"/>
+            </a:endParaRPr>
+          </a:p>
+        </p:txBody>
+      </p:sp>
+      <p:sp>
+        <p:nvSpPr>
+          <p:cNvPr id="10" name="Content Placeholder 2"/>
+          <p:cNvSpPr txBox="1">
+            <a:spLocks/>
+          </p:cNvSpPr>
+          <p:nvPr/>
+        </p:nvSpPr>
+        <p:spPr bwMode="auto">
+          <a:xfrm>
+            <a:off x="685800" y="3493093"/>
+            <a:ext cx="5029200" cy="533400"/>
+          </a:xfrm>
+          <a:prstGeom prst="rect">
+            <a:avLst/>
+          </a:prstGeom>
+          <a:noFill/>
+          <a:ln>
+            <a:noFill/>
+          </a:ln>
+          <a:extLst>
+            <a:ext uri="{909E8E84-426E-40DD-AFC4-6F175D3DCCD1}">
+              <a14:hiddenFill xmlns:a14="http://schemas.microsoft.com/office/drawing/2010/main">
+                <a:solidFill>
+                  <a:srgbClr val="FFFFFF"/>
+                </a:solidFill>
+              </a14:hiddenFill>
+            </a:ext>
+            <a:ext uri="{91240B29-F687-4F45-9708-019B960494DF}">
+              <a14:hiddenLine xmlns:a14="http://schemas.microsoft.com/office/drawing/2010/main" w="9525">
+                <a:solidFill>
+                  <a:srgbClr val="000000"/>
+                </a:solidFill>
+                <a:miter lim="800000"/>
+                <a:headEnd/>
+                <a:tailEnd/>
+              </a14:hiddenLine>
+            </a:ext>
+          </a:extLst>
+        </p:spPr>
+        <p:txBody>
+          <a:bodyPr vert="horz" wrap="square" lIns="91440" tIns="45720" rIns="91440" bIns="45720" numCol="1" anchor="t" anchorCtr="0" compatLnSpc="1">
+            <a:prstTxWarp prst="textNoShape">
+              <a:avLst/>
+            </a:prstTxWarp>
+          </a:bodyPr>
+          <a:lstStyle>
+            <a:lvl1pPr marL="190500" indent="-190500" algn="l" rtl="0" eaLnBrk="0" fontAlgn="base" hangingPunct="0">
+              <a:spcBef>
+                <a:spcPct val="20000"/>
+              </a:spcBef>
+              <a:spcAft>
+                <a:spcPct val="0"/>
+              </a:spcAft>
+              <a:buSzPct val="80000"/>
+              <a:buFont typeface="Wingdings" pitchFamily="2" charset="2"/>
+              <a:buChar char="§"/>
+              <a:defRPr sz="2000">
+                <a:solidFill>
+                  <a:srgbClr val="32496A"/>
+                </a:solidFill>
+                <a:latin typeface="+mn-lt"/>
+                <a:ea typeface="+mn-ea"/>
+                <a:cs typeface="+mn-cs"/>
+              </a:defRPr>
+            </a:lvl1pPr>
+            <a:lvl2pPr marL="571500" indent="-190500" algn="l" rtl="0" eaLnBrk="0" fontAlgn="base" hangingPunct="0">
+              <a:spcBef>
+                <a:spcPct val="20000"/>
+              </a:spcBef>
+              <a:spcAft>
+                <a:spcPct val="0"/>
+              </a:spcAft>
+              <a:buClr>
+                <a:srgbClr val="32496A"/>
+              </a:buClr>
+              <a:buSzPct val="80000"/>
+              <a:buFont typeface="Arial" charset="0"/>
+              <a:buChar char="-"/>
+              <a:defRPr sz="2800">
+                <a:solidFill>
+                  <a:srgbClr val="32496A"/>
+                </a:solidFill>
+                <a:latin typeface="+mn-lt"/>
+              </a:defRPr>
+            </a:lvl2pPr>
+            <a:lvl3pPr marL="952500" indent="-190500" algn="l" rtl="0" eaLnBrk="0" fontAlgn="base" hangingPunct="0">
+              <a:spcBef>
+                <a:spcPct val="20000"/>
+              </a:spcBef>
+              <a:spcAft>
+                <a:spcPct val="0"/>
+              </a:spcAft>
+              <a:buClr>
+                <a:srgbClr val="32496A"/>
+              </a:buClr>
+              <a:buSzPct val="70000"/>
+              <a:buFont typeface="Wingdings" pitchFamily="2" charset="2"/>
+              <a:buChar char="à"/>
+              <a:defRPr sz="1400">
+                <a:solidFill>
+                  <a:srgbClr val="32496A"/>
+                </a:solidFill>
+                <a:latin typeface="+mn-lt"/>
+              </a:defRPr>
+            </a:lvl3pPr>
+            <a:lvl4pPr marL="1333500" indent="-190500" algn="l" rtl="0" eaLnBrk="0" fontAlgn="base" hangingPunct="0">
+              <a:spcBef>
+                <a:spcPct val="20000"/>
+              </a:spcBef>
+              <a:spcAft>
+                <a:spcPct val="0"/>
+              </a:spcAft>
+              <a:buSzPct val="80000"/>
+              <a:buFont typeface="Wingdings" pitchFamily="2" charset="2"/>
+              <a:buChar char="§"/>
+              <a:defRPr sz="1400">
+                <a:solidFill>
+                  <a:srgbClr val="32496A"/>
+                </a:solidFill>
+                <a:latin typeface="+mn-lt"/>
+              </a:defRPr>
+            </a:lvl4pPr>
+            <a:lvl5pPr marL="1714500" indent="-190500" algn="l" rtl="0" eaLnBrk="0" fontAlgn="base" hangingPunct="0">
+              <a:spcBef>
+                <a:spcPct val="20000"/>
+              </a:spcBef>
+              <a:spcAft>
+                <a:spcPct val="0"/>
+              </a:spcAft>
+              <a:buChar char="»"/>
+              <a:defRPr sz="2000">
+                <a:solidFill>
+                  <a:schemeClr val="tx1"/>
+                </a:solidFill>
+                <a:latin typeface="+mn-lt"/>
+              </a:defRPr>
+            </a:lvl5pPr>
+            <a:lvl6pPr marL="2171700" indent="-190500" algn="l" rtl="0" fontAlgn="base">
+              <a:spcBef>
+                <a:spcPct val="20000"/>
+              </a:spcBef>
+              <a:spcAft>
+                <a:spcPct val="0"/>
+              </a:spcAft>
+              <a:buChar char="»"/>
+              <a:defRPr sz="2000">
+                <a:solidFill>
+                  <a:schemeClr val="tx1"/>
+                </a:solidFill>
+                <a:latin typeface="+mn-lt"/>
+              </a:defRPr>
+            </a:lvl6pPr>
+            <a:lvl7pPr marL="2628900" indent="-190500" algn="l" rtl="0" fontAlgn="base">
+              <a:spcBef>
+                <a:spcPct val="20000"/>
+              </a:spcBef>
+              <a:spcAft>
+                <a:spcPct val="0"/>
+              </a:spcAft>
+              <a:buChar char="»"/>
+              <a:defRPr sz="2000">
+                <a:solidFill>
+                  <a:schemeClr val="tx1"/>
+                </a:solidFill>
+                <a:latin typeface="+mn-lt"/>
+              </a:defRPr>
+            </a:lvl7pPr>
+            <a:lvl8pPr marL="3086100" indent="-190500" algn="l" rtl="0" fontAlgn="base">
+              <a:spcBef>
+                <a:spcPct val="20000"/>
+              </a:spcBef>
+              <a:spcAft>
+                <a:spcPct val="0"/>
+              </a:spcAft>
+              <a:buChar char="»"/>
+              <a:defRPr sz="2000">
+                <a:solidFill>
+                  <a:schemeClr val="tx1"/>
+                </a:solidFill>
+                <a:latin typeface="+mn-lt"/>
+              </a:defRPr>
+            </a:lvl8pPr>
+            <a:lvl9pPr marL="3543300" indent="-190500" algn="l" rtl="0" fontAlgn="base">
+              <a:spcBef>
+                <a:spcPct val="20000"/>
+              </a:spcBef>
+              <a:spcAft>
+                <a:spcPct val="0"/>
+              </a:spcAft>
+              <a:buChar char="»"/>
+              <a:defRPr sz="2000">
+                <a:solidFill>
+                  <a:schemeClr val="tx1"/>
+                </a:solidFill>
+                <a:latin typeface="+mn-lt"/>
+              </a:defRPr>
+            </a:lvl9pPr>
+          </a:lstStyle>
+          <a:p>
+            <a:r>
+              <a:rPr lang="en-US" altLang="en-US" sz="2400" kern="0" dirty="0" smtClean="0"/>
+              <a:t>Inheritance – with </a:t>
+            </a:r>
+            <a:r>
+              <a:rPr lang="en-US" altLang="en-US" sz="2400" kern="0" dirty="0" err="1" smtClean="0"/>
+              <a:t>params</a:t>
+            </a:r>
+            <a:endParaRPr lang="ro-RO" altLang="en-US" sz="2400" kern="0" dirty="0" smtClean="0"/>
+          </a:p>
+        </p:txBody>
+      </p:sp>
+    </p:spTree>
+    <p:extLst>
+      <p:ext uri="{BB962C8B-B14F-4D97-AF65-F5344CB8AC3E}">
+        <p14:creationId xmlns:p14="http://schemas.microsoft.com/office/powerpoint/2010/main" val="1117583433"/>
+      </p:ext>
+    </p:extLst>
+  </p:cSld>
+  <p:clrMapOvr>
+    <a:masterClrMapping/>
+  </p:clrMapOvr>
+  <p:timing>
+    <p:tnLst>
+      <p:par>
+        <p:cTn id="1" dur="indefinite" restart="never" nodeType="tmRoot"/>
+      </p:par>
+    </p:tnLst>
+  </p:timing>
+</p:sld>
+</file>
+
+<file path=ppt/slides/slide25.xml><?xml version="1.0" encoding="utf-8"?>
+<p:sld xmlns:a="http://schemas.openxmlformats.org/drawingml/2006/main" xmlns:r="http://schemas.openxmlformats.org/officeDocument/2006/relationships" xmlns:p="http://schemas.openxmlformats.org/presentationml/2006/main">
+  <p:cSld>
+    <p:spTree>
+      <p:nvGrpSpPr>
+        <p:cNvPr id="1" name=""/>
+        <p:cNvGrpSpPr/>
+        <p:nvPr/>
+      </p:nvGrpSpPr>
+      <p:grpSpPr>
+        <a:xfrm>
+          <a:off x="0" y="0"/>
+          <a:ext cx="0" cy="0"/>
+          <a:chOff x="0" y="0"/>
+          <a:chExt cx="0" cy="0"/>
+        </a:xfrm>
+      </p:grpSpPr>
+      <p:sp>
+        <p:nvSpPr>
           <p:cNvPr id="2" name="Title 1"/>
           <p:cNvSpPr>
             <a:spLocks noGrp="1"/>
@@ -11547,7 +12073,7 @@
 </p:sld>
 </file>
 
-<file path=ppt/slides/slide25.xml><?xml version="1.0" encoding="utf-8"?>
+<file path=ppt/slides/slide26.xml><?xml version="1.0" encoding="utf-8"?>
 <p:sld xmlns:a="http://schemas.openxmlformats.org/drawingml/2006/main" xmlns:r="http://schemas.openxmlformats.org/officeDocument/2006/relationships" xmlns:p="http://schemas.openxmlformats.org/presentationml/2006/main">
   <p:cSld>
     <p:spTree>
@@ -13939,9 +14465,234 @@
   <p:timing>
     <p:tnLst>
       <p:par>
-        <p:cTn id="1" dur="indefinite" restart="never" nodeType="tmRoot"/>
+        <p:cTn id="1" dur="indefinite" restart="never" nodeType="tmRoot">
+          <p:childTnLst>
+            <p:seq concurrent="1" nextAc="seek">
+              <p:cTn id="2" dur="indefinite" nodeType="mainSeq">
+                <p:childTnLst>
+                  <p:par>
+                    <p:cTn id="3" fill="hold">
+                      <p:stCondLst>
+                        <p:cond delay="indefinite"/>
+                        <p:cond evt="onBegin" delay="0">
+                          <p:tn val="2"/>
+                        </p:cond>
+                      </p:stCondLst>
+                      <p:childTnLst>
+                        <p:par>
+                          <p:cTn id="4" fill="hold">
+                            <p:stCondLst>
+                              <p:cond delay="0"/>
+                            </p:stCondLst>
+                            <p:childTnLst>
+                              <p:par>
+                                <p:cTn id="5" presetID="53" presetClass="entr" presetSubtype="16" fill="hold" nodeType="withEffect">
+                                  <p:stCondLst>
+                                    <p:cond delay="0"/>
+                                  </p:stCondLst>
+                                  <p:childTnLst>
+                                    <p:set>
+                                      <p:cBhvr>
+                                        <p:cTn id="6" dur="1" fill="hold">
+                                          <p:stCondLst>
+                                            <p:cond delay="0"/>
+                                          </p:stCondLst>
+                                        </p:cTn>
+                                        <p:tgtEl>
+                                          <p:spTgt spid="7170"/>
+                                        </p:tgtEl>
+                                        <p:attrNameLst>
+                                          <p:attrName>style.visibility</p:attrName>
+                                        </p:attrNameLst>
+                                      </p:cBhvr>
+                                      <p:to>
+                                        <p:strVal val="visible"/>
+                                      </p:to>
+                                    </p:set>
+                                    <p:anim calcmode="lin" valueType="num">
+                                      <p:cBhvr>
+                                        <p:cTn id="7" dur="500" fill="hold"/>
+                                        <p:tgtEl>
+                                          <p:spTgt spid="7170"/>
+                                        </p:tgtEl>
+                                        <p:attrNameLst>
+                                          <p:attrName>ppt_w</p:attrName>
+                                        </p:attrNameLst>
+                                      </p:cBhvr>
+                                      <p:tavLst>
+                                        <p:tav tm="0">
+                                          <p:val>
+                                            <p:fltVal val="0"/>
+                                          </p:val>
+                                        </p:tav>
+                                        <p:tav tm="100000">
+                                          <p:val>
+                                            <p:strVal val="#ppt_w"/>
+                                          </p:val>
+                                        </p:tav>
+                                      </p:tavLst>
+                                    </p:anim>
+                                    <p:anim calcmode="lin" valueType="num">
+                                      <p:cBhvr>
+                                        <p:cTn id="8" dur="500" fill="hold"/>
+                                        <p:tgtEl>
+                                          <p:spTgt spid="7170"/>
+                                        </p:tgtEl>
+                                        <p:attrNameLst>
+                                          <p:attrName>ppt_h</p:attrName>
+                                        </p:attrNameLst>
+                                      </p:cBhvr>
+                                      <p:tavLst>
+                                        <p:tav tm="0">
+                                          <p:val>
+                                            <p:fltVal val="0"/>
+                                          </p:val>
+                                        </p:tav>
+                                        <p:tav tm="100000">
+                                          <p:val>
+                                            <p:strVal val="#ppt_h"/>
+                                          </p:val>
+                                        </p:tav>
+                                      </p:tavLst>
+                                    </p:anim>
+                                    <p:animEffect transition="in" filter="fade">
+                                      <p:cBhvr>
+                                        <p:cTn id="9" dur="500"/>
+                                        <p:tgtEl>
+                                          <p:spTgt spid="7170"/>
+                                        </p:tgtEl>
+                                      </p:cBhvr>
+                                    </p:animEffect>
+                                  </p:childTnLst>
+                                </p:cTn>
+                              </p:par>
+                              <p:par>
+                                <p:cTn id="10" presetID="53" presetClass="entr" presetSubtype="16" fill="hold" grpId="0" nodeType="withEffect">
+                                  <p:stCondLst>
+                                    <p:cond delay="0"/>
+                                  </p:stCondLst>
+                                  <p:childTnLst>
+                                    <p:set>
+                                      <p:cBhvr>
+                                        <p:cTn id="11" dur="1" fill="hold">
+                                          <p:stCondLst>
+                                            <p:cond delay="0"/>
+                                          </p:stCondLst>
+                                        </p:cTn>
+                                        <p:tgtEl>
+                                          <p:spTgt spid="6">
+                                            <p:txEl>
+                                              <p:pRg st="0" end="0"/>
+                                            </p:txEl>
+                                          </p:spTgt>
+                                        </p:tgtEl>
+                                        <p:attrNameLst>
+                                          <p:attrName>style.visibility</p:attrName>
+                                        </p:attrNameLst>
+                                      </p:cBhvr>
+                                      <p:to>
+                                        <p:strVal val="visible"/>
+                                      </p:to>
+                                    </p:set>
+                                    <p:anim calcmode="lin" valueType="num">
+                                      <p:cBhvr>
+                                        <p:cTn id="12" dur="500" fill="hold"/>
+                                        <p:tgtEl>
+                                          <p:spTgt spid="6">
+                                            <p:txEl>
+                                              <p:pRg st="0" end="0"/>
+                                            </p:txEl>
+                                          </p:spTgt>
+                                        </p:tgtEl>
+                                        <p:attrNameLst>
+                                          <p:attrName>ppt_w</p:attrName>
+                                        </p:attrNameLst>
+                                      </p:cBhvr>
+                                      <p:tavLst>
+                                        <p:tav tm="0">
+                                          <p:val>
+                                            <p:fltVal val="0"/>
+                                          </p:val>
+                                        </p:tav>
+                                        <p:tav tm="100000">
+                                          <p:val>
+                                            <p:strVal val="#ppt_w"/>
+                                          </p:val>
+                                        </p:tav>
+                                      </p:tavLst>
+                                    </p:anim>
+                                    <p:anim calcmode="lin" valueType="num">
+                                      <p:cBhvr>
+                                        <p:cTn id="13" dur="500" fill="hold"/>
+                                        <p:tgtEl>
+                                          <p:spTgt spid="6">
+                                            <p:txEl>
+                                              <p:pRg st="0" end="0"/>
+                                            </p:txEl>
+                                          </p:spTgt>
+                                        </p:tgtEl>
+                                        <p:attrNameLst>
+                                          <p:attrName>ppt_h</p:attrName>
+                                        </p:attrNameLst>
+                                      </p:cBhvr>
+                                      <p:tavLst>
+                                        <p:tav tm="0">
+                                          <p:val>
+                                            <p:fltVal val="0"/>
+                                          </p:val>
+                                        </p:tav>
+                                        <p:tav tm="100000">
+                                          <p:val>
+                                            <p:strVal val="#ppt_h"/>
+                                          </p:val>
+                                        </p:tav>
+                                      </p:tavLst>
+                                    </p:anim>
+                                    <p:animEffect transition="in" filter="fade">
+                                      <p:cBhvr>
+                                        <p:cTn id="14" dur="500"/>
+                                        <p:tgtEl>
+                                          <p:spTgt spid="6">
+                                            <p:txEl>
+                                              <p:pRg st="0" end="0"/>
+                                            </p:txEl>
+                                          </p:spTgt>
+                                        </p:tgtEl>
+                                      </p:cBhvr>
+                                    </p:animEffect>
+                                  </p:childTnLst>
+                                </p:cTn>
+                              </p:par>
+                            </p:childTnLst>
+                          </p:cTn>
+                        </p:par>
+                      </p:childTnLst>
+                    </p:cTn>
+                  </p:par>
+                </p:childTnLst>
+              </p:cTn>
+              <p:prevCondLst>
+                <p:cond evt="onPrev" delay="0">
+                  <p:tgtEl>
+                    <p:sldTgt/>
+                  </p:tgtEl>
+                </p:cond>
+              </p:prevCondLst>
+              <p:nextCondLst>
+                <p:cond evt="onNext" delay="0">
+                  <p:tgtEl>
+                    <p:sldTgt/>
+                  </p:tgtEl>
+                </p:cond>
+              </p:nextCondLst>
+            </p:seq>
+          </p:childTnLst>
+        </p:cTn>
       </p:par>
     </p:tnLst>
+    <p:bldLst>
+      <p:bldP spid="6" grpId="0" build="p"/>
+    </p:bldLst>
   </p:timing>
 </p:sld>
 </file>
@@ -14170,7 +14921,7 @@
         </p:nvSpPr>
         <p:spPr>
           <a:xfrm>
-            <a:off x="685800" y="1371600"/>
+            <a:off x="685800" y="1295400"/>
             <a:ext cx="6172200" cy="533400"/>
           </a:xfrm>
         </p:spPr>
@@ -14180,15 +14931,7 @@
           <a:p>
             <a:r>
               <a:rPr lang="en-US" altLang="en-US" sz="2400" dirty="0" smtClean="0"/>
-              <a:t>How </a:t>
-            </a:r>
-            <a:r>
-              <a:rPr lang="en-US" altLang="en-US" sz="2400" dirty="0" err="1" smtClean="0"/>
-              <a:t>javascript</a:t>
-            </a:r>
-            <a:r>
-              <a:rPr lang="en-US" altLang="en-US" sz="2400" dirty="0" smtClean="0"/>
-              <a:t> runtime calls a function</a:t>
+              <a:t>A function</a:t>
             </a:r>
             <a:endParaRPr lang="ro-RO" altLang="en-US" sz="2400" dirty="0" smtClean="0"/>
           </a:p>
@@ -14202,7 +14945,7 @@
         </p:nvSpPr>
         <p:spPr>
           <a:xfrm>
-            <a:off x="1267626" y="2286000"/>
+            <a:off x="1143001" y="1828800"/>
             <a:ext cx="2416046" cy="276999"/>
           </a:xfrm>
           <a:prstGeom prst="rect">
@@ -14248,8 +14991,8 @@
         </p:nvSpPr>
         <p:spPr>
           <a:xfrm>
-            <a:off x="1267626" y="2971800"/>
-            <a:ext cx="7225055" cy="1015663"/>
+            <a:off x="1143001" y="2946737"/>
+            <a:ext cx="7689926" cy="1015663"/>
           </a:xfrm>
           <a:prstGeom prst="rect">
             <a:avLst/>
@@ -14324,7 +15067,7 @@
                 <a:cs typeface="Courier New" panose="02070309020205020404" pitchFamily="49" charset="0"/>
                 <a:sym typeface="Wingdings" panose="05000000000000000000" pitchFamily="2" charset="2"/>
               </a:rPr>
-              <a:t>(null); // ES5</a:t>
+              <a:t>(undefined); // ES5</a:t>
             </a:r>
           </a:p>
           <a:p>
@@ -14431,7 +15174,7 @@
                 <a:cs typeface="Courier New" panose="02070309020205020404" pitchFamily="49" charset="0"/>
                 <a:sym typeface="Wingdings" panose="05000000000000000000" pitchFamily="2" charset="2"/>
               </a:rPr>
-              <a:t>(null, </a:t>
+              <a:t>(undefined, </a:t>
             </a:r>
             <a:r>
               <a:rPr lang="en-US" sz="1200" dirty="0" err="1">
@@ -14465,7 +15208,7 @@
         </p:nvSpPr>
         <p:spPr>
           <a:xfrm>
-            <a:off x="1267625" y="4419600"/>
+            <a:off x="1143000" y="4711005"/>
             <a:ext cx="6481261" cy="1384995"/>
           </a:xfrm>
           <a:prstGeom prst="rect">
@@ -14756,6 +15499,422 @@
               </a:rPr>
               <a:t>© iQuest Group 2013. All rights reserved.</a:t>
             </a:r>
+          </a:p>
+        </p:txBody>
+      </p:sp>
+      <p:sp>
+        <p:nvSpPr>
+          <p:cNvPr id="11" name="Content Placeholder 2"/>
+          <p:cNvSpPr txBox="1">
+            <a:spLocks/>
+          </p:cNvSpPr>
+          <p:nvPr/>
+        </p:nvSpPr>
+        <p:spPr bwMode="auto">
+          <a:xfrm>
+            <a:off x="685800" y="2438400"/>
+            <a:ext cx="6172200" cy="533400"/>
+          </a:xfrm>
+          <a:prstGeom prst="rect">
+            <a:avLst/>
+          </a:prstGeom>
+          <a:noFill/>
+          <a:ln>
+            <a:noFill/>
+          </a:ln>
+          <a:extLst>
+            <a:ext uri="{909E8E84-426E-40DD-AFC4-6F175D3DCCD1}">
+              <a14:hiddenFill xmlns:a14="http://schemas.microsoft.com/office/drawing/2010/main">
+                <a:solidFill>
+                  <a:srgbClr val="FFFFFF"/>
+                </a:solidFill>
+              </a14:hiddenFill>
+            </a:ext>
+            <a:ext uri="{91240B29-F687-4F45-9708-019B960494DF}">
+              <a14:hiddenLine xmlns:a14="http://schemas.microsoft.com/office/drawing/2010/main" w="9525">
+                <a:solidFill>
+                  <a:srgbClr val="000000"/>
+                </a:solidFill>
+                <a:miter lim="800000"/>
+                <a:headEnd/>
+                <a:tailEnd/>
+              </a14:hiddenLine>
+            </a:ext>
+          </a:extLst>
+        </p:spPr>
+        <p:txBody>
+          <a:bodyPr vert="horz" wrap="square" lIns="91440" tIns="45720" rIns="91440" bIns="45720" numCol="1" anchor="t" anchorCtr="0" compatLnSpc="1">
+            <a:prstTxWarp prst="textNoShape">
+              <a:avLst/>
+            </a:prstTxWarp>
+          </a:bodyPr>
+          <a:lstStyle>
+            <a:lvl1pPr marL="190500" indent="-190500" algn="l" rtl="0" eaLnBrk="0" fontAlgn="base" hangingPunct="0">
+              <a:spcBef>
+                <a:spcPct val="20000"/>
+              </a:spcBef>
+              <a:spcAft>
+                <a:spcPct val="0"/>
+              </a:spcAft>
+              <a:buSzPct val="80000"/>
+              <a:buFont typeface="Wingdings" pitchFamily="2" charset="2"/>
+              <a:buChar char="§"/>
+              <a:defRPr sz="2000">
+                <a:solidFill>
+                  <a:srgbClr val="32496A"/>
+                </a:solidFill>
+                <a:latin typeface="+mn-lt"/>
+                <a:ea typeface="+mn-ea"/>
+                <a:cs typeface="+mn-cs"/>
+              </a:defRPr>
+            </a:lvl1pPr>
+            <a:lvl2pPr marL="571500" indent="-190500" algn="l" rtl="0" eaLnBrk="0" fontAlgn="base" hangingPunct="0">
+              <a:spcBef>
+                <a:spcPct val="20000"/>
+              </a:spcBef>
+              <a:spcAft>
+                <a:spcPct val="0"/>
+              </a:spcAft>
+              <a:buClr>
+                <a:srgbClr val="32496A"/>
+              </a:buClr>
+              <a:buSzPct val="80000"/>
+              <a:buFont typeface="Arial" charset="0"/>
+              <a:buChar char="-"/>
+              <a:defRPr sz="2800">
+                <a:solidFill>
+                  <a:srgbClr val="32496A"/>
+                </a:solidFill>
+                <a:latin typeface="+mn-lt"/>
+              </a:defRPr>
+            </a:lvl2pPr>
+            <a:lvl3pPr marL="952500" indent="-190500" algn="l" rtl="0" eaLnBrk="0" fontAlgn="base" hangingPunct="0">
+              <a:spcBef>
+                <a:spcPct val="20000"/>
+              </a:spcBef>
+              <a:spcAft>
+                <a:spcPct val="0"/>
+              </a:spcAft>
+              <a:buClr>
+                <a:srgbClr val="32496A"/>
+              </a:buClr>
+              <a:buSzPct val="70000"/>
+              <a:buFont typeface="Wingdings" pitchFamily="2" charset="2"/>
+              <a:buChar char="à"/>
+              <a:defRPr sz="1400">
+                <a:solidFill>
+                  <a:srgbClr val="32496A"/>
+                </a:solidFill>
+                <a:latin typeface="+mn-lt"/>
+              </a:defRPr>
+            </a:lvl3pPr>
+            <a:lvl4pPr marL="1333500" indent="-190500" algn="l" rtl="0" eaLnBrk="0" fontAlgn="base" hangingPunct="0">
+              <a:spcBef>
+                <a:spcPct val="20000"/>
+              </a:spcBef>
+              <a:spcAft>
+                <a:spcPct val="0"/>
+              </a:spcAft>
+              <a:buSzPct val="80000"/>
+              <a:buFont typeface="Wingdings" pitchFamily="2" charset="2"/>
+              <a:buChar char="§"/>
+              <a:defRPr sz="1400">
+                <a:solidFill>
+                  <a:srgbClr val="32496A"/>
+                </a:solidFill>
+                <a:latin typeface="+mn-lt"/>
+              </a:defRPr>
+            </a:lvl4pPr>
+            <a:lvl5pPr marL="1714500" indent="-190500" algn="l" rtl="0" eaLnBrk="0" fontAlgn="base" hangingPunct="0">
+              <a:spcBef>
+                <a:spcPct val="20000"/>
+              </a:spcBef>
+              <a:spcAft>
+                <a:spcPct val="0"/>
+              </a:spcAft>
+              <a:buChar char="»"/>
+              <a:defRPr sz="2000">
+                <a:solidFill>
+                  <a:schemeClr val="tx1"/>
+                </a:solidFill>
+                <a:latin typeface="+mn-lt"/>
+              </a:defRPr>
+            </a:lvl5pPr>
+            <a:lvl6pPr marL="2171700" indent="-190500" algn="l" rtl="0" fontAlgn="base">
+              <a:spcBef>
+                <a:spcPct val="20000"/>
+              </a:spcBef>
+              <a:spcAft>
+                <a:spcPct val="0"/>
+              </a:spcAft>
+              <a:buChar char="»"/>
+              <a:defRPr sz="2000">
+                <a:solidFill>
+                  <a:schemeClr val="tx1"/>
+                </a:solidFill>
+                <a:latin typeface="+mn-lt"/>
+              </a:defRPr>
+            </a:lvl6pPr>
+            <a:lvl7pPr marL="2628900" indent="-190500" algn="l" rtl="0" fontAlgn="base">
+              <a:spcBef>
+                <a:spcPct val="20000"/>
+              </a:spcBef>
+              <a:spcAft>
+                <a:spcPct val="0"/>
+              </a:spcAft>
+              <a:buChar char="»"/>
+              <a:defRPr sz="2000">
+                <a:solidFill>
+                  <a:schemeClr val="tx1"/>
+                </a:solidFill>
+                <a:latin typeface="+mn-lt"/>
+              </a:defRPr>
+            </a:lvl7pPr>
+            <a:lvl8pPr marL="3086100" indent="-190500" algn="l" rtl="0" fontAlgn="base">
+              <a:spcBef>
+                <a:spcPct val="20000"/>
+              </a:spcBef>
+              <a:spcAft>
+                <a:spcPct val="0"/>
+              </a:spcAft>
+              <a:buChar char="»"/>
+              <a:defRPr sz="2000">
+                <a:solidFill>
+                  <a:schemeClr val="tx1"/>
+                </a:solidFill>
+                <a:latin typeface="+mn-lt"/>
+              </a:defRPr>
+            </a:lvl8pPr>
+            <a:lvl9pPr marL="3543300" indent="-190500" algn="l" rtl="0" fontAlgn="base">
+              <a:spcBef>
+                <a:spcPct val="20000"/>
+              </a:spcBef>
+              <a:spcAft>
+                <a:spcPct val="0"/>
+              </a:spcAft>
+              <a:buChar char="»"/>
+              <a:defRPr sz="2000">
+                <a:solidFill>
+                  <a:schemeClr val="tx1"/>
+                </a:solidFill>
+                <a:latin typeface="+mn-lt"/>
+              </a:defRPr>
+            </a:lvl9pPr>
+          </a:lstStyle>
+          <a:p>
+            <a:r>
+              <a:rPr lang="en-US" altLang="en-US" sz="2400" kern="0" dirty="0" smtClean="0"/>
+              <a:t>Call function</a:t>
+            </a:r>
+            <a:endParaRPr lang="ro-RO" altLang="en-US" sz="2400" kern="0" dirty="0" smtClean="0"/>
+          </a:p>
+        </p:txBody>
+      </p:sp>
+      <p:sp>
+        <p:nvSpPr>
+          <p:cNvPr id="12" name="Content Placeholder 2"/>
+          <p:cNvSpPr txBox="1">
+            <a:spLocks/>
+          </p:cNvSpPr>
+          <p:nvPr/>
+        </p:nvSpPr>
+        <p:spPr bwMode="auto">
+          <a:xfrm>
+            <a:off x="685800" y="4191000"/>
+            <a:ext cx="6172200" cy="533400"/>
+          </a:xfrm>
+          <a:prstGeom prst="rect">
+            <a:avLst/>
+          </a:prstGeom>
+          <a:noFill/>
+          <a:ln>
+            <a:noFill/>
+          </a:ln>
+          <a:extLst>
+            <a:ext uri="{909E8E84-426E-40DD-AFC4-6F175D3DCCD1}">
+              <a14:hiddenFill xmlns:a14="http://schemas.microsoft.com/office/drawing/2010/main">
+                <a:solidFill>
+                  <a:srgbClr val="FFFFFF"/>
+                </a:solidFill>
+              </a14:hiddenFill>
+            </a:ext>
+            <a:ext uri="{91240B29-F687-4F45-9708-019B960494DF}">
+              <a14:hiddenLine xmlns:a14="http://schemas.microsoft.com/office/drawing/2010/main" w="9525">
+                <a:solidFill>
+                  <a:srgbClr val="000000"/>
+                </a:solidFill>
+                <a:miter lim="800000"/>
+                <a:headEnd/>
+                <a:tailEnd/>
+              </a14:hiddenLine>
+            </a:ext>
+          </a:extLst>
+        </p:spPr>
+        <p:txBody>
+          <a:bodyPr vert="horz" wrap="square" lIns="91440" tIns="45720" rIns="91440" bIns="45720" numCol="1" anchor="t" anchorCtr="0" compatLnSpc="1">
+            <a:prstTxWarp prst="textNoShape">
+              <a:avLst/>
+            </a:prstTxWarp>
+          </a:bodyPr>
+          <a:lstStyle>
+            <a:lvl1pPr marL="190500" indent="-190500" algn="l" rtl="0" eaLnBrk="0" fontAlgn="base" hangingPunct="0">
+              <a:spcBef>
+                <a:spcPct val="20000"/>
+              </a:spcBef>
+              <a:spcAft>
+                <a:spcPct val="0"/>
+              </a:spcAft>
+              <a:buSzPct val="80000"/>
+              <a:buFont typeface="Wingdings" pitchFamily="2" charset="2"/>
+              <a:buChar char="§"/>
+              <a:defRPr sz="2000">
+                <a:solidFill>
+                  <a:srgbClr val="32496A"/>
+                </a:solidFill>
+                <a:latin typeface="+mn-lt"/>
+                <a:ea typeface="+mn-ea"/>
+                <a:cs typeface="+mn-cs"/>
+              </a:defRPr>
+            </a:lvl1pPr>
+            <a:lvl2pPr marL="571500" indent="-190500" algn="l" rtl="0" eaLnBrk="0" fontAlgn="base" hangingPunct="0">
+              <a:spcBef>
+                <a:spcPct val="20000"/>
+              </a:spcBef>
+              <a:spcAft>
+                <a:spcPct val="0"/>
+              </a:spcAft>
+              <a:buClr>
+                <a:srgbClr val="32496A"/>
+              </a:buClr>
+              <a:buSzPct val="80000"/>
+              <a:buFont typeface="Arial" charset="0"/>
+              <a:buChar char="-"/>
+              <a:defRPr sz="2800">
+                <a:solidFill>
+                  <a:srgbClr val="32496A"/>
+                </a:solidFill>
+                <a:latin typeface="+mn-lt"/>
+              </a:defRPr>
+            </a:lvl2pPr>
+            <a:lvl3pPr marL="952500" indent="-190500" algn="l" rtl="0" eaLnBrk="0" fontAlgn="base" hangingPunct="0">
+              <a:spcBef>
+                <a:spcPct val="20000"/>
+              </a:spcBef>
+              <a:spcAft>
+                <a:spcPct val="0"/>
+              </a:spcAft>
+              <a:buClr>
+                <a:srgbClr val="32496A"/>
+              </a:buClr>
+              <a:buSzPct val="70000"/>
+              <a:buFont typeface="Wingdings" pitchFamily="2" charset="2"/>
+              <a:buChar char="à"/>
+              <a:defRPr sz="1400">
+                <a:solidFill>
+                  <a:srgbClr val="32496A"/>
+                </a:solidFill>
+                <a:latin typeface="+mn-lt"/>
+              </a:defRPr>
+            </a:lvl3pPr>
+            <a:lvl4pPr marL="1333500" indent="-190500" algn="l" rtl="0" eaLnBrk="0" fontAlgn="base" hangingPunct="0">
+              <a:spcBef>
+                <a:spcPct val="20000"/>
+              </a:spcBef>
+              <a:spcAft>
+                <a:spcPct val="0"/>
+              </a:spcAft>
+              <a:buSzPct val="80000"/>
+              <a:buFont typeface="Wingdings" pitchFamily="2" charset="2"/>
+              <a:buChar char="§"/>
+              <a:defRPr sz="1400">
+                <a:solidFill>
+                  <a:srgbClr val="32496A"/>
+                </a:solidFill>
+                <a:latin typeface="+mn-lt"/>
+              </a:defRPr>
+            </a:lvl4pPr>
+            <a:lvl5pPr marL="1714500" indent="-190500" algn="l" rtl="0" eaLnBrk="0" fontAlgn="base" hangingPunct="0">
+              <a:spcBef>
+                <a:spcPct val="20000"/>
+              </a:spcBef>
+              <a:spcAft>
+                <a:spcPct val="0"/>
+              </a:spcAft>
+              <a:buChar char="»"/>
+              <a:defRPr sz="2000">
+                <a:solidFill>
+                  <a:schemeClr val="tx1"/>
+                </a:solidFill>
+                <a:latin typeface="+mn-lt"/>
+              </a:defRPr>
+            </a:lvl5pPr>
+            <a:lvl6pPr marL="2171700" indent="-190500" algn="l" rtl="0" fontAlgn="base">
+              <a:spcBef>
+                <a:spcPct val="20000"/>
+              </a:spcBef>
+              <a:spcAft>
+                <a:spcPct val="0"/>
+              </a:spcAft>
+              <a:buChar char="»"/>
+              <a:defRPr sz="2000">
+                <a:solidFill>
+                  <a:schemeClr val="tx1"/>
+                </a:solidFill>
+                <a:latin typeface="+mn-lt"/>
+              </a:defRPr>
+            </a:lvl6pPr>
+            <a:lvl7pPr marL="2628900" indent="-190500" algn="l" rtl="0" fontAlgn="base">
+              <a:spcBef>
+                <a:spcPct val="20000"/>
+              </a:spcBef>
+              <a:spcAft>
+                <a:spcPct val="0"/>
+              </a:spcAft>
+              <a:buChar char="»"/>
+              <a:defRPr sz="2000">
+                <a:solidFill>
+                  <a:schemeClr val="tx1"/>
+                </a:solidFill>
+                <a:latin typeface="+mn-lt"/>
+              </a:defRPr>
+            </a:lvl7pPr>
+            <a:lvl8pPr marL="3086100" indent="-190500" algn="l" rtl="0" fontAlgn="base">
+              <a:spcBef>
+                <a:spcPct val="20000"/>
+              </a:spcBef>
+              <a:spcAft>
+                <a:spcPct val="0"/>
+              </a:spcAft>
+              <a:buChar char="»"/>
+              <a:defRPr sz="2000">
+                <a:solidFill>
+                  <a:schemeClr val="tx1"/>
+                </a:solidFill>
+                <a:latin typeface="+mn-lt"/>
+              </a:defRPr>
+            </a:lvl8pPr>
+            <a:lvl9pPr marL="3543300" indent="-190500" algn="l" rtl="0" fontAlgn="base">
+              <a:spcBef>
+                <a:spcPct val="20000"/>
+              </a:spcBef>
+              <a:spcAft>
+                <a:spcPct val="0"/>
+              </a:spcAft>
+              <a:buChar char="»"/>
+              <a:defRPr sz="2000">
+                <a:solidFill>
+                  <a:schemeClr val="tx1"/>
+                </a:solidFill>
+                <a:latin typeface="+mn-lt"/>
+              </a:defRPr>
+            </a:lvl9pPr>
+          </a:lstStyle>
+          <a:p>
+            <a:r>
+              <a:rPr lang="en-US" altLang="en-US" sz="2400" kern="0" dirty="0" smtClean="0"/>
+              <a:t>Call function as method</a:t>
+            </a:r>
+            <a:endParaRPr lang="ro-RO" altLang="en-US" sz="2400" kern="0" dirty="0" smtClean="0"/>
           </a:p>
         </p:txBody>
       </p:sp>
@@ -14781,6 +15940,9 @@
                     <p:cTn id="3" fill="hold">
                       <p:stCondLst>
                         <p:cond delay="indefinite"/>
+                        <p:cond evt="onBegin" delay="0">
+                          <p:tn val="2"/>
+                        </p:cond>
                       </p:stCondLst>
                       <p:childTnLst>
                         <p:par>
@@ -14790,7 +15952,7 @@
                             </p:stCondLst>
                             <p:childTnLst>
                               <p:par>
-                                <p:cTn id="5" presetID="53" presetClass="entr" presetSubtype="16" fill="hold" grpId="0" nodeType="clickEffect">
+                                <p:cTn id="5" presetID="53" presetClass="entr" presetSubtype="16" fill="hold" grpId="0" nodeType="withEffect">
                                   <p:stCondLst>
                                     <p:cond delay="0"/>
                                   </p:stCondLst>
@@ -14798,6 +15960,202 @@
                                     <p:set>
                                       <p:cBhvr>
                                         <p:cTn id="6" dur="1" fill="hold">
+                                          <p:stCondLst>
+                                            <p:cond delay="0"/>
+                                          </p:stCondLst>
+                                        </p:cTn>
+                                        <p:tgtEl>
+                                          <p:spTgt spid="8">
+                                            <p:txEl>
+                                              <p:pRg st="0" end="0"/>
+                                            </p:txEl>
+                                          </p:spTgt>
+                                        </p:tgtEl>
+                                        <p:attrNameLst>
+                                          <p:attrName>style.visibility</p:attrName>
+                                        </p:attrNameLst>
+                                      </p:cBhvr>
+                                      <p:to>
+                                        <p:strVal val="visible"/>
+                                      </p:to>
+                                    </p:set>
+                                    <p:anim calcmode="lin" valueType="num">
+                                      <p:cBhvr>
+                                        <p:cTn id="7" dur="500" fill="hold"/>
+                                        <p:tgtEl>
+                                          <p:spTgt spid="8">
+                                            <p:txEl>
+                                              <p:pRg st="0" end="0"/>
+                                            </p:txEl>
+                                          </p:spTgt>
+                                        </p:tgtEl>
+                                        <p:attrNameLst>
+                                          <p:attrName>ppt_w</p:attrName>
+                                        </p:attrNameLst>
+                                      </p:cBhvr>
+                                      <p:tavLst>
+                                        <p:tav tm="0">
+                                          <p:val>
+                                            <p:fltVal val="0"/>
+                                          </p:val>
+                                        </p:tav>
+                                        <p:tav tm="100000">
+                                          <p:val>
+                                            <p:strVal val="#ppt_w"/>
+                                          </p:val>
+                                        </p:tav>
+                                      </p:tavLst>
+                                    </p:anim>
+                                    <p:anim calcmode="lin" valueType="num">
+                                      <p:cBhvr>
+                                        <p:cTn id="8" dur="500" fill="hold"/>
+                                        <p:tgtEl>
+                                          <p:spTgt spid="8">
+                                            <p:txEl>
+                                              <p:pRg st="0" end="0"/>
+                                            </p:txEl>
+                                          </p:spTgt>
+                                        </p:tgtEl>
+                                        <p:attrNameLst>
+                                          <p:attrName>ppt_h</p:attrName>
+                                        </p:attrNameLst>
+                                      </p:cBhvr>
+                                      <p:tavLst>
+                                        <p:tav tm="0">
+                                          <p:val>
+                                            <p:fltVal val="0"/>
+                                          </p:val>
+                                        </p:tav>
+                                        <p:tav tm="100000">
+                                          <p:val>
+                                            <p:strVal val="#ppt_h"/>
+                                          </p:val>
+                                        </p:tav>
+                                      </p:tavLst>
+                                    </p:anim>
+                                    <p:animEffect transition="in" filter="fade">
+                                      <p:cBhvr>
+                                        <p:cTn id="9" dur="500"/>
+                                        <p:tgtEl>
+                                          <p:spTgt spid="8">
+                                            <p:txEl>
+                                              <p:pRg st="0" end="0"/>
+                                            </p:txEl>
+                                          </p:spTgt>
+                                        </p:tgtEl>
+                                      </p:cBhvr>
+                                    </p:animEffect>
+                                  </p:childTnLst>
+                                </p:cTn>
+                              </p:par>
+                              <p:par>
+                                <p:cTn id="10" presetID="53" presetClass="entr" presetSubtype="16" fill="hold" grpId="0" nodeType="withEffect">
+                                  <p:stCondLst>
+                                    <p:cond delay="0"/>
+                                  </p:stCondLst>
+                                  <p:childTnLst>
+                                    <p:set>
+                                      <p:cBhvr>
+                                        <p:cTn id="11" dur="1" fill="hold">
+                                          <p:stCondLst>
+                                            <p:cond delay="0"/>
+                                          </p:stCondLst>
+                                        </p:cTn>
+                                        <p:tgtEl>
+                                          <p:spTgt spid="5"/>
+                                        </p:tgtEl>
+                                        <p:attrNameLst>
+                                          <p:attrName>style.visibility</p:attrName>
+                                        </p:attrNameLst>
+                                      </p:cBhvr>
+                                      <p:to>
+                                        <p:strVal val="visible"/>
+                                      </p:to>
+                                    </p:set>
+                                    <p:anim calcmode="lin" valueType="num">
+                                      <p:cBhvr>
+                                        <p:cTn id="12" dur="500" fill="hold"/>
+                                        <p:tgtEl>
+                                          <p:spTgt spid="5"/>
+                                        </p:tgtEl>
+                                        <p:attrNameLst>
+                                          <p:attrName>ppt_w</p:attrName>
+                                        </p:attrNameLst>
+                                      </p:cBhvr>
+                                      <p:tavLst>
+                                        <p:tav tm="0">
+                                          <p:val>
+                                            <p:fltVal val="0"/>
+                                          </p:val>
+                                        </p:tav>
+                                        <p:tav tm="100000">
+                                          <p:val>
+                                            <p:strVal val="#ppt_w"/>
+                                          </p:val>
+                                        </p:tav>
+                                      </p:tavLst>
+                                    </p:anim>
+                                    <p:anim calcmode="lin" valueType="num">
+                                      <p:cBhvr>
+                                        <p:cTn id="13" dur="500" fill="hold"/>
+                                        <p:tgtEl>
+                                          <p:spTgt spid="5"/>
+                                        </p:tgtEl>
+                                        <p:attrNameLst>
+                                          <p:attrName>ppt_h</p:attrName>
+                                        </p:attrNameLst>
+                                      </p:cBhvr>
+                                      <p:tavLst>
+                                        <p:tav tm="0">
+                                          <p:val>
+                                            <p:fltVal val="0"/>
+                                          </p:val>
+                                        </p:tav>
+                                        <p:tav tm="100000">
+                                          <p:val>
+                                            <p:strVal val="#ppt_h"/>
+                                          </p:val>
+                                        </p:tav>
+                                      </p:tavLst>
+                                    </p:anim>
+                                    <p:animEffect transition="in" filter="fade">
+                                      <p:cBhvr>
+                                        <p:cTn id="14" dur="500"/>
+                                        <p:tgtEl>
+                                          <p:spTgt spid="5"/>
+                                        </p:tgtEl>
+                                      </p:cBhvr>
+                                    </p:animEffect>
+                                  </p:childTnLst>
+                                </p:cTn>
+                              </p:par>
+                            </p:childTnLst>
+                          </p:cTn>
+                        </p:par>
+                      </p:childTnLst>
+                    </p:cTn>
+                  </p:par>
+                  <p:par>
+                    <p:cTn id="15" fill="hold">
+                      <p:stCondLst>
+                        <p:cond delay="indefinite"/>
+                      </p:stCondLst>
+                      <p:childTnLst>
+                        <p:par>
+                          <p:cTn id="16" fill="hold">
+                            <p:stCondLst>
+                              <p:cond delay="0"/>
+                            </p:stCondLst>
+                            <p:childTnLst>
+                              <p:par>
+                                <p:cTn id="17" presetID="53" presetClass="entr" presetSubtype="16" fill="hold" grpId="0" nodeType="clickEffect">
+                                  <p:stCondLst>
+                                    <p:cond delay="0"/>
+                                  </p:stCondLst>
+                                  <p:childTnLst>
+                                    <p:set>
+                                      <p:cBhvr>
+                                        <p:cTn id="18" dur="1" fill="hold">
                                           <p:stCondLst>
                                             <p:cond delay="0"/>
                                           </p:stCondLst>
@@ -14815,7 +16173,7 @@
                                     </p:set>
                                     <p:anim calcmode="lin" valueType="num">
                                       <p:cBhvr>
-                                        <p:cTn id="7" dur="500" fill="hold"/>
+                                        <p:cTn id="19" dur="500" fill="hold"/>
                                         <p:tgtEl>
                                           <p:spTgt spid="6"/>
                                         </p:tgtEl>
@@ -14838,7 +16196,7 @@
                                     </p:anim>
                                     <p:anim calcmode="lin" valueType="num">
                                       <p:cBhvr>
-                                        <p:cTn id="8" dur="500" fill="hold"/>
+                                        <p:cTn id="20" dur="500" fill="hold"/>
                                         <p:tgtEl>
                                           <p:spTgt spid="6"/>
                                         </p:tgtEl>
@@ -14861,9 +16219,90 @@
                                     </p:anim>
                                     <p:animEffect transition="in" filter="fade">
                                       <p:cBhvr>
-                                        <p:cTn id="9" dur="500"/>
+                                        <p:cTn id="21" dur="500"/>
                                         <p:tgtEl>
                                           <p:spTgt spid="6"/>
+                                        </p:tgtEl>
+                                      </p:cBhvr>
+                                    </p:animEffect>
+                                  </p:childTnLst>
+                                </p:cTn>
+                              </p:par>
+                              <p:par>
+                                <p:cTn id="22" presetID="53" presetClass="entr" presetSubtype="16" fill="hold" grpId="0" nodeType="withEffect">
+                                  <p:stCondLst>
+                                    <p:cond delay="0"/>
+                                  </p:stCondLst>
+                                  <p:childTnLst>
+                                    <p:set>
+                                      <p:cBhvr>
+                                        <p:cTn id="23" dur="1" fill="hold">
+                                          <p:stCondLst>
+                                            <p:cond delay="0"/>
+                                          </p:stCondLst>
+                                        </p:cTn>
+                                        <p:tgtEl>
+                                          <p:spTgt spid="11"/>
+                                        </p:tgtEl>
+                                        <p:attrNameLst>
+                                          <p:attrName>style.visibility</p:attrName>
+                                        </p:attrNameLst>
+                                      </p:cBhvr>
+                                      <p:to>
+                                        <p:strVal val="visible"/>
+                                      </p:to>
+                                    </p:set>
+                                    <p:anim calcmode="lin" valueType="num">
+                                      <p:cBhvr>
+                                        <p:cTn id="24" dur="500" fill="hold"/>
+                                        <p:tgtEl>
+                                          <p:spTgt spid="11"/>
+                                        </p:tgtEl>
+                                        <p:attrNameLst>
+                                          <p:attrName>ppt_w</p:attrName>
+                                        </p:attrNameLst>
+                                      </p:cBhvr>
+                                      <p:tavLst>
+                                        <p:tav tm="0">
+                                          <p:val>
+                                            <p:fltVal val="0"/>
+                                          </p:val>
+                                        </p:tav>
+                                        <p:tav tm="100000">
+                                          <p:val>
+                                            <p:strVal val="#ppt_w"/>
+                                          </p:val>
+                                        </p:tav>
+                                      </p:tavLst>
+                                    </p:anim>
+                                    <p:anim calcmode="lin" valueType="num">
+                                      <p:cBhvr>
+                                        <p:cTn id="25" dur="500" fill="hold"/>
+                                        <p:tgtEl>
+                                          <p:spTgt spid="11"/>
+                                        </p:tgtEl>
+                                        <p:attrNameLst>
+                                          <p:attrName>ppt_h</p:attrName>
+                                        </p:attrNameLst>
+                                      </p:cBhvr>
+                                      <p:tavLst>
+                                        <p:tav tm="0">
+                                          <p:val>
+                                            <p:fltVal val="0"/>
+                                          </p:val>
+                                        </p:tav>
+                                        <p:tav tm="100000">
+                                          <p:val>
+                                            <p:strVal val="#ppt_h"/>
+                                          </p:val>
+                                        </p:tav>
+                                      </p:tavLst>
+                                    </p:anim>
+                                    <p:animEffect transition="in" filter="fade">
+                                      <p:cBhvr>
+                                        <p:cTn id="26" dur="500"/>
+                                        <p:tgtEl>
+                                          <p:spTgt spid="11"/>
                                         </p:tgtEl>
                                       </p:cBhvr>
                                     </p:animEffect>
@@ -14877,26 +16316,26 @@
                     </p:cTn>
                   </p:par>
                   <p:par>
-                    <p:cTn id="10" fill="hold">
+                    <p:cTn id="27" fill="hold">
                       <p:stCondLst>
                         <p:cond delay="indefinite"/>
                       </p:stCondLst>
                       <p:childTnLst>
                         <p:par>
-                          <p:cTn id="11" fill="hold">
+                          <p:cTn id="28" fill="hold">
                             <p:stCondLst>
                               <p:cond delay="0"/>
                             </p:stCondLst>
                             <p:childTnLst>
                               <p:par>
-                                <p:cTn id="12" presetID="53" presetClass="entr" presetSubtype="16" fill="hold" grpId="0" nodeType="clickEffect">
+                                <p:cTn id="29" presetID="53" presetClass="entr" presetSubtype="16" fill="hold" grpId="0" nodeType="clickEffect">
                                   <p:stCondLst>
                                     <p:cond delay="0"/>
                                   </p:stCondLst>
                                   <p:childTnLst>
                                     <p:set>
                                       <p:cBhvr>
-                                        <p:cTn id="13" dur="1" fill="hold">
+                                        <p:cTn id="30" dur="1" fill="hold">
                                           <p:stCondLst>
                                             <p:cond delay="0"/>
                                           </p:stCondLst>
@@ -14914,7 +16353,7 @@
                                     </p:set>
                                     <p:anim calcmode="lin" valueType="num">
                                       <p:cBhvr>
-                                        <p:cTn id="14" dur="500" fill="hold"/>
+                                        <p:cTn id="31" dur="500" fill="hold"/>
                                         <p:tgtEl>
                                           <p:spTgt spid="7"/>
                                         </p:tgtEl>
@@ -14937,7 +16376,7 @@
                                     </p:anim>
                                     <p:anim calcmode="lin" valueType="num">
                                       <p:cBhvr>
-                                        <p:cTn id="15" dur="500" fill="hold"/>
+                                        <p:cTn id="32" dur="500" fill="hold"/>
                                         <p:tgtEl>
                                           <p:spTgt spid="7"/>
                                         </p:tgtEl>
@@ -14960,9 +16399,90 @@
                                     </p:anim>
                                     <p:animEffect transition="in" filter="fade">
                                       <p:cBhvr>
-                                        <p:cTn id="16" dur="500"/>
+                                        <p:cTn id="33" dur="500"/>
                                         <p:tgtEl>
                                           <p:spTgt spid="7"/>
+                                        </p:tgtEl>
+                                      </p:cBhvr>
+                                    </p:animEffect>
+                                  </p:childTnLst>
+                                </p:cTn>
+                              </p:par>
+                              <p:par>
+                                <p:cTn id="34" presetID="53" presetClass="entr" presetSubtype="16" fill="hold" grpId="0" nodeType="withEffect">
+                                  <p:stCondLst>
+                                    <p:cond delay="0"/>
+                                  </p:stCondLst>
+                                  <p:childTnLst>
+                                    <p:set>
+                                      <p:cBhvr>
+                                        <p:cTn id="35" dur="1" fill="hold">
+                                          <p:stCondLst>
+                                            <p:cond delay="0"/>
+                                          </p:stCondLst>
+                                        </p:cTn>
+                                        <p:tgtEl>
+                                          <p:spTgt spid="12"/>
+                                        </p:tgtEl>
+                                        <p:attrNameLst>
+                                          <p:attrName>style.visibility</p:attrName>
+                                        </p:attrNameLst>
+                                      </p:cBhvr>
+                                      <p:to>
+                                        <p:strVal val="visible"/>
+                                      </p:to>
+                                    </p:set>
+                                    <p:anim calcmode="lin" valueType="num">
+                                      <p:cBhvr>
+                                        <p:cTn id="36" dur="500" fill="hold"/>
+                                        <p:tgtEl>
+                                          <p:spTgt spid="12"/>
+                                        </p:tgtEl>
+                                        <p:attrNameLst>
+                                          <p:attrName>ppt_w</p:attrName>
+                                        </p:attrNameLst>
+                                      </p:cBhvr>
+                                      <p:tavLst>
+                                        <p:tav tm="0">
+                                          <p:val>
+                                            <p:fltVal val="0"/>
+                                          </p:val>
+                                        </p:tav>
+                                        <p:tav tm="100000">
+                                          <p:val>
+                                            <p:strVal val="#ppt_w"/>
+                                          </p:val>
+                                        </p:tav>
+                                      </p:tavLst>
+                                    </p:anim>
+                                    <p:anim calcmode="lin" valueType="num">
+                                      <p:cBhvr>
+                                        <p:cTn id="37" dur="500" fill="hold"/>
+                                        <p:tgtEl>
+                                          <p:spTgt spid="12"/>
+                                        </p:tgtEl>
+                                        <p:attrNameLst>
+                                          <p:attrName>ppt_h</p:attrName>
+                                        </p:attrNameLst>
+                                      </p:cBhvr>
+                                      <p:tavLst>
+                                        <p:tav tm="0">
+                                          <p:val>
+                                            <p:fltVal val="0"/>
+                                          </p:val>
+                                        </p:tav>
+                                        <p:tav tm="100000">
+                                          <p:val>
+                                            <p:strVal val="#ppt_h"/>
+                                          </p:val>
+                                        </p:tav>
+                                      </p:tavLst>
+                                    </p:anim>
+                                    <p:animEffect transition="in" filter="fade">
+                                      <p:cBhvr>
+                                        <p:cTn id="38" dur="500"/>
+                                        <p:tgtEl>
+                                          <p:spTgt spid="12"/>
                                         </p:tgtEl>
                                       </p:cBhvr>
                                     </p:animEffect>
@@ -14997,8 +16517,12 @@
       </p:par>
     </p:tnLst>
     <p:bldLst>
+      <p:bldP spid="8" grpId="0" build="p"/>
+      <p:bldP spid="5" grpId="0"/>
       <p:bldP spid="6" grpId="0"/>
       <p:bldP spid="7" grpId="0"/>
+      <p:bldP spid="11" grpId="0"/>
+      <p:bldP spid="12" grpId="0"/>
     </p:bldLst>
   </p:timing>
 </p:sld>

</xml_diff>

<commit_message>
i added notes with the name of the jsfiddles to show on slides.
</commit_message>
<xml_diff>
--- a/doc/BioCalc Presentation.pptx
+++ b/doc/BioCalc Presentation.pptx
@@ -260,7 +260,7 @@
             <a:fld id="{075D426C-3CEB-476F-A82F-ADFA14719D2A}" type="datetimeFigureOut">
               <a:rPr lang="en-US" altLang="en-US"/>
               <a:pPr/>
-              <a:t>9/23/2013</a:t>
+              <a:t>9/25/2013</a:t>
             </a:fld>
             <a:endParaRPr lang="en-US" altLang="en-US"/>
           </a:p>
@@ -6690,6 +6690,79 @@
               <a:t> function</a:t>
             </a:r>
             <a:endParaRPr lang="ro-RO" altLang="en-US" sz="2400" kern="0" dirty="0" smtClean="0"/>
+          </a:p>
+        </p:txBody>
+      </p:sp>
+      <p:sp>
+        <p:nvSpPr>
+          <p:cNvPr id="12" name="TextBox 11"/>
+          <p:cNvSpPr txBox="1"/>
+          <p:nvPr/>
+        </p:nvSpPr>
+        <p:spPr>
+          <a:xfrm>
+            <a:off x="6134417" y="5849779"/>
+            <a:ext cx="2601994" cy="246221"/>
+          </a:xfrm>
+          <a:prstGeom prst="rect">
+            <a:avLst/>
+          </a:prstGeom>
+          <a:noFill/>
+        </p:spPr>
+        <p:txBody>
+          <a:bodyPr wrap="none" rtlCol="0">
+            <a:spAutoFit/>
+          </a:bodyPr>
+          <a:lstStyle/>
+          <a:p>
+            <a:pPr algn="r"/>
+            <a:r>
+              <a:rPr lang="ro-RO" sz="1000" dirty="0">
+                <a:solidFill>
+                  <a:schemeClr val="bg1">
+                    <a:lumMod val="75000"/>
+                  </a:schemeClr>
+                </a:solidFill>
+              </a:rPr>
+              <a:t>[</a:t>
+            </a:r>
+            <a:r>
+              <a:rPr lang="en-US" sz="1000" dirty="0" err="1">
+                <a:solidFill>
+                  <a:schemeClr val="bg1">
+                    <a:lumMod val="75000"/>
+                  </a:schemeClr>
+                </a:solidFill>
+              </a:rPr>
+              <a:t>jsfiddle</a:t>
+            </a:r>
+            <a:r>
+              <a:rPr lang="en-US" sz="1000" dirty="0">
+                <a:solidFill>
+                  <a:schemeClr val="bg1">
+                    <a:lumMod val="75000"/>
+                  </a:schemeClr>
+                </a:solidFill>
+              </a:rPr>
+              <a:t>: Different ways of creating objects</a:t>
+            </a:r>
+            <a:r>
+              <a:rPr lang="ro-RO" sz="1000" dirty="0" smtClean="0">
+                <a:solidFill>
+                  <a:schemeClr val="bg1">
+                    <a:lumMod val="75000"/>
+                  </a:schemeClr>
+                </a:solidFill>
+              </a:rPr>
+              <a:t>]</a:t>
+            </a:r>
+            <a:endParaRPr lang="en-US" sz="1000" dirty="0">
+              <a:solidFill>
+                <a:schemeClr val="bg1">
+                  <a:lumMod val="75000"/>
+                </a:schemeClr>
+              </a:solidFill>
+            </a:endParaRPr>
           </a:p>
         </p:txBody>
       </p:sp>
@@ -7516,7 +7589,6 @@
               <a:rPr lang="en-US" altLang="en-US" sz="2400" dirty="0" smtClean="0"/>
               <a:t> – Explain notations</a:t>
             </a:r>
-            <a:endParaRPr lang="en-US" altLang="en-US" sz="2400" dirty="0" smtClean="0"/>
           </a:p>
         </p:txBody>
       </p:sp>
@@ -8245,8 +8317,8 @@
         </p:nvSpPr>
         <p:spPr bwMode="auto">
           <a:xfrm>
-            <a:off x="5715000" y="5562600"/>
-            <a:ext cx="2667000" cy="609600"/>
+            <a:off x="6400800" y="5562600"/>
+            <a:ext cx="1981200" cy="609600"/>
           </a:xfrm>
           <a:prstGeom prst="rect">
             <a:avLst/>
@@ -8479,6 +8551,89 @@
               </a:rPr>
               <a:t>© iQuest Group 2013. All rights reserved.</a:t>
             </a:r>
+          </a:p>
+        </p:txBody>
+      </p:sp>
+      <p:sp>
+        <p:nvSpPr>
+          <p:cNvPr id="8" name="TextBox 7"/>
+          <p:cNvSpPr txBox="1"/>
+          <p:nvPr/>
+        </p:nvSpPr>
+        <p:spPr>
+          <a:xfrm>
+            <a:off x="6856567" y="5935860"/>
+            <a:ext cx="1765227" cy="246221"/>
+          </a:xfrm>
+          <a:prstGeom prst="rect">
+            <a:avLst/>
+          </a:prstGeom>
+          <a:noFill/>
+        </p:spPr>
+        <p:txBody>
+          <a:bodyPr wrap="none" rtlCol="0">
+            <a:spAutoFit/>
+          </a:bodyPr>
+          <a:lstStyle/>
+          <a:p>
+            <a:pPr algn="r"/>
+            <a:r>
+              <a:rPr lang="ro-RO" sz="1000" dirty="0" smtClean="0">
+                <a:solidFill>
+                  <a:schemeClr val="bg1">
+                    <a:lumMod val="75000"/>
+                  </a:schemeClr>
+                </a:solidFill>
+              </a:rPr>
+              <a:t>[</a:t>
+            </a:r>
+            <a:r>
+              <a:rPr lang="en-US" sz="1000" dirty="0" err="1">
+                <a:solidFill>
+                  <a:schemeClr val="bg1">
+                    <a:lumMod val="75000"/>
+                  </a:schemeClr>
+                </a:solidFill>
+              </a:rPr>
+              <a:t>jsfiddle</a:t>
+            </a:r>
+            <a:r>
+              <a:rPr lang="en-US" sz="1000" dirty="0" smtClean="0">
+                <a:solidFill>
+                  <a:schemeClr val="bg1">
+                    <a:lumMod val="75000"/>
+                  </a:schemeClr>
+                </a:solidFill>
+              </a:rPr>
+              <a:t>: Inheritance </a:t>
+            </a:r>
+            <a:r>
+              <a:rPr lang="en-US" sz="1000" dirty="0">
+                <a:solidFill>
+                  <a:schemeClr val="bg1">
+                    <a:lumMod val="75000"/>
+                  </a:schemeClr>
+                </a:solidFill>
+              </a:rPr>
+              <a:t>- basic</a:t>
+            </a:r>
+            <a:r>
+              <a:rPr lang="ro-RO" sz="1000" dirty="0" smtClean="0">
+                <a:solidFill>
+                  <a:schemeClr val="bg1">
+                    <a:lumMod val="75000"/>
+                  </a:schemeClr>
+                </a:solidFill>
+              </a:rPr>
+              <a:t>]</a:t>
+            </a:r>
+            <a:endParaRPr lang="en-US" sz="1000" dirty="0">
+              <a:solidFill>
+                <a:schemeClr val="bg1">
+                  <a:lumMod val="75000"/>
+                </a:schemeClr>
+              </a:solidFill>
+            </a:endParaRPr>
           </a:p>
         </p:txBody>
       </p:sp>
@@ -8593,6 +8748,87 @@
                                   </p:childTnLst>
                                 </p:cTn>
                               </p:par>
+                              <p:par>
+                                <p:cTn id="10" presetID="53" presetClass="exit" presetSubtype="32" fill="hold" grpId="0" nodeType="withEffect">
+                                  <p:stCondLst>
+                                    <p:cond delay="0"/>
+                                  </p:stCondLst>
+                                  <p:childTnLst>
+                                    <p:anim calcmode="lin" valueType="num">
+                                      <p:cBhvr>
+                                        <p:cTn id="11" dur="500"/>
+                                        <p:tgtEl>
+                                          <p:spTgt spid="8"/>
+                                        </p:tgtEl>
+                                        <p:attrNameLst>
+                                          <p:attrName>ppt_w</p:attrName>
+                                        </p:attrNameLst>
+                                      </p:cBhvr>
+                                      <p:tavLst>
+                                        <p:tav tm="0">
+                                          <p:val>
+                                            <p:strVal val="ppt_w"/>
+                                          </p:val>
+                                        </p:tav>
+                                        <p:tav tm="100000">
+                                          <p:val>
+                                            <p:fltVal val="0"/>
+                                          </p:val>
+                                        </p:tav>
+                                      </p:tavLst>
+                                    </p:anim>
+                                    <p:anim calcmode="lin" valueType="num">
+                                      <p:cBhvr>
+                                        <p:cTn id="12" dur="500"/>
+                                        <p:tgtEl>
+                                          <p:spTgt spid="8"/>
+                                        </p:tgtEl>
+                                        <p:attrNameLst>
+                                          <p:attrName>ppt_h</p:attrName>
+                                        </p:attrNameLst>
+                                      </p:cBhvr>
+                                      <p:tavLst>
+                                        <p:tav tm="0">
+                                          <p:val>
+                                            <p:strVal val="ppt_h"/>
+                                          </p:val>
+                                        </p:tav>
+                                        <p:tav tm="100000">
+                                          <p:val>
+                                            <p:fltVal val="0"/>
+                                          </p:val>
+                                        </p:tav>
+                                      </p:tavLst>
+                                    </p:anim>
+                                    <p:animEffect transition="out" filter="fade">
+                                      <p:cBhvr>
+                                        <p:cTn id="13" dur="500"/>
+                                        <p:tgtEl>
+                                          <p:spTgt spid="8"/>
+                                        </p:tgtEl>
+                                      </p:cBhvr>
+                                    </p:animEffect>
+                                    <p:set>
+                                      <p:cBhvr>
+                                        <p:cTn id="14" dur="1" fill="hold">
+                                          <p:stCondLst>
+                                            <p:cond delay="499"/>
+                                          </p:stCondLst>
+                                        </p:cTn>
+                                        <p:tgtEl>
+                                          <p:spTgt spid="8"/>
+                                        </p:tgtEl>
+                                        <p:attrNameLst>
+                                          <p:attrName>style.visibility</p:attrName>
+                                        </p:attrNameLst>
+                                      </p:cBhvr>
+                                      <p:to>
+                                        <p:strVal val="hidden"/>
+                                      </p:to>
+                                    </p:set>
+                                  </p:childTnLst>
+                                </p:cTn>
+                              </p:par>
                             </p:childTnLst>
                           </p:cTn>
                         </p:par>
@@ -8622,6 +8858,7 @@
     </p:tnLst>
     <p:bldLst>
       <p:bldP spid="6" grpId="0"/>
+      <p:bldP spid="8" grpId="0"/>
     </p:bldLst>
   </p:timing>
 </p:sld>
@@ -11017,8 +11254,8 @@
         </p:nvSpPr>
         <p:spPr>
           <a:xfrm>
-            <a:off x="6400800" y="6027139"/>
-            <a:ext cx="2169184" cy="246221"/>
+            <a:off x="6413624" y="6027139"/>
+            <a:ext cx="2156360" cy="246221"/>
           </a:xfrm>
           <a:prstGeom prst="rect">
             <a:avLst/>
@@ -11043,14 +11280,34 @@
               <a:t>[</a:t>
             </a:r>
             <a:r>
-              <a:rPr lang="en-US" sz="1000" dirty="0" smtClean="0">
+              <a:rPr lang="en-US" sz="1000" dirty="0" err="1" smtClean="0">
                 <a:solidFill>
                   <a:schemeClr val="bg1">
                     <a:lumMod val="75000"/>
                   </a:schemeClr>
                 </a:solidFill>
               </a:rPr>
-              <a:t>show code: Biorhythm inheritance</a:t>
+              <a:t>jsfiddle</a:t>
+            </a:r>
+            <a:r>
+              <a:rPr lang="en-US" sz="1000" dirty="0">
+                <a:solidFill>
+                  <a:schemeClr val="bg1">
+                    <a:lumMod val="75000"/>
+                  </a:schemeClr>
+                </a:solidFill>
+              </a:rPr>
+              <a:t>: Inheritance - with </a:t>
+            </a:r>
+            <a:r>
+              <a:rPr lang="en-US" sz="1000" dirty="0" err="1">
+                <a:solidFill>
+                  <a:schemeClr val="bg1">
+                    <a:lumMod val="75000"/>
+                  </a:schemeClr>
+                </a:solidFill>
+              </a:rPr>
+              <a:t>params</a:t>
             </a:r>
             <a:r>
               <a:rPr lang="ro-RO" sz="1000" dirty="0" smtClean="0">
@@ -15915,6 +16172,89 @@
               <a:t>Call function as method</a:t>
             </a:r>
             <a:endParaRPr lang="ro-RO" altLang="en-US" sz="2400" kern="0" dirty="0" smtClean="0"/>
+          </a:p>
+        </p:txBody>
+      </p:sp>
+      <p:sp>
+        <p:nvSpPr>
+          <p:cNvPr id="10" name="TextBox 9"/>
+          <p:cNvSpPr txBox="1"/>
+          <p:nvPr/>
+        </p:nvSpPr>
+        <p:spPr>
+          <a:xfrm>
+            <a:off x="7086600" y="6096000"/>
+            <a:ext cx="1649811" cy="246221"/>
+          </a:xfrm>
+          <a:prstGeom prst="rect">
+            <a:avLst/>
+          </a:prstGeom>
+          <a:noFill/>
+        </p:spPr>
+        <p:txBody>
+          <a:bodyPr wrap="none" rtlCol="0">
+            <a:spAutoFit/>
+          </a:bodyPr>
+          <a:lstStyle/>
+          <a:p>
+            <a:pPr algn="r"/>
+            <a:r>
+              <a:rPr lang="ro-RO" sz="1000" dirty="0">
+                <a:solidFill>
+                  <a:schemeClr val="bg1">
+                    <a:lumMod val="75000"/>
+                  </a:schemeClr>
+                </a:solidFill>
+              </a:rPr>
+              <a:t>[</a:t>
+            </a:r>
+            <a:r>
+              <a:rPr lang="en-US" sz="1000" dirty="0" err="1">
+                <a:solidFill>
+                  <a:schemeClr val="bg1">
+                    <a:lumMod val="75000"/>
+                  </a:schemeClr>
+                </a:solidFill>
+              </a:rPr>
+              <a:t>jsfiddle</a:t>
+            </a:r>
+            <a:r>
+              <a:rPr lang="en-US" sz="1000" dirty="0">
+                <a:solidFill>
+                  <a:schemeClr val="bg1">
+                    <a:lumMod val="75000"/>
+                  </a:schemeClr>
+                </a:solidFill>
+              </a:rPr>
+              <a:t>:'this' in </a:t>
+            </a:r>
+            <a:r>
+              <a:rPr lang="en-US" sz="1000" dirty="0" smtClean="0">
+                <a:solidFill>
+                  <a:schemeClr val="bg1">
+                    <a:lumMod val="75000"/>
+                  </a:schemeClr>
+                </a:solidFill>
+              </a:rPr>
+              <a:t>functions</a:t>
+            </a:r>
+            <a:r>
+              <a:rPr lang="ro-RO" sz="1000" dirty="0" smtClean="0">
+                <a:solidFill>
+                  <a:schemeClr val="bg1">
+                    <a:lumMod val="75000"/>
+                  </a:schemeClr>
+                </a:solidFill>
+              </a:rPr>
+              <a:t>]</a:t>
+            </a:r>
+            <a:endParaRPr lang="en-US" sz="1000" dirty="0">
+              <a:solidFill>
+                <a:schemeClr val="bg1">
+                  <a:lumMod val="75000"/>
+                </a:schemeClr>
+              </a:solidFill>
+            </a:endParaRPr>
           </a:p>
         </p:txBody>
       </p:sp>
@@ -17455,6 +17795,19 @@
 </file>
 
 <file path=customXml/item1.xml><?xml version="1.0" encoding="utf-8"?>
+<?mso-contentType ?>
+<FormTemplates xmlns="http://schemas.microsoft.com/sharepoint/v3/contenttype/forms">
+  <Display>DocumentLibraryForm</Display>
+  <Edit>DocumentLibraryForm</Edit>
+  <New>DocumentLibraryForm</New>
+</FormTemplates>
+</file>
+
+<file path=customXml/item2.xml><?xml version="1.0" encoding="utf-8"?>
+<LongProperties xmlns="http://schemas.microsoft.com/office/2006/metadata/longProperties"/>
+</file>
+
+<file path=customXml/item3.xml><?xml version="1.0" encoding="utf-8"?>
 <ct:contentTypeSchema xmlns:ct="http://schemas.microsoft.com/office/2006/metadata/contentType" xmlns:ma="http://schemas.microsoft.com/office/2006/metadata/properties/metaAttributes" ct:_="" ma:_="" ma:contentTypeName="Document" ma:contentTypeID="0x010100152A3CFC636B004F874CAA4462160261" ma:contentTypeVersion="0" ma:contentTypeDescription="Create a new document." ma:contentTypeScope="" ma:versionID="54724255b6a7e390441e7f802fb831c9">
   <xsd:schema xmlns:xsd="http://www.w3.org/2001/XMLSchema" xmlns:xs="http://www.w3.org/2001/XMLSchema" xmlns:p="http://schemas.microsoft.com/office/2006/metadata/properties" targetNamespace="http://schemas.microsoft.com/office/2006/metadata/properties" ma:root="true" ma:fieldsID="c64490b4aec6201516c3a874156f37b2">
     <xsd:element name="properties">
@@ -17568,19 +17921,6 @@
 </ct:contentTypeSchema>
 </file>
 
-<file path=customXml/item2.xml><?xml version="1.0" encoding="utf-8"?>
-<LongProperties xmlns="http://schemas.microsoft.com/office/2006/metadata/longProperties"/>
-</file>
-
-<file path=customXml/item3.xml><?xml version="1.0" encoding="utf-8"?>
-<?mso-contentType ?>
-<FormTemplates xmlns="http://schemas.microsoft.com/sharepoint/v3/contenttype/forms">
-  <Display>DocumentLibraryForm</Display>
-  <Edit>DocumentLibraryForm</Edit>
-  <New>DocumentLibraryForm</New>
-</FormTemplates>
-</file>
-
 <file path=customXml/item4.xml><?xml version="1.0" encoding="utf-8"?>
 <p:properties xmlns:p="http://schemas.microsoft.com/office/2006/metadata/properties" xmlns:xsi="http://www.w3.org/2001/XMLSchema-instance" xmlns:pc="http://schemas.microsoft.com/office/infopath/2007/PartnerControls">
   <documentManagement/>
@@ -17588,17 +17928,9 @@
 </file>
 
 <file path=customXml/itemProps1.xml><?xml version="1.0" encoding="utf-8"?>
-<ds:datastoreItem xmlns:ds="http://schemas.openxmlformats.org/officeDocument/2006/customXml" ds:itemID="{13855BF2-3E1B-4048-8F5D-5069A0D184FE}">
+<ds:datastoreItem xmlns:ds="http://schemas.openxmlformats.org/officeDocument/2006/customXml" ds:itemID="{DDAAD0C2-8AA2-4903-8770-A9DDE0A43745}">
   <ds:schemaRefs>
-    <ds:schemaRef ds:uri="http://schemas.microsoft.com/office/2006/metadata/contentType"/>
-    <ds:schemaRef ds:uri="http://schemas.microsoft.com/office/2006/metadata/properties/metaAttributes"/>
-    <ds:schemaRef ds:uri="http://www.w3.org/2001/XMLSchema"/>
-    <ds:schemaRef ds:uri="http://schemas.microsoft.com/office/2006/metadata/properties"/>
-    <ds:schemaRef ds:uri="http://schemas.openxmlformats.org/package/2006/metadata/core-properties"/>
-    <ds:schemaRef ds:uri="http://purl.org/dc/elements/1.1/"/>
-    <ds:schemaRef ds:uri="http://purl.org/dc/terms/"/>
-    <ds:schemaRef ds:uri="http://schemas.microsoft.com/internal/obd"/>
-    <ds:schemaRef ds:uri="http://schemas.microsoft.com/office/infopath/2007/PartnerControls"/>
+    <ds:schemaRef ds:uri="http://schemas.microsoft.com/sharepoint/v3/contenttype/forms"/>
   </ds:schemaRefs>
 </ds:datastoreItem>
 </file>
@@ -17612,9 +17944,17 @@
 </file>
 
 <file path=customXml/itemProps3.xml><?xml version="1.0" encoding="utf-8"?>
-<ds:datastoreItem xmlns:ds="http://schemas.openxmlformats.org/officeDocument/2006/customXml" ds:itemID="{DDAAD0C2-8AA2-4903-8770-A9DDE0A43745}">
+<ds:datastoreItem xmlns:ds="http://schemas.openxmlformats.org/officeDocument/2006/customXml" ds:itemID="{13855BF2-3E1B-4048-8F5D-5069A0D184FE}">
   <ds:schemaRefs>
-    <ds:schemaRef ds:uri="http://schemas.microsoft.com/sharepoint/v3/contenttype/forms"/>
+    <ds:schemaRef ds:uri="http://schemas.microsoft.com/office/2006/metadata/contentType"/>
+    <ds:schemaRef ds:uri="http://schemas.microsoft.com/office/2006/metadata/properties/metaAttributes"/>
+    <ds:schemaRef ds:uri="http://www.w3.org/2001/XMLSchema"/>
+    <ds:schemaRef ds:uri="http://schemas.microsoft.com/office/2006/metadata/properties"/>
+    <ds:schemaRef ds:uri="http://schemas.openxmlformats.org/package/2006/metadata/core-properties"/>
+    <ds:schemaRef ds:uri="http://purl.org/dc/elements/1.1/"/>
+    <ds:schemaRef ds:uri="http://purl.org/dc/terms/"/>
+    <ds:schemaRef ds:uri="http://schemas.microsoft.com/internal/obd"/>
+    <ds:schemaRef ds:uri="http://schemas.microsoft.com/office/infopath/2007/PartnerControls"/>
   </ds:schemaRefs>
 </ds:datastoreItem>
 </file>

</xml_diff>